<commit_message>
add log file for ansible demo and update ppt
</commit_message>
<xml_diff>
--- a/Documents/Ansible_BasicsAndHowToGetStarted.pptx
+++ b/Documents/Ansible_BasicsAndHowToGetStarted.pptx
@@ -5,7 +5,7 @@
     <p:sldMasterId id="2147483648" r:id="rId1"/>
   </p:sldMasterIdLst>
   <p:notesMasterIdLst>
-    <p:notesMasterId r:id="rId28"/>
+    <p:notesMasterId r:id="rId32"/>
   </p:notesMasterIdLst>
   <p:sldIdLst>
     <p:sldId id="261" r:id="rId2"/>
@@ -28,12 +28,16 @@
     <p:sldId id="297" r:id="rId19"/>
     <p:sldId id="298" r:id="rId20"/>
     <p:sldId id="288" r:id="rId21"/>
-    <p:sldId id="290" r:id="rId22"/>
-    <p:sldId id="291" r:id="rId23"/>
-    <p:sldId id="292" r:id="rId24"/>
-    <p:sldId id="293" r:id="rId25"/>
-    <p:sldId id="278" r:id="rId26"/>
-    <p:sldId id="279" r:id="rId27"/>
+    <p:sldId id="299" r:id="rId22"/>
+    <p:sldId id="300" r:id="rId23"/>
+    <p:sldId id="290" r:id="rId24"/>
+    <p:sldId id="301" r:id="rId25"/>
+    <p:sldId id="302" r:id="rId26"/>
+    <p:sldId id="291" r:id="rId27"/>
+    <p:sldId id="292" r:id="rId28"/>
+    <p:sldId id="293" r:id="rId29"/>
+    <p:sldId id="278" r:id="rId30"/>
+    <p:sldId id="279" r:id="rId31"/>
   </p:sldIdLst>
   <p:sldSz cx="12192000" cy="6858000"/>
   <p:notesSz cx="6858000" cy="9144000"/>
@@ -7847,7 +7851,9 @@
               <a:buChar char="•"/>
             </a:pPr>
             <a:r>
-              <a:rPr lang="nl-BE" sz="2400" dirty="0"/>
+              <a:rPr lang="nl-BE" sz="2400" dirty="0">
+                <a:latin typeface="+mn-lt"/>
+              </a:rPr>
               <a:t>Runs against one/more/group of hosts</a:t>
             </a:r>
           </a:p>
@@ -7857,18 +7863,22 @@
               <a:buChar char="•"/>
             </a:pPr>
             <a:r>
-              <a:rPr lang="nl-BE" sz="2400" dirty="0"/>
-              <a:t>Located under “\</a:t>
-            </a:r>
-            <a:r>
               <a:rPr lang="nl-BE" sz="2400" dirty="0">
+                <a:latin typeface="+mn-lt"/>
+              </a:rPr>
+              <a:t>Located under “</a:t>
+            </a:r>
+            <a:r>
+              <a:rPr lang="nl-BE" sz="1800" dirty="0">
                 <a:latin typeface="Courier New" panose="02070309020205020404" pitchFamily="49" charset="0"/>
                 <a:cs typeface="Courier New" panose="02070309020205020404" pitchFamily="49" charset="0"/>
               </a:rPr>
-              <a:t>etc\ansible\hosts</a:t>
-            </a:r>
-            <a:r>
-              <a:rPr lang="nl-BE" sz="2400" dirty="0"/>
+              <a:t>\etc\ansible\hosts</a:t>
+            </a:r>
+            <a:r>
+              <a:rPr lang="nl-BE" sz="2400" dirty="0">
+                <a:latin typeface="+mn-lt"/>
+              </a:rPr>
               <a:t>”</a:t>
             </a:r>
           </a:p>
@@ -7878,7 +7888,9 @@
               <a:buChar char="•"/>
             </a:pPr>
             <a:r>
-              <a:rPr lang="nl-BE" sz="2400" dirty="0"/>
+              <a:rPr lang="nl-BE" sz="2400" dirty="0">
+                <a:latin typeface="+mn-lt"/>
+              </a:rPr>
               <a:t>Can create multiple host files (needs to be specified in .cfg)</a:t>
             </a:r>
           </a:p>
@@ -7888,18 +7900,22 @@
               <a:buChar char="•"/>
             </a:pPr>
             <a:r>
-              <a:rPr lang="nl-BE" sz="2400" dirty="0"/>
+              <a:rPr lang="nl-BE" sz="2400" dirty="0">
+                <a:latin typeface="+mn-lt"/>
+              </a:rPr>
               <a:t>Dynamically switch between host files with “</a:t>
             </a:r>
             <a:r>
-              <a:rPr lang="nl-BE" sz="2400" dirty="0">
+              <a:rPr lang="nl-BE" sz="1800" dirty="0">
                 <a:latin typeface="Courier New" panose="02070309020205020404" pitchFamily="49" charset="0"/>
                 <a:cs typeface="Courier New" panose="02070309020205020404" pitchFamily="49" charset="0"/>
               </a:rPr>
               <a:t>-i &lt;file-path&gt;</a:t>
             </a:r>
             <a:r>
-              <a:rPr lang="nl-BE" sz="2400" dirty="0"/>
+              <a:rPr lang="nl-BE" sz="2400" dirty="0">
+                <a:latin typeface="+mn-lt"/>
+              </a:rPr>
               <a:t>”</a:t>
             </a:r>
           </a:p>
@@ -7909,23 +7925,27 @@
               <a:buChar char="•"/>
             </a:pPr>
             <a:r>
-              <a:rPr lang="nl-BE" sz="2400" dirty="0"/>
+              <a:rPr lang="nl-BE" sz="2400" dirty="0">
+                <a:latin typeface="+mn-lt"/>
+              </a:rPr>
               <a:t>Inventrory/host files can be in </a:t>
             </a:r>
             <a:r>
               <a:rPr lang="nl-BE" sz="2400" dirty="0">
-                <a:latin typeface="Courier New" panose="02070309020205020404" pitchFamily="49" charset="0"/>
+                <a:latin typeface="+mn-lt"/>
                 <a:cs typeface="Courier New" panose="02070309020205020404" pitchFamily="49" charset="0"/>
               </a:rPr>
               <a:t>INI</a:t>
             </a:r>
             <a:r>
-              <a:rPr lang="nl-BE" sz="2400" dirty="0"/>
+              <a:rPr lang="nl-BE" sz="2400" dirty="0">
+                <a:latin typeface="+mn-lt"/>
+              </a:rPr>
               <a:t> format or </a:t>
             </a:r>
             <a:r>
               <a:rPr lang="nl-BE" sz="2400" dirty="0">
-                <a:latin typeface="Courier New" panose="02070309020205020404" pitchFamily="49" charset="0"/>
+                <a:latin typeface="+mn-lt"/>
                 <a:cs typeface="Courier New" panose="02070309020205020404" pitchFamily="49" charset="0"/>
               </a:rPr>
               <a:t>YAML</a:t>
@@ -7938,13 +7958,13 @@
             </a:pPr>
             <a:r>
               <a:rPr lang="nl-BE" sz="2400" dirty="0">
-                <a:latin typeface="Courier New" panose="02070309020205020404" pitchFamily="49" charset="0"/>
+                <a:latin typeface="+mn-lt"/>
                 <a:cs typeface="Courier New" panose="02070309020205020404" pitchFamily="49" charset="0"/>
               </a:rPr>
               <a:t>Personal prefference</a:t>
             </a:r>
             <a:endParaRPr lang="en-US" sz="2400" dirty="0">
-              <a:latin typeface="Courier New" panose="02070309020205020404" pitchFamily="49" charset="0"/>
+              <a:latin typeface="+mn-lt"/>
               <a:cs typeface="Courier New" panose="02070309020205020404" pitchFamily="49" charset="0"/>
             </a:endParaRPr>
           </a:p>
@@ -8399,7 +8419,9 @@
               <a:buChar char="•"/>
             </a:pPr>
             <a:r>
-              <a:rPr lang="nl-BE" dirty="0"/>
+              <a:rPr lang="nl-BE" dirty="0">
+                <a:latin typeface="+mn-lt"/>
+              </a:rPr>
               <a:t>Start of YAML file</a:t>
             </a:r>
           </a:p>
@@ -8409,7 +8431,9 @@
               <a:buChar char="•"/>
             </a:pPr>
             <a:r>
-              <a:rPr lang="nl-BE" dirty="0"/>
+              <a:rPr lang="nl-BE" dirty="0">
+                <a:latin typeface="+mn-lt"/>
+              </a:rPr>
               <a:t>Group name</a:t>
             </a:r>
           </a:p>
@@ -8419,7 +8443,9 @@
               <a:buChar char="•"/>
             </a:pPr>
             <a:r>
-              <a:rPr lang="nl-BE" dirty="0"/>
+              <a:rPr lang="nl-BE" dirty="0">
+                <a:latin typeface="+mn-lt"/>
+              </a:rPr>
               <a:t>Group variables</a:t>
             </a:r>
           </a:p>
@@ -8429,7 +8455,9 @@
               <a:buChar char="•"/>
             </a:pPr>
             <a:r>
-              <a:rPr lang="nl-BE" dirty="0"/>
+              <a:rPr lang="nl-BE" dirty="0">
+                <a:latin typeface="+mn-lt"/>
+              </a:rPr>
               <a:t>Host/node adress</a:t>
             </a:r>
           </a:p>
@@ -8439,7 +8467,9 @@
               <a:buChar char="•"/>
             </a:pPr>
             <a:r>
-              <a:rPr lang="nl-BE" dirty="0"/>
+              <a:rPr lang="nl-BE" dirty="0">
+                <a:latin typeface="+mn-lt"/>
+              </a:rPr>
               <a:t>Common variable(s)</a:t>
             </a:r>
           </a:p>
@@ -8449,10 +8479,14 @@
               <a:buChar char="•"/>
             </a:pPr>
             <a:r>
-              <a:rPr lang="nl-BE" dirty="0"/>
+              <a:rPr lang="nl-BE" dirty="0">
+                <a:latin typeface="+mn-lt"/>
+              </a:rPr>
               <a:t>YAML indentation</a:t>
             </a:r>
-            <a:endParaRPr lang="en-US" dirty="0"/>
+            <a:endParaRPr lang="en-US" dirty="0">
+              <a:latin typeface="+mn-lt"/>
+            </a:endParaRPr>
           </a:p>
         </p:txBody>
       </p:sp>
@@ -9362,7 +9396,9 @@
               <a:buChar char="•"/>
             </a:pPr>
             <a:r>
-              <a:rPr lang="nl-BE" dirty="0"/>
+              <a:rPr lang="nl-BE" dirty="0">
+                <a:latin typeface="+mn-lt"/>
+              </a:rPr>
               <a:t>Group name</a:t>
             </a:r>
           </a:p>
@@ -9372,7 +9408,9 @@
               <a:buChar char="•"/>
             </a:pPr>
             <a:r>
-              <a:rPr lang="nl-BE" dirty="0"/>
+              <a:rPr lang="nl-BE" dirty="0">
+                <a:latin typeface="+mn-lt"/>
+              </a:rPr>
               <a:t>Group variables</a:t>
             </a:r>
           </a:p>
@@ -9382,7 +9420,9 @@
               <a:buChar char="•"/>
             </a:pPr>
             <a:r>
-              <a:rPr lang="nl-BE" dirty="0"/>
+              <a:rPr lang="nl-BE" dirty="0">
+                <a:latin typeface="+mn-lt"/>
+              </a:rPr>
               <a:t>Host/node adress</a:t>
             </a:r>
           </a:p>
@@ -9392,7 +9432,9 @@
               <a:buChar char="•"/>
             </a:pPr>
             <a:r>
-              <a:rPr lang="nl-BE" dirty="0"/>
+              <a:rPr lang="nl-BE" dirty="0">
+                <a:latin typeface="+mn-lt"/>
+              </a:rPr>
               <a:t>Common variable(s)</a:t>
             </a:r>
           </a:p>
@@ -9402,10 +9444,14 @@
               <a:buChar char="•"/>
             </a:pPr>
             <a:r>
-              <a:rPr lang="nl-BE" dirty="0"/>
+              <a:rPr lang="nl-BE" dirty="0">
+                <a:latin typeface="+mn-lt"/>
+              </a:rPr>
               <a:t>No indentaion</a:t>
             </a:r>
-            <a:endParaRPr lang="en-US" dirty="0"/>
+            <a:endParaRPr lang="en-US" dirty="0">
+              <a:latin typeface="+mn-lt"/>
+            </a:endParaRPr>
           </a:p>
         </p:txBody>
       </p:sp>
@@ -10498,7 +10544,9 @@
               <a:buChar char="•"/>
             </a:pPr>
             <a:r>
-              <a:rPr lang="nl-BE" dirty="0"/>
+              <a:rPr lang="nl-BE" dirty="0">
+                <a:latin typeface="+mn-lt"/>
+              </a:rPr>
               <a:t>Highest order of hirarchy</a:t>
             </a:r>
           </a:p>
@@ -10508,7 +10556,9 @@
               <a:buChar char="•"/>
             </a:pPr>
             <a:r>
-              <a:rPr lang="nl-BE" dirty="0"/>
+              <a:rPr lang="nl-BE" dirty="0">
+                <a:latin typeface="+mn-lt"/>
+              </a:rPr>
               <a:t>List of plays</a:t>
             </a:r>
           </a:p>
@@ -10518,7 +10568,9 @@
               <a:buChar char="•"/>
             </a:pPr>
             <a:r>
-              <a:rPr lang="nl-BE" dirty="0"/>
+              <a:rPr lang="nl-BE" dirty="0">
+                <a:latin typeface="+mn-lt"/>
+              </a:rPr>
               <a:t>Comparable to organized script</a:t>
             </a:r>
           </a:p>
@@ -10528,7 +10580,9 @@
               <a:buChar char="•"/>
             </a:pPr>
             <a:r>
-              <a:rPr lang="nl-BE" dirty="0"/>
+              <a:rPr lang="nl-BE" dirty="0">
+                <a:latin typeface="+mn-lt"/>
+              </a:rPr>
               <a:t>Run against host (single host or group)</a:t>
             </a:r>
           </a:p>
@@ -10538,10 +10592,14 @@
               <a:buChar char="•"/>
             </a:pPr>
             <a:r>
-              <a:rPr lang="nl-BE" dirty="0"/>
+              <a:rPr lang="nl-BE" dirty="0">
+                <a:latin typeface="+mn-lt"/>
+              </a:rPr>
               <a:t>Contains one or more plays</a:t>
             </a:r>
-            <a:endParaRPr lang="en-US" dirty="0"/>
+            <a:endParaRPr lang="en-US" dirty="0">
+              <a:latin typeface="+mn-lt"/>
+            </a:endParaRPr>
           </a:p>
         </p:txBody>
       </p:sp>
@@ -10655,7 +10713,7 @@
           <a:lstStyle/>
           <a:p>
             <a:r>
-              <a:rPr lang="nl-BE" dirty="0">
+              <a:rPr lang="nl-BE">
                 <a:solidFill>
                   <a:srgbClr val="0085FE"/>
                 </a:solidFill>
@@ -10701,7 +10759,9 @@
               <a:buChar char="•"/>
             </a:pPr>
             <a:r>
-              <a:rPr lang="nl-BE" dirty="0"/>
+              <a:rPr lang="nl-BE" dirty="0">
+                <a:latin typeface="+mn-lt"/>
+              </a:rPr>
               <a:t>Falls under playbook in hirarchy</a:t>
             </a:r>
           </a:p>
@@ -10711,7 +10771,9 @@
               <a:buChar char="•"/>
             </a:pPr>
             <a:r>
-              <a:rPr lang="nl-BE" dirty="0"/>
+              <a:rPr lang="nl-BE" dirty="0">
+                <a:latin typeface="+mn-lt"/>
+              </a:rPr>
               <a:t>Environment specific parameters (e.g., host OS)</a:t>
             </a:r>
           </a:p>
@@ -10721,7 +10783,9 @@
               <a:buChar char="•"/>
             </a:pPr>
             <a:r>
-              <a:rPr lang="nl-BE" dirty="0"/>
+              <a:rPr lang="nl-BE" dirty="0">
+                <a:latin typeface="+mn-lt"/>
+              </a:rPr>
               <a:t>Mapping between hosts using group or host name (correlates with inventory)</a:t>
             </a:r>
           </a:p>
@@ -10731,7 +10795,9 @@
               <a:buChar char="•"/>
             </a:pPr>
             <a:r>
-              <a:rPr lang="nl-BE" dirty="0"/>
+              <a:rPr lang="nl-BE" dirty="0">
+                <a:latin typeface="+mn-lt"/>
+              </a:rPr>
               <a:t>No such thing as a standard play</a:t>
             </a:r>
           </a:p>
@@ -10741,10 +10807,14 @@
               <a:buChar char="•"/>
             </a:pPr>
             <a:r>
-              <a:rPr lang="nl-BE" dirty="0"/>
+              <a:rPr lang="nl-BE" dirty="0">
+                <a:latin typeface="+mn-lt"/>
+              </a:rPr>
               <a:t>Contains one or more tasks</a:t>
             </a:r>
-            <a:endParaRPr lang="en-US" dirty="0"/>
+            <a:endParaRPr lang="en-US" dirty="0">
+              <a:latin typeface="+mn-lt"/>
+            </a:endParaRPr>
           </a:p>
         </p:txBody>
       </p:sp>
@@ -10770,9 +10840,10 @@
           <a:lstStyle/>
           <a:p>
             <a:r>
-              <a:rPr lang="nl-BE" dirty="0"/>
+              <a:rPr lang="nl-BE"/>
               <a:t>Ansible</a:t>
             </a:r>
+            <a:endParaRPr lang="nl-BE" dirty="0"/>
           </a:p>
         </p:txBody>
       </p:sp>
@@ -10806,6 +10877,53 @@
           </a:p>
         </p:txBody>
       </p:sp>
+      <p:pic>
+        <p:nvPicPr>
+          <p:cNvPr id="1026" name="Picture 2" descr="PLAY”: An AFD Campus Training Initiative | AFD - Agence Française de  Développement">
+            <a:extLst>
+              <a:ext uri="{FF2B5EF4-FFF2-40B4-BE49-F238E27FC236}">
+                <a16:creationId xmlns:a16="http://schemas.microsoft.com/office/drawing/2014/main" id="{D932103E-CEFF-44F8-8598-5FA59F6B9B72}"/>
+              </a:ext>
+            </a:extLst>
+          </p:cNvPr>
+          <p:cNvPicPr>
+            <a:picLocks noChangeAspect="1" noChangeArrowheads="1"/>
+          </p:cNvPicPr>
+          <p:nvPr/>
+        </p:nvPicPr>
+        <p:blipFill>
+          <a:blip r:embed="rId2">
+            <a:extLst>
+              <a:ext uri="{28A0092B-C50C-407E-A947-70E740481C1C}">
+                <a14:useLocalDpi xmlns:a14="http://schemas.microsoft.com/office/drawing/2010/main" val="0"/>
+              </a:ext>
+            </a:extLst>
+          </a:blip>
+          <a:srcRect/>
+          <a:stretch>
+            <a:fillRect/>
+          </a:stretch>
+        </p:blipFill>
+        <p:spPr bwMode="auto">
+          <a:xfrm>
+            <a:off x="6857999" y="4072910"/>
+            <a:ext cx="3606800" cy="1610179"/>
+          </a:xfrm>
+          <a:prstGeom prst="rect">
+            <a:avLst/>
+          </a:prstGeom>
+          <a:noFill/>
+          <a:extLst>
+            <a:ext uri="{909E8E84-426E-40DD-AFC4-6F175D3DCCD1}">
+              <a14:hiddenFill xmlns:a14="http://schemas.microsoft.com/office/drawing/2010/main">
+                <a:solidFill>
+                  <a:srgbClr val="FFFFFF"/>
+                </a:solidFill>
+              </a14:hiddenFill>
+            </a:ext>
+          </a:extLst>
+        </p:spPr>
+      </p:pic>
     </p:spTree>
     <p:extLst>
       <p:ext uri="{BB962C8B-B14F-4D97-AF65-F5344CB8AC3E}">
@@ -10836,6 +10954,51 @@
           <a:chExt cx="0" cy="0"/>
         </a:xfrm>
       </p:grpSpPr>
+      <p:pic>
+        <p:nvPicPr>
+          <p:cNvPr id="2050" name="Picture 2" descr="How to use a task tracker for super management? – Unpaper">
+            <a:extLst>
+              <a:ext uri="{FF2B5EF4-FFF2-40B4-BE49-F238E27FC236}">
+                <a16:creationId xmlns:a16="http://schemas.microsoft.com/office/drawing/2014/main" id="{B3B35D78-1C25-4486-B343-84E24EC66F5D}"/>
+              </a:ext>
+            </a:extLst>
+          </p:cNvPr>
+          <p:cNvPicPr>
+            <a:picLocks noChangeAspect="1" noChangeArrowheads="1"/>
+          </p:cNvPicPr>
+          <p:nvPr/>
+        </p:nvPicPr>
+        <p:blipFill rotWithShape="1">
+          <a:blip r:embed="rId2">
+            <a:extLst>
+              <a:ext uri="{28A0092B-C50C-407E-A947-70E740481C1C}">
+                <a14:useLocalDpi xmlns:a14="http://schemas.microsoft.com/office/drawing/2010/main" val="0"/>
+              </a:ext>
+            </a:extLst>
+          </a:blip>
+          <a:srcRect l="25625" t="6553" r="21389"/>
+          <a:stretch/>
+        </p:blipFill>
+        <p:spPr bwMode="auto">
+          <a:xfrm>
+            <a:off x="7714651" y="129176"/>
+            <a:ext cx="3943058" cy="3477953"/>
+          </a:xfrm>
+          <a:prstGeom prst="rect">
+            <a:avLst/>
+          </a:prstGeom>
+          <a:noFill/>
+          <a:extLst>
+            <a:ext uri="{909E8E84-426E-40DD-AFC4-6F175D3DCCD1}">
+              <a14:hiddenFill xmlns:a14="http://schemas.microsoft.com/office/drawing/2010/main">
+                <a:solidFill>
+                  <a:srgbClr val="FFFFFF"/>
+                </a:solidFill>
+              </a14:hiddenFill>
+            </a:ext>
+          </a:extLst>
+        </p:spPr>
+      </p:pic>
       <p:sp>
         <p:nvSpPr>
           <p:cNvPr id="7" name="Title 6">
@@ -10891,7 +11054,7 @@
         </p:nvSpPr>
         <p:spPr>
           <a:xfrm>
-            <a:off x="534291" y="1296000"/>
+            <a:off x="534291" y="1868152"/>
             <a:ext cx="9291600" cy="3132000"/>
           </a:xfrm>
         </p:spPr>
@@ -10904,7 +11067,9 @@
               <a:buChar char="•"/>
             </a:pPr>
             <a:r>
-              <a:rPr lang="nl-BE" dirty="0"/>
+              <a:rPr lang="nl-BE" dirty="0">
+                <a:latin typeface="+mn-lt"/>
+              </a:rPr>
               <a:t>Falls under play in hirarchy</a:t>
             </a:r>
           </a:p>
@@ -10914,8 +11079,10 @@
               <a:buChar char="•"/>
             </a:pPr>
             <a:r>
-              <a:rPr lang="nl-BE" dirty="0"/>
-              <a:t>Task that runs on host define role that host fulfills/performs</a:t>
+              <a:rPr lang="nl-BE" dirty="0">
+                <a:latin typeface="+mn-lt"/>
+              </a:rPr>
+              <a:t>Smallest unit of action</a:t>
             </a:r>
           </a:p>
           <a:p>
@@ -10923,7 +11090,45 @@
               <a:buFont typeface="Arial" panose="020B0604020202020204" pitchFamily="34" charset="0"/>
               <a:buChar char="•"/>
             </a:pPr>
-            <a:endParaRPr lang="nl-BE" dirty="0"/>
+            <a:r>
+              <a:rPr lang="nl-BE" dirty="0">
+                <a:latin typeface="+mn-lt"/>
+              </a:rPr>
+              <a:t>Executed same order as defined in playbook</a:t>
+            </a:r>
+          </a:p>
+          <a:p>
+            <a:pPr marL="457200" indent="-457200">
+              <a:buFont typeface="Arial" panose="020B0604020202020204" pitchFamily="34" charset="0"/>
+              <a:buChar char="•"/>
+            </a:pPr>
+            <a:r>
+              <a:rPr lang="nl-BE" dirty="0">
+                <a:latin typeface="+mn-lt"/>
+              </a:rPr>
+              <a:t>Pushes small modules to target node</a:t>
+            </a:r>
+          </a:p>
+          <a:p>
+            <a:pPr marL="457200" indent="-457200">
+              <a:buFont typeface="Arial" panose="020B0604020202020204" pitchFamily="34" charset="0"/>
+              <a:buChar char="•"/>
+            </a:pPr>
+            <a:r>
+              <a:rPr lang="nl-BE" dirty="0">
+                <a:latin typeface="+mn-lt"/>
+              </a:rPr>
+              <a:t>A task that runs on host define role that host fulfills/performs</a:t>
+            </a:r>
+          </a:p>
+          <a:p>
+            <a:pPr marL="457200" indent="-457200">
+              <a:buFont typeface="Arial" panose="020B0604020202020204" pitchFamily="34" charset="0"/>
+              <a:buChar char="•"/>
+            </a:pPr>
+            <a:endParaRPr lang="nl-BE" dirty="0">
+              <a:latin typeface="+mn-lt"/>
+            </a:endParaRPr>
           </a:p>
         </p:txBody>
       </p:sp>
@@ -11605,6 +11810,14 @@
 <file path=ppt/slides/slide21.xml><?xml version="1.0" encoding="utf-8"?>
 <p:sld xmlns:a="http://schemas.openxmlformats.org/drawingml/2006/main" xmlns:r="http://schemas.openxmlformats.org/officeDocument/2006/relationships" xmlns:p="http://schemas.openxmlformats.org/presentationml/2006/main">
   <p:cSld>
+    <p:bg>
+      <p:bgPr>
+        <a:solidFill>
+          <a:schemeClr val="bg1"/>
+        </a:solidFill>
+        <a:effectLst/>
+      </p:bgPr>
+    </p:bg>
     <p:spTree>
       <p:nvGrpSpPr>
         <p:cNvPr id="1" name=""/>
@@ -11621,10 +11834,102 @@
       </p:grpSpPr>
       <p:sp>
         <p:nvSpPr>
-          <p:cNvPr id="2" name="Title 1">
-            <a:extLst>
-              <a:ext uri="{FF2B5EF4-FFF2-40B4-BE49-F238E27FC236}">
-                <a16:creationId xmlns:a16="http://schemas.microsoft.com/office/drawing/2014/main" id="{113F45C3-5063-42B6-8DC6-BEB4B0D619F0}"/>
+          <p:cNvPr id="17" name="Rectangle 16">
+            <a:extLst>
+              <a:ext uri="{FF2B5EF4-FFF2-40B4-BE49-F238E27FC236}">
+                <a16:creationId xmlns:a16="http://schemas.microsoft.com/office/drawing/2014/main" id="{81AEB8A9-B768-4E30-BA55-D919E6687343}"/>
+              </a:ext>
+              <a:ext uri="{C183D7F6-B498-43B3-948B-1728B52AA6E4}">
+                <adec:decorative xmlns:adec="http://schemas.microsoft.com/office/drawing/2017/decorative" val="1"/>
+              </a:ext>
+            </a:extLst>
+          </p:cNvPr>
+          <p:cNvSpPr>
+            <a:spLocks noGrp="1" noRot="1" noChangeAspect="1" noMove="1" noResize="1" noEditPoints="1" noAdjustHandles="1" noChangeArrowheads="1" noChangeShapeType="1" noTextEdit="1"/>
+          </p:cNvSpPr>
+          <p:nvPr>
+            <p:extLst>
+              <p:ext uri="{386F3935-93C4-4BCD-93E2-E3B085C9AB24}">
+                <p16:designElem xmlns:p16="http://schemas.microsoft.com/office/powerpoint/2015/main" val="1"/>
+              </p:ext>
+            </p:extLst>
+          </p:nvPr>
+        </p:nvSpPr>
+        <p:spPr>
+          <a:xfrm>
+            <a:off x="-10001" y="-2"/>
+            <a:ext cx="4069936" cy="6858002"/>
+          </a:xfrm>
+          <a:prstGeom prst="rect">
+            <a:avLst/>
+          </a:prstGeom>
+          <a:solidFill>
+            <a:schemeClr val="accent1"/>
+          </a:solidFill>
+          <a:ln>
+            <a:noFill/>
+          </a:ln>
+        </p:spPr>
+        <p:style>
+          <a:lnRef idx="2">
+            <a:schemeClr val="accent1">
+              <a:shade val="50000"/>
+            </a:schemeClr>
+          </a:lnRef>
+          <a:fillRef idx="1">
+            <a:schemeClr val="accent1"/>
+          </a:fillRef>
+          <a:effectRef idx="0">
+            <a:schemeClr val="accent1"/>
+          </a:effectRef>
+          <a:fontRef idx="minor">
+            <a:schemeClr val="lt1"/>
+          </a:fontRef>
+        </p:style>
+        <p:txBody>
+          <a:bodyPr rtlCol="0" anchor="ctr"/>
+          <a:lstStyle/>
+          <a:p>
+            <a:pPr marL="0" marR="0" lvl="0" indent="0" algn="ctr" defTabSz="914400" rtl="0" eaLnBrk="1" fontAlgn="auto" latinLnBrk="0" hangingPunct="1">
+              <a:lnSpc>
+                <a:spcPct val="100000"/>
+              </a:lnSpc>
+              <a:spcBef>
+                <a:spcPts val="0"/>
+              </a:spcBef>
+              <a:spcAft>
+                <a:spcPts val="0"/>
+              </a:spcAft>
+              <a:buClrTx/>
+              <a:buSzTx/>
+              <a:buFontTx/>
+              <a:buNone/>
+              <a:tabLst/>
+              <a:defRPr/>
+            </a:pPr>
+            <a:endParaRPr kumimoji="0" lang="en-US" sz="1800" b="0" i="0" u="none" strike="noStrike" kern="1200" cap="none" spc="0" normalizeH="0" baseline="0" noProof="0">
+              <a:ln>
+                <a:noFill/>
+              </a:ln>
+              <a:solidFill>
+                <a:prstClr val="white"/>
+              </a:solidFill>
+              <a:effectLst/>
+              <a:uLnTx/>
+              <a:uFillTx/>
+              <a:latin typeface="Calibri" panose="020F0502020204030204"/>
+              <a:ea typeface="+mn-ea"/>
+              <a:cs typeface="+mn-cs"/>
+            </a:endParaRPr>
+          </a:p>
+        </p:txBody>
+      </p:sp>
+      <p:sp>
+        <p:nvSpPr>
+          <p:cNvPr id="7" name="Title 6">
+            <a:extLst>
+              <a:ext uri="{FF2B5EF4-FFF2-40B4-BE49-F238E27FC236}">
+                <a16:creationId xmlns:a16="http://schemas.microsoft.com/office/drawing/2014/main" id="{4F6CF108-5626-429F-BA8D-83644B2077A6}"/>
               </a:ext>
             </a:extLst>
           </p:cNvPr>
@@ -11635,41 +11940,211 @@
             <p:ph type="title"/>
           </p:nvPr>
         </p:nvSpPr>
-        <p:spPr/>
-        <p:txBody>
-          <a:bodyPr/>
-          <a:lstStyle/>
-          <a:p>
-            <a:r>
-              <a:rPr lang="nl-BE" dirty="0"/>
-              <a:t>Plugins and modules</a:t>
-            </a:r>
-            <a:endParaRPr lang="en-US" dirty="0"/>
-          </a:p>
-        </p:txBody>
-      </p:sp>
-      <p:sp>
-        <p:nvSpPr>
-          <p:cNvPr id="3" name="Text Placeholder 2">
-            <a:extLst>
-              <a:ext uri="{FF2B5EF4-FFF2-40B4-BE49-F238E27FC236}">
-                <a16:creationId xmlns:a16="http://schemas.microsoft.com/office/drawing/2014/main" id="{829D27A6-EE3F-4034-B1A7-E43996E4618E}"/>
-              </a:ext>
-            </a:extLst>
-          </p:cNvPr>
-          <p:cNvSpPr>
-            <a:spLocks noGrp="1"/>
-          </p:cNvSpPr>
-          <p:nvPr>
-            <p:ph type="body" idx="1"/>
-          </p:nvPr>
-        </p:nvSpPr>
-        <p:spPr/>
-        <p:txBody>
-          <a:bodyPr/>
-          <a:lstStyle/>
-          <a:p>
-            <a:endParaRPr lang="en-US"/>
+        <p:spPr>
+          <a:xfrm>
+            <a:off x="643467" y="640080"/>
+            <a:ext cx="3096427" cy="5613236"/>
+          </a:xfrm>
+        </p:spPr>
+        <p:txBody>
+          <a:bodyPr vert="horz" lIns="91440" tIns="45720" rIns="91440" bIns="45720" rtlCol="0" anchor="ctr">
+            <a:normAutofit/>
+          </a:bodyPr>
+          <a:lstStyle/>
+          <a:p>
+            <a:pPr>
+              <a:lnSpc>
+                <a:spcPct val="90000"/>
+              </a:lnSpc>
+            </a:pPr>
+            <a:r>
+              <a:rPr lang="en-US" sz="4400" kern="1200">
+                <a:solidFill>
+                  <a:srgbClr val="FFFFFF"/>
+                </a:solidFill>
+                <a:latin typeface="+mj-lt"/>
+                <a:ea typeface="+mj-ea"/>
+                <a:cs typeface="+mj-cs"/>
+              </a:rPr>
+              <a:t>Roles</a:t>
+            </a:r>
+          </a:p>
+        </p:txBody>
+      </p:sp>
+      <p:sp>
+        <p:nvSpPr>
+          <p:cNvPr id="8" name="Content Placeholder 7">
+            <a:extLst>
+              <a:ext uri="{FF2B5EF4-FFF2-40B4-BE49-F238E27FC236}">
+                <a16:creationId xmlns:a16="http://schemas.microsoft.com/office/drawing/2014/main" id="{5A03A3BB-98AF-42F3-AF3D-C44335DC0722}"/>
+              </a:ext>
+            </a:extLst>
+          </p:cNvPr>
+          <p:cNvSpPr>
+            <a:spLocks noGrp="1"/>
+          </p:cNvSpPr>
+          <p:nvPr>
+            <p:ph idx="1"/>
+          </p:nvPr>
+        </p:nvSpPr>
+        <p:spPr>
+          <a:xfrm>
+            <a:off x="4699818" y="640082"/>
+            <a:ext cx="6848715" cy="2484884"/>
+          </a:xfrm>
+        </p:spPr>
+        <p:txBody>
+          <a:bodyPr vert="horz" lIns="91440" tIns="45720" rIns="91440" bIns="45720" rtlCol="0" anchor="ctr">
+            <a:normAutofit/>
+          </a:bodyPr>
+          <a:lstStyle/>
+          <a:p>
+            <a:pPr marL="457200" indent="-228600">
+              <a:lnSpc>
+                <a:spcPct val="90000"/>
+              </a:lnSpc>
+              <a:buFont typeface="Arial" panose="020B0604020202020204" pitchFamily="34" charset="0"/>
+              <a:buChar char="•"/>
+            </a:pPr>
+            <a:r>
+              <a:rPr lang="en-US" sz="2400" dirty="0">
+                <a:latin typeface="+mn-lt"/>
+              </a:rPr>
+              <a:t>Hold specific </a:t>
+            </a:r>
+            <a:r>
+              <a:rPr lang="en-US" sz="2400" dirty="0" err="1">
+                <a:latin typeface="+mn-lt"/>
+              </a:rPr>
+              <a:t>paramters</a:t>
+            </a:r>
+            <a:r>
+              <a:rPr lang="en-US" sz="2400" dirty="0">
+                <a:latin typeface="+mn-lt"/>
+              </a:rPr>
+              <a:t>/variables for group of hosts</a:t>
+            </a:r>
+          </a:p>
+          <a:p>
+            <a:pPr marL="457200" indent="-228600">
+              <a:lnSpc>
+                <a:spcPct val="90000"/>
+              </a:lnSpc>
+              <a:buFont typeface="Arial" panose="020B0604020202020204" pitchFamily="34" charset="0"/>
+              <a:buChar char="•"/>
+            </a:pPr>
+            <a:r>
+              <a:rPr lang="en-US" sz="2400" dirty="0" err="1">
+                <a:latin typeface="+mn-lt"/>
+              </a:rPr>
+              <a:t>Seperates</a:t>
+            </a:r>
+            <a:r>
+              <a:rPr lang="en-US" sz="2400" dirty="0">
+                <a:latin typeface="+mn-lt"/>
+              </a:rPr>
+              <a:t> and organizes groups</a:t>
+            </a:r>
+          </a:p>
+          <a:p>
+            <a:pPr marL="457200" indent="-228600">
+              <a:lnSpc>
+                <a:spcPct val="90000"/>
+              </a:lnSpc>
+              <a:buFont typeface="Arial" panose="020B0604020202020204" pitchFamily="34" charset="0"/>
+              <a:buChar char="•"/>
+            </a:pPr>
+            <a:r>
+              <a:rPr lang="en-US" sz="2400" dirty="0">
+                <a:latin typeface="+mn-lt"/>
+              </a:rPr>
+              <a:t>Defined in a play</a:t>
+            </a:r>
+          </a:p>
+        </p:txBody>
+      </p:sp>
+      <p:pic>
+        <p:nvPicPr>
+          <p:cNvPr id="12" name="Picture 11" descr="Text&#10;&#10;Description automatically generated with low confidence">
+            <a:extLst>
+              <a:ext uri="{FF2B5EF4-FFF2-40B4-BE49-F238E27FC236}">
+                <a16:creationId xmlns:a16="http://schemas.microsoft.com/office/drawing/2014/main" id="{CF27C6B3-306A-4A2E-B9CA-2C544C9272AC}"/>
+              </a:ext>
+            </a:extLst>
+          </p:cNvPr>
+          <p:cNvPicPr>
+            <a:picLocks noChangeAspect="1"/>
+          </p:cNvPicPr>
+          <p:nvPr/>
+        </p:nvPicPr>
+        <p:blipFill>
+          <a:blip r:embed="rId2">
+            <a:extLst>
+              <a:ext uri="{28A0092B-C50C-407E-A947-70E740481C1C}">
+                <a14:useLocalDpi xmlns:a14="http://schemas.microsoft.com/office/drawing/2010/main" val="0"/>
+              </a:ext>
+            </a:extLst>
+          </a:blip>
+          <a:stretch>
+            <a:fillRect/>
+          </a:stretch>
+        </p:blipFill>
+        <p:spPr>
+          <a:xfrm>
+            <a:off x="4654294" y="3209632"/>
+            <a:ext cx="3551103" cy="2141302"/>
+          </a:xfrm>
+          <a:prstGeom prst="rect">
+            <a:avLst/>
+          </a:prstGeom>
+        </p:spPr>
+      </p:pic>
+      <p:sp>
+        <p:nvSpPr>
+          <p:cNvPr id="4" name="Footer Placeholder 3">
+            <a:extLst>
+              <a:ext uri="{FF2B5EF4-FFF2-40B4-BE49-F238E27FC236}">
+                <a16:creationId xmlns:a16="http://schemas.microsoft.com/office/drawing/2014/main" id="{3B2EA459-7465-48D7-9BD2-1850D15C267B}"/>
+              </a:ext>
+            </a:extLst>
+          </p:cNvPr>
+          <p:cNvSpPr>
+            <a:spLocks noGrp="1"/>
+          </p:cNvSpPr>
+          <p:nvPr>
+            <p:ph type="ftr" sz="quarter" idx="11"/>
+          </p:nvPr>
+        </p:nvSpPr>
+        <p:spPr>
+          <a:xfrm>
+            <a:off x="4654294" y="6356350"/>
+            <a:ext cx="5719488" cy="365125"/>
+          </a:xfrm>
+        </p:spPr>
+        <p:txBody>
+          <a:bodyPr vert="horz" lIns="91440" tIns="45720" rIns="91440" bIns="45720" rtlCol="0" anchor="ctr">
+            <a:normAutofit/>
+          </a:bodyPr>
+          <a:lstStyle/>
+          <a:p>
+            <a:pPr>
+              <a:spcAft>
+                <a:spcPts val="600"/>
+              </a:spcAft>
+            </a:pPr>
+            <a:r>
+              <a:rPr lang="en-US" kern="1200">
+                <a:solidFill>
+                  <a:prstClr val="black">
+                    <a:tint val="75000"/>
+                  </a:prstClr>
+                </a:solidFill>
+                <a:latin typeface="+mn-lt"/>
+                <a:ea typeface="+mn-ea"/>
+                <a:cs typeface="+mn-cs"/>
+              </a:rPr>
+              <a:t>Ansible</a:t>
+            </a:r>
           </a:p>
         </p:txBody>
       </p:sp>
@@ -11678,7 +12153,7 @@
           <p:cNvPr id="5" name="Slide Number Placeholder 4">
             <a:extLst>
               <a:ext uri="{FF2B5EF4-FFF2-40B4-BE49-F238E27FC236}">
-                <a16:creationId xmlns:a16="http://schemas.microsoft.com/office/drawing/2014/main" id="{C72F05CE-88E7-4A04-A5C0-FD6C44F467E8}"/>
+                <a16:creationId xmlns:a16="http://schemas.microsoft.com/office/drawing/2014/main" id="{094ACEB9-F6EF-4AF8-8DAB-9CFF4217CC08}"/>
               </a:ext>
             </a:extLst>
           </p:cNvPr>
@@ -11689,127 +12164,94 @@
             <p:ph type="sldNum" sz="quarter" idx="12"/>
           </p:nvPr>
         </p:nvSpPr>
-        <p:spPr/>
-        <p:txBody>
-          <a:bodyPr/>
-          <a:lstStyle/>
-          <a:p>
+        <p:spPr>
+          <a:xfrm>
+            <a:off x="10534650" y="6356350"/>
+            <a:ext cx="819150" cy="365125"/>
+          </a:xfrm>
+        </p:spPr>
+        <p:txBody>
+          <a:bodyPr vert="horz" lIns="91440" tIns="45720" rIns="91440" bIns="45720" rtlCol="0" anchor="ctr">
+            <a:normAutofit/>
+          </a:bodyPr>
+          <a:lstStyle/>
+          <a:p>
+            <a:pPr algn="r">
+              <a:spcAft>
+                <a:spcPts val="600"/>
+              </a:spcAft>
+            </a:pPr>
             <a:fld id="{FF88DA20-ED00-471C-9170-60F590CB400A}" type="slidenum">
-              <a:rPr lang="nl-BE" smtClean="0"/>
-              <a:pPr/>
+              <a:rPr lang="en-US">
+                <a:solidFill>
+                  <a:prstClr val="black">
+                    <a:tint val="75000"/>
+                  </a:prstClr>
+                </a:solidFill>
+                <a:latin typeface="+mn-lt"/>
+              </a:rPr>
+              <a:pPr algn="r">
+                <a:spcAft>
+                  <a:spcPts val="600"/>
+                </a:spcAft>
+              </a:pPr>
               <a:t>21</a:t>
             </a:fld>
-            <a:endParaRPr lang="nl-BE"/>
-          </a:p>
-        </p:txBody>
-      </p:sp>
-      <p:sp>
-        <p:nvSpPr>
-          <p:cNvPr id="6" name="Text Placeholder 5">
-            <a:extLst>
-              <a:ext uri="{FF2B5EF4-FFF2-40B4-BE49-F238E27FC236}">
-                <a16:creationId xmlns:a16="http://schemas.microsoft.com/office/drawing/2014/main" id="{2EB60588-C6A5-4F58-967A-924C86EA2ACA}"/>
-              </a:ext>
-            </a:extLst>
-          </p:cNvPr>
-          <p:cNvSpPr>
-            <a:spLocks noGrp="1"/>
-          </p:cNvSpPr>
-          <p:nvPr>
-            <p:ph type="body" sz="quarter" idx="13"/>
-          </p:nvPr>
-        </p:nvSpPr>
-        <p:spPr/>
-        <p:txBody>
-          <a:bodyPr/>
-          <a:lstStyle/>
-          <a:p>
-            <a:r>
-              <a:rPr lang="nl-BE" dirty="0">
-                <a:solidFill>
-                  <a:srgbClr val="0085FE"/>
-                </a:solidFill>
-              </a:rPr>
-              <a:t>6.</a:t>
-            </a:r>
-            <a:endParaRPr lang="en-US" dirty="0">
+            <a:endParaRPr lang="en-US">
               <a:solidFill>
-                <a:srgbClr val="0085FE"/>
+                <a:prstClr val="black">
+                  <a:tint val="75000"/>
+                </a:prstClr>
               </a:solidFill>
+              <a:latin typeface="+mn-lt"/>
             </a:endParaRPr>
           </a:p>
         </p:txBody>
       </p:sp>
       <p:sp>
         <p:nvSpPr>
-          <p:cNvPr id="7" name="Footer Placeholder 3">
-            <a:extLst>
-              <a:ext uri="{FF2B5EF4-FFF2-40B4-BE49-F238E27FC236}">
-                <a16:creationId xmlns:a16="http://schemas.microsoft.com/office/drawing/2014/main" id="{5E95C8DC-5379-4DFB-80A1-1F3AAF7C7D69}"/>
-              </a:ext>
-            </a:extLst>
-          </p:cNvPr>
-          <p:cNvSpPr>
-            <a:spLocks noGrp="1"/>
-          </p:cNvSpPr>
-          <p:nvPr>
-            <p:ph type="ftr" sz="quarter" idx="11"/>
-          </p:nvPr>
+          <p:cNvPr id="13" name="Rectangle 12">
+            <a:extLst>
+              <a:ext uri="{FF2B5EF4-FFF2-40B4-BE49-F238E27FC236}">
+                <a16:creationId xmlns:a16="http://schemas.microsoft.com/office/drawing/2014/main" id="{127747BB-3951-444D-BF90-AB09351D6275}"/>
+              </a:ext>
+            </a:extLst>
+          </p:cNvPr>
+          <p:cNvSpPr/>
+          <p:nvPr/>
         </p:nvSpPr>
         <p:spPr>
           <a:xfrm>
-            <a:off x="861246" y="6264211"/>
-            <a:ext cx="4114800" cy="365125"/>
-          </a:xfrm>
-        </p:spPr>
-        <p:txBody>
-          <a:bodyPr/>
-          <a:lstStyle/>
-          <a:p>
-            <a:r>
-              <a:rPr lang="nl-BE" dirty="0"/>
-              <a:t>Ansible</a:t>
-            </a:r>
-          </a:p>
-        </p:txBody>
-      </p:sp>
-      <p:sp>
-        <p:nvSpPr>
-          <p:cNvPr id="8" name="Tijdelijke aanduiding voor datum 1">
-            <a:extLst>
-              <a:ext uri="{FF2B5EF4-FFF2-40B4-BE49-F238E27FC236}">
-                <a16:creationId xmlns:a16="http://schemas.microsoft.com/office/drawing/2014/main" id="{0FB70630-6571-48E3-857D-CDD365B58D30}"/>
-              </a:ext>
-            </a:extLst>
-          </p:cNvPr>
-          <p:cNvSpPr>
-            <a:spLocks noGrp="1"/>
-          </p:cNvSpPr>
-          <p:nvPr>
-            <p:ph type="dt" sz="half" idx="10"/>
-          </p:nvPr>
-        </p:nvSpPr>
-        <p:spPr>
-          <a:xfrm>
-            <a:off x="4998576" y="6264004"/>
-            <a:ext cx="2743200" cy="365125"/>
-          </a:xfrm>
-        </p:spPr>
-        <p:txBody>
-          <a:bodyPr/>
-          <a:lstStyle/>
-          <a:p>
-            <a:r>
-              <a:rPr lang="nl-BE" dirty="0"/>
-              <a:t>31/01/2022</a:t>
-            </a:r>
+            <a:off x="5325532" y="4927600"/>
+            <a:ext cx="2032001" cy="304800"/>
+          </a:xfrm>
+          <a:prstGeom prst="rect">
+            <a:avLst/>
+          </a:prstGeom>
+          <a:noFill/>
+          <a:ln w="38100">
+            <a:solidFill>
+              <a:srgbClr val="FF0000"/>
+            </a:solidFill>
+          </a:ln>
+        </p:spPr>
+        <p:txBody>
+          <a:bodyPr wrap="square" lIns="0" tIns="0" rIns="0" bIns="0" rtlCol="0" anchor="ctr">
+            <a:spAutoFit/>
+          </a:bodyPr>
+          <a:lstStyle/>
+          <a:p>
+            <a:pPr algn="l"/>
+            <a:endParaRPr lang="en-US" sz="1600" b="1" dirty="0" err="1">
+              <a:latin typeface="+mj-lt"/>
+            </a:endParaRPr>
           </a:p>
         </p:txBody>
       </p:sp>
     </p:spTree>
     <p:extLst>
       <p:ext uri="{BB962C8B-B14F-4D97-AF65-F5344CB8AC3E}">
-        <p14:creationId xmlns:p14="http://schemas.microsoft.com/office/powerpoint/2010/main" val="2035829673"/>
+        <p14:creationId xmlns:p14="http://schemas.microsoft.com/office/powerpoint/2010/main" val="3761858670"/>
       </p:ext>
     </p:extLst>
   </p:cSld>
@@ -11838,10 +12280,10 @@
       </p:grpSpPr>
       <p:sp>
         <p:nvSpPr>
-          <p:cNvPr id="2" name="Title 1">
-            <a:extLst>
-              <a:ext uri="{FF2B5EF4-FFF2-40B4-BE49-F238E27FC236}">
-                <a16:creationId xmlns:a16="http://schemas.microsoft.com/office/drawing/2014/main" id="{9B03E1DF-1B53-4967-969A-C05921548475}"/>
+          <p:cNvPr id="7" name="Title 6">
+            <a:extLst>
+              <a:ext uri="{FF2B5EF4-FFF2-40B4-BE49-F238E27FC236}">
+                <a16:creationId xmlns:a16="http://schemas.microsoft.com/office/drawing/2014/main" id="{4F6CF108-5626-429F-BA8D-83644B2077A6}"/>
               </a:ext>
             </a:extLst>
           </p:cNvPr>
@@ -11858,35 +12300,71 @@
           <a:lstStyle/>
           <a:p>
             <a:r>
+              <a:rPr lang="nl-BE" dirty="0">
+                <a:solidFill>
+                  <a:srgbClr val="0085FE"/>
+                </a:solidFill>
+              </a:rPr>
+              <a:t>Handlers</a:t>
+            </a:r>
+            <a:endParaRPr lang="en-US" dirty="0">
+              <a:solidFill>
+                <a:srgbClr val="0085FE"/>
+              </a:solidFill>
+            </a:endParaRPr>
+          </a:p>
+        </p:txBody>
+      </p:sp>
+      <p:sp>
+        <p:nvSpPr>
+          <p:cNvPr id="8" name="Content Placeholder 7">
+            <a:extLst>
+              <a:ext uri="{FF2B5EF4-FFF2-40B4-BE49-F238E27FC236}">
+                <a16:creationId xmlns:a16="http://schemas.microsoft.com/office/drawing/2014/main" id="{5A03A3BB-98AF-42F3-AF3D-C44335DC0722}"/>
+              </a:ext>
+            </a:extLst>
+          </p:cNvPr>
+          <p:cNvSpPr>
+            <a:spLocks noGrp="1"/>
+          </p:cNvSpPr>
+          <p:nvPr>
+            <p:ph idx="1"/>
+          </p:nvPr>
+        </p:nvSpPr>
+        <p:spPr/>
+        <p:txBody>
+          <a:bodyPr/>
+          <a:lstStyle/>
+          <a:p>
+            <a:endParaRPr lang="en-US"/>
+          </a:p>
+        </p:txBody>
+      </p:sp>
+      <p:sp>
+        <p:nvSpPr>
+          <p:cNvPr id="4" name="Footer Placeholder 3">
+            <a:extLst>
+              <a:ext uri="{FF2B5EF4-FFF2-40B4-BE49-F238E27FC236}">
+                <a16:creationId xmlns:a16="http://schemas.microsoft.com/office/drawing/2014/main" id="{3B2EA459-7465-48D7-9BD2-1850D15C267B}"/>
+              </a:ext>
+            </a:extLst>
+          </p:cNvPr>
+          <p:cNvSpPr>
+            <a:spLocks noGrp="1"/>
+          </p:cNvSpPr>
+          <p:nvPr>
+            <p:ph type="ftr" sz="quarter" idx="11"/>
+          </p:nvPr>
+        </p:nvSpPr>
+        <p:spPr/>
+        <p:txBody>
+          <a:bodyPr/>
+          <a:lstStyle/>
+          <a:p>
+            <a:r>
               <a:rPr lang="nl-BE" dirty="0"/>
-              <a:t>Intallation</a:t>
-            </a:r>
-            <a:endParaRPr lang="en-US" dirty="0"/>
-          </a:p>
-        </p:txBody>
-      </p:sp>
-      <p:sp>
-        <p:nvSpPr>
-          <p:cNvPr id="3" name="Text Placeholder 2">
-            <a:extLst>
-              <a:ext uri="{FF2B5EF4-FFF2-40B4-BE49-F238E27FC236}">
-                <a16:creationId xmlns:a16="http://schemas.microsoft.com/office/drawing/2014/main" id="{1525F9F0-2D31-473A-9784-6C675C16A1BC}"/>
-              </a:ext>
-            </a:extLst>
-          </p:cNvPr>
-          <p:cNvSpPr>
-            <a:spLocks noGrp="1"/>
-          </p:cNvSpPr>
-          <p:nvPr>
-            <p:ph type="body" idx="1"/>
-          </p:nvPr>
-        </p:nvSpPr>
-        <p:spPr/>
-        <p:txBody>
-          <a:bodyPr/>
-          <a:lstStyle/>
-          <a:p>
-            <a:endParaRPr lang="en-US"/>
+              <a:t>Ansible</a:t>
+            </a:r>
           </a:p>
         </p:txBody>
       </p:sp>
@@ -11895,7 +12373,7 @@
           <p:cNvPr id="5" name="Slide Number Placeholder 4">
             <a:extLst>
               <a:ext uri="{FF2B5EF4-FFF2-40B4-BE49-F238E27FC236}">
-                <a16:creationId xmlns:a16="http://schemas.microsoft.com/office/drawing/2014/main" id="{50467A86-777D-45F4-BE4B-B1DB46B0E329}"/>
+                <a16:creationId xmlns:a16="http://schemas.microsoft.com/office/drawing/2014/main" id="{094ACEB9-F6EF-4AF8-8DAB-9CFF4217CC08}"/>
               </a:ext>
             </a:extLst>
           </p:cNvPr>
@@ -11920,113 +12398,10 @@
           </a:p>
         </p:txBody>
       </p:sp>
-      <p:sp>
-        <p:nvSpPr>
-          <p:cNvPr id="6" name="Text Placeholder 5">
-            <a:extLst>
-              <a:ext uri="{FF2B5EF4-FFF2-40B4-BE49-F238E27FC236}">
-                <a16:creationId xmlns:a16="http://schemas.microsoft.com/office/drawing/2014/main" id="{C531B67A-2B8E-44DB-9254-10C25A9E7978}"/>
-              </a:ext>
-            </a:extLst>
-          </p:cNvPr>
-          <p:cNvSpPr>
-            <a:spLocks noGrp="1"/>
-          </p:cNvSpPr>
-          <p:nvPr>
-            <p:ph type="body" sz="quarter" idx="13"/>
-          </p:nvPr>
-        </p:nvSpPr>
-        <p:spPr/>
-        <p:txBody>
-          <a:bodyPr/>
-          <a:lstStyle/>
-          <a:p>
-            <a:r>
-              <a:rPr lang="nl-BE" dirty="0">
-                <a:solidFill>
-                  <a:srgbClr val="0085FE"/>
-                </a:solidFill>
-              </a:rPr>
-              <a:t>7.</a:t>
-            </a:r>
-            <a:endParaRPr lang="en-US" dirty="0">
-              <a:solidFill>
-                <a:srgbClr val="0085FE"/>
-              </a:solidFill>
-            </a:endParaRPr>
-          </a:p>
-        </p:txBody>
-      </p:sp>
-      <p:sp>
-        <p:nvSpPr>
-          <p:cNvPr id="7" name="Footer Placeholder 3">
-            <a:extLst>
-              <a:ext uri="{FF2B5EF4-FFF2-40B4-BE49-F238E27FC236}">
-                <a16:creationId xmlns:a16="http://schemas.microsoft.com/office/drawing/2014/main" id="{918E7B00-6D8B-464C-8C9D-DDD15B71C071}"/>
-              </a:ext>
-            </a:extLst>
-          </p:cNvPr>
-          <p:cNvSpPr>
-            <a:spLocks noGrp="1"/>
-          </p:cNvSpPr>
-          <p:nvPr>
-            <p:ph type="ftr" sz="quarter" idx="11"/>
-          </p:nvPr>
-        </p:nvSpPr>
-        <p:spPr>
-          <a:xfrm>
-            <a:off x="861246" y="6264211"/>
-            <a:ext cx="4114800" cy="365125"/>
-          </a:xfrm>
-        </p:spPr>
-        <p:txBody>
-          <a:bodyPr/>
-          <a:lstStyle/>
-          <a:p>
-            <a:r>
-              <a:rPr lang="nl-BE" dirty="0"/>
-              <a:t>Ansible</a:t>
-            </a:r>
-          </a:p>
-        </p:txBody>
-      </p:sp>
-      <p:sp>
-        <p:nvSpPr>
-          <p:cNvPr id="8" name="Tijdelijke aanduiding voor datum 1">
-            <a:extLst>
-              <a:ext uri="{FF2B5EF4-FFF2-40B4-BE49-F238E27FC236}">
-                <a16:creationId xmlns:a16="http://schemas.microsoft.com/office/drawing/2014/main" id="{2D10AAF3-7345-4621-96FB-A689AE1F459F}"/>
-              </a:ext>
-            </a:extLst>
-          </p:cNvPr>
-          <p:cNvSpPr>
-            <a:spLocks noGrp="1"/>
-          </p:cNvSpPr>
-          <p:nvPr>
-            <p:ph type="dt" sz="half" idx="10"/>
-          </p:nvPr>
-        </p:nvSpPr>
-        <p:spPr>
-          <a:xfrm>
-            <a:off x="4998576" y="6264004"/>
-            <a:ext cx="2743200" cy="365125"/>
-          </a:xfrm>
-        </p:spPr>
-        <p:txBody>
-          <a:bodyPr/>
-          <a:lstStyle/>
-          <a:p>
-            <a:r>
-              <a:rPr lang="nl-BE" dirty="0"/>
-              <a:t>31/01/2022</a:t>
-            </a:r>
-          </a:p>
-        </p:txBody>
-      </p:sp>
     </p:spTree>
     <p:extLst>
       <p:ext uri="{BB962C8B-B14F-4D97-AF65-F5344CB8AC3E}">
-        <p14:creationId xmlns:p14="http://schemas.microsoft.com/office/powerpoint/2010/main" val="4128278387"/>
+        <p14:creationId xmlns:p14="http://schemas.microsoft.com/office/powerpoint/2010/main" val="670496784"/>
       </p:ext>
     </p:extLst>
   </p:cSld>
@@ -12058,7 +12433,7 @@
           <p:cNvPr id="2" name="Title 1">
             <a:extLst>
               <a:ext uri="{FF2B5EF4-FFF2-40B4-BE49-F238E27FC236}">
-                <a16:creationId xmlns:a16="http://schemas.microsoft.com/office/drawing/2014/main" id="{70FEA819-AA32-4583-9E98-B9DBD20D08C5}"/>
+                <a16:creationId xmlns:a16="http://schemas.microsoft.com/office/drawing/2014/main" id="{113F45C3-5063-42B6-8DC6-BEB4B0D619F0}"/>
               </a:ext>
             </a:extLst>
           </p:cNvPr>
@@ -12076,7 +12451,7 @@
           <a:p>
             <a:r>
               <a:rPr lang="nl-BE" dirty="0"/>
-              <a:t>Authentication</a:t>
+              <a:t>Plugins and modules</a:t>
             </a:r>
             <a:endParaRPr lang="en-US" dirty="0"/>
           </a:p>
@@ -12087,7 +12462,7 @@
           <p:cNvPr id="3" name="Text Placeholder 2">
             <a:extLst>
               <a:ext uri="{FF2B5EF4-FFF2-40B4-BE49-F238E27FC236}">
-                <a16:creationId xmlns:a16="http://schemas.microsoft.com/office/drawing/2014/main" id="{EC32EC60-A861-403F-A296-2216AA4D5C5C}"/>
+                <a16:creationId xmlns:a16="http://schemas.microsoft.com/office/drawing/2014/main" id="{829D27A6-EE3F-4034-B1A7-E43996E4618E}"/>
               </a:ext>
             </a:extLst>
           </p:cNvPr>
@@ -12112,7 +12487,7 @@
           <p:cNvPr id="5" name="Slide Number Placeholder 4">
             <a:extLst>
               <a:ext uri="{FF2B5EF4-FFF2-40B4-BE49-F238E27FC236}">
-                <a16:creationId xmlns:a16="http://schemas.microsoft.com/office/drawing/2014/main" id="{A16825DC-9D9D-4E1A-9AFD-AA673F4A6E6D}"/>
+                <a16:creationId xmlns:a16="http://schemas.microsoft.com/office/drawing/2014/main" id="{C72F05CE-88E7-4A04-A5C0-FD6C44F467E8}"/>
               </a:ext>
             </a:extLst>
           </p:cNvPr>
@@ -12142,7 +12517,7 @@
           <p:cNvPr id="6" name="Text Placeholder 5">
             <a:extLst>
               <a:ext uri="{FF2B5EF4-FFF2-40B4-BE49-F238E27FC236}">
-                <a16:creationId xmlns:a16="http://schemas.microsoft.com/office/drawing/2014/main" id="{5C7A25BD-74FF-4F3E-A457-7A2EF24BA328}"/>
+                <a16:creationId xmlns:a16="http://schemas.microsoft.com/office/drawing/2014/main" id="{2EB60588-C6A5-4F58-967A-924C86EA2ACA}"/>
               </a:ext>
             </a:extLst>
           </p:cNvPr>
@@ -12164,7 +12539,7 @@
                   <a:srgbClr val="0085FE"/>
                 </a:solidFill>
               </a:rPr>
-              <a:t>8.</a:t>
+              <a:t>6.</a:t>
             </a:r>
             <a:endParaRPr lang="en-US" dirty="0">
               <a:solidFill>
@@ -12179,7 +12554,7 @@
           <p:cNvPr id="7" name="Footer Placeholder 3">
             <a:extLst>
               <a:ext uri="{FF2B5EF4-FFF2-40B4-BE49-F238E27FC236}">
-                <a16:creationId xmlns:a16="http://schemas.microsoft.com/office/drawing/2014/main" id="{7BBB4841-9FC2-490F-83AA-5589FC091688}"/>
+                <a16:creationId xmlns:a16="http://schemas.microsoft.com/office/drawing/2014/main" id="{5E95C8DC-5379-4DFB-80A1-1F3AAF7C7D69}"/>
               </a:ext>
             </a:extLst>
           </p:cNvPr>
@@ -12212,7 +12587,7 @@
           <p:cNvPr id="8" name="Tijdelijke aanduiding voor datum 1">
             <a:extLst>
               <a:ext uri="{FF2B5EF4-FFF2-40B4-BE49-F238E27FC236}">
-                <a16:creationId xmlns:a16="http://schemas.microsoft.com/office/drawing/2014/main" id="{86E517BA-B755-4C37-BB4C-75337E789D27}"/>
+                <a16:creationId xmlns:a16="http://schemas.microsoft.com/office/drawing/2014/main" id="{0FB70630-6571-48E3-857D-CDD365B58D30}"/>
               </a:ext>
             </a:extLst>
           </p:cNvPr>
@@ -12243,7 +12618,7 @@
     </p:spTree>
     <p:extLst>
       <p:ext uri="{BB962C8B-B14F-4D97-AF65-F5344CB8AC3E}">
-        <p14:creationId xmlns:p14="http://schemas.microsoft.com/office/powerpoint/2010/main" val="2591651798"/>
+        <p14:creationId xmlns:p14="http://schemas.microsoft.com/office/powerpoint/2010/main" val="2035829673"/>
       </p:ext>
     </p:extLst>
   </p:cSld>
@@ -12272,10 +12647,10 @@
       </p:grpSpPr>
       <p:sp>
         <p:nvSpPr>
-          <p:cNvPr id="2" name="Title 1">
-            <a:extLst>
-              <a:ext uri="{FF2B5EF4-FFF2-40B4-BE49-F238E27FC236}">
-                <a16:creationId xmlns:a16="http://schemas.microsoft.com/office/drawing/2014/main" id="{71FD9B4A-22B3-4B27-8EC6-CB566E6C3ECB}"/>
+          <p:cNvPr id="7" name="Title 6">
+            <a:extLst>
+              <a:ext uri="{FF2B5EF4-FFF2-40B4-BE49-F238E27FC236}">
+                <a16:creationId xmlns:a16="http://schemas.microsoft.com/office/drawing/2014/main" id="{098AC1CF-F9AE-40B6-B3C7-9DE0BC46AE3C}"/>
               </a:ext>
             </a:extLst>
           </p:cNvPr>
@@ -12292,35 +12667,71 @@
           <a:lstStyle/>
           <a:p>
             <a:r>
+              <a:rPr lang="nl-BE" dirty="0">
+                <a:solidFill>
+                  <a:srgbClr val="0085FE"/>
+                </a:solidFill>
+              </a:rPr>
+              <a:t>Plugins</a:t>
+            </a:r>
+            <a:endParaRPr lang="en-US" dirty="0">
+              <a:solidFill>
+                <a:srgbClr val="0085FE"/>
+              </a:solidFill>
+            </a:endParaRPr>
+          </a:p>
+        </p:txBody>
+      </p:sp>
+      <p:sp>
+        <p:nvSpPr>
+          <p:cNvPr id="8" name="Content Placeholder 7">
+            <a:extLst>
+              <a:ext uri="{FF2B5EF4-FFF2-40B4-BE49-F238E27FC236}">
+                <a16:creationId xmlns:a16="http://schemas.microsoft.com/office/drawing/2014/main" id="{60503E69-6EDA-419D-A3A1-6C9130158704}"/>
+              </a:ext>
+            </a:extLst>
+          </p:cNvPr>
+          <p:cNvSpPr>
+            <a:spLocks noGrp="1"/>
+          </p:cNvSpPr>
+          <p:nvPr>
+            <p:ph idx="1"/>
+          </p:nvPr>
+        </p:nvSpPr>
+        <p:spPr/>
+        <p:txBody>
+          <a:bodyPr/>
+          <a:lstStyle/>
+          <a:p>
+            <a:endParaRPr lang="en-US"/>
+          </a:p>
+        </p:txBody>
+      </p:sp>
+      <p:sp>
+        <p:nvSpPr>
+          <p:cNvPr id="4" name="Footer Placeholder 3">
+            <a:extLst>
+              <a:ext uri="{FF2B5EF4-FFF2-40B4-BE49-F238E27FC236}">
+                <a16:creationId xmlns:a16="http://schemas.microsoft.com/office/drawing/2014/main" id="{21FC8812-972E-4BCE-81A1-481E0E2522B6}"/>
+              </a:ext>
+            </a:extLst>
+          </p:cNvPr>
+          <p:cNvSpPr>
+            <a:spLocks noGrp="1"/>
+          </p:cNvSpPr>
+          <p:nvPr>
+            <p:ph type="ftr" sz="quarter" idx="11"/>
+          </p:nvPr>
+        </p:nvSpPr>
+        <p:spPr/>
+        <p:txBody>
+          <a:bodyPr/>
+          <a:lstStyle/>
+          <a:p>
+            <a:r>
               <a:rPr lang="nl-BE" dirty="0"/>
-              <a:t>Demo</a:t>
-            </a:r>
-            <a:endParaRPr lang="en-US" dirty="0"/>
-          </a:p>
-        </p:txBody>
-      </p:sp>
-      <p:sp>
-        <p:nvSpPr>
-          <p:cNvPr id="3" name="Text Placeholder 2">
-            <a:extLst>
-              <a:ext uri="{FF2B5EF4-FFF2-40B4-BE49-F238E27FC236}">
-                <a16:creationId xmlns:a16="http://schemas.microsoft.com/office/drawing/2014/main" id="{ABAB74AB-067C-475A-80FF-87286C696527}"/>
-              </a:ext>
-            </a:extLst>
-          </p:cNvPr>
-          <p:cNvSpPr>
-            <a:spLocks noGrp="1"/>
-          </p:cNvSpPr>
-          <p:nvPr>
-            <p:ph type="body" idx="1"/>
-          </p:nvPr>
-        </p:nvSpPr>
-        <p:spPr/>
-        <p:txBody>
-          <a:bodyPr/>
-          <a:lstStyle/>
-          <a:p>
-            <a:endParaRPr lang="en-US" dirty="0"/>
+              <a:t>Ansible</a:t>
+            </a:r>
           </a:p>
         </p:txBody>
       </p:sp>
@@ -12329,7 +12740,7 @@
           <p:cNvPr id="5" name="Slide Number Placeholder 4">
             <a:extLst>
               <a:ext uri="{FF2B5EF4-FFF2-40B4-BE49-F238E27FC236}">
-                <a16:creationId xmlns:a16="http://schemas.microsoft.com/office/drawing/2014/main" id="{02D6F86B-6F5D-45E1-B852-6CA617042C82}"/>
+                <a16:creationId xmlns:a16="http://schemas.microsoft.com/office/drawing/2014/main" id="{B4AA0C24-8468-41E3-B762-FD8E38E65C50}"/>
               </a:ext>
             </a:extLst>
           </p:cNvPr>
@@ -12354,113 +12765,10 @@
           </a:p>
         </p:txBody>
       </p:sp>
-      <p:sp>
-        <p:nvSpPr>
-          <p:cNvPr id="6" name="Text Placeholder 5">
-            <a:extLst>
-              <a:ext uri="{FF2B5EF4-FFF2-40B4-BE49-F238E27FC236}">
-                <a16:creationId xmlns:a16="http://schemas.microsoft.com/office/drawing/2014/main" id="{0371867E-6B97-4F07-9BD0-C382829AF5AC}"/>
-              </a:ext>
-            </a:extLst>
-          </p:cNvPr>
-          <p:cNvSpPr>
-            <a:spLocks noGrp="1"/>
-          </p:cNvSpPr>
-          <p:nvPr>
-            <p:ph type="body" sz="quarter" idx="13"/>
-          </p:nvPr>
-        </p:nvSpPr>
-        <p:spPr/>
-        <p:txBody>
-          <a:bodyPr/>
-          <a:lstStyle/>
-          <a:p>
-            <a:r>
-              <a:rPr lang="nl-BE" dirty="0">
-                <a:solidFill>
-                  <a:srgbClr val="0085FE"/>
-                </a:solidFill>
-              </a:rPr>
-              <a:t>9.</a:t>
-            </a:r>
-            <a:endParaRPr lang="en-US" dirty="0">
-              <a:solidFill>
-                <a:srgbClr val="0085FE"/>
-              </a:solidFill>
-            </a:endParaRPr>
-          </a:p>
-        </p:txBody>
-      </p:sp>
-      <p:sp>
-        <p:nvSpPr>
-          <p:cNvPr id="7" name="Footer Placeholder 3">
-            <a:extLst>
-              <a:ext uri="{FF2B5EF4-FFF2-40B4-BE49-F238E27FC236}">
-                <a16:creationId xmlns:a16="http://schemas.microsoft.com/office/drawing/2014/main" id="{67CC5EEC-6AE9-490F-8F88-E9F460CE1001}"/>
-              </a:ext>
-            </a:extLst>
-          </p:cNvPr>
-          <p:cNvSpPr>
-            <a:spLocks noGrp="1"/>
-          </p:cNvSpPr>
-          <p:nvPr>
-            <p:ph type="ftr" sz="quarter" idx="11"/>
-          </p:nvPr>
-        </p:nvSpPr>
-        <p:spPr>
-          <a:xfrm>
-            <a:off x="861246" y="6264211"/>
-            <a:ext cx="4114800" cy="365125"/>
-          </a:xfrm>
-        </p:spPr>
-        <p:txBody>
-          <a:bodyPr/>
-          <a:lstStyle/>
-          <a:p>
-            <a:r>
-              <a:rPr lang="nl-BE" dirty="0"/>
-              <a:t>Ansible</a:t>
-            </a:r>
-          </a:p>
-        </p:txBody>
-      </p:sp>
-      <p:sp>
-        <p:nvSpPr>
-          <p:cNvPr id="8" name="Tijdelijke aanduiding voor datum 1">
-            <a:extLst>
-              <a:ext uri="{FF2B5EF4-FFF2-40B4-BE49-F238E27FC236}">
-                <a16:creationId xmlns:a16="http://schemas.microsoft.com/office/drawing/2014/main" id="{071B7CCA-0101-47DF-BDDD-97C3F5ABD31C}"/>
-              </a:ext>
-            </a:extLst>
-          </p:cNvPr>
-          <p:cNvSpPr>
-            <a:spLocks noGrp="1"/>
-          </p:cNvSpPr>
-          <p:nvPr>
-            <p:ph type="dt" sz="half" idx="10"/>
-          </p:nvPr>
-        </p:nvSpPr>
-        <p:spPr>
-          <a:xfrm>
-            <a:off x="4998576" y="6264004"/>
-            <a:ext cx="2743200" cy="365125"/>
-          </a:xfrm>
-        </p:spPr>
-        <p:txBody>
-          <a:bodyPr/>
-          <a:lstStyle/>
-          <a:p>
-            <a:r>
-              <a:rPr lang="nl-BE" dirty="0"/>
-              <a:t>31/01/2022</a:t>
-            </a:r>
-          </a:p>
-        </p:txBody>
-      </p:sp>
     </p:spTree>
     <p:extLst>
       <p:ext uri="{BB962C8B-B14F-4D97-AF65-F5344CB8AC3E}">
-        <p14:creationId xmlns:p14="http://schemas.microsoft.com/office/powerpoint/2010/main" val="3975158961"/>
+        <p14:creationId xmlns:p14="http://schemas.microsoft.com/office/powerpoint/2010/main" val="1360308570"/>
       </p:ext>
     </p:extLst>
   </p:cSld>
@@ -12492,7 +12800,7 @@
           <p:cNvPr id="2" name="Title 1">
             <a:extLst>
               <a:ext uri="{FF2B5EF4-FFF2-40B4-BE49-F238E27FC236}">
-                <a16:creationId xmlns:a16="http://schemas.microsoft.com/office/drawing/2014/main" id="{C0CA5DA5-C036-4684-B395-A2B54100B73E}"/>
+                <a16:creationId xmlns:a16="http://schemas.microsoft.com/office/drawing/2014/main" id="{3E45054D-3413-4B57-983B-BEF2D1AE40FF}"/>
               </a:ext>
             </a:extLst>
           </p:cNvPr>
@@ -12508,24 +12816,61 @@
           <a:bodyPr/>
           <a:lstStyle/>
           <a:p>
+            <a:r>
+              <a:rPr lang="nl-BE" dirty="0">
+                <a:solidFill>
+                  <a:srgbClr val="0085FE"/>
+                </a:solidFill>
+              </a:rPr>
+              <a:t>Modules</a:t>
+            </a:r>
+            <a:endParaRPr lang="en-US" dirty="0">
+              <a:solidFill>
+                <a:srgbClr val="0085FE"/>
+              </a:solidFill>
+            </a:endParaRPr>
+          </a:p>
+        </p:txBody>
+      </p:sp>
+      <p:sp>
+        <p:nvSpPr>
+          <p:cNvPr id="3" name="Content Placeholder 2">
+            <a:extLst>
+              <a:ext uri="{FF2B5EF4-FFF2-40B4-BE49-F238E27FC236}">
+                <a16:creationId xmlns:a16="http://schemas.microsoft.com/office/drawing/2014/main" id="{FBE4B41D-BA6B-4207-BC8F-465C732FD8DF}"/>
+              </a:ext>
+            </a:extLst>
+          </p:cNvPr>
+          <p:cNvSpPr>
+            <a:spLocks noGrp="1"/>
+          </p:cNvSpPr>
+          <p:nvPr>
+            <p:ph idx="1"/>
+          </p:nvPr>
+        </p:nvSpPr>
+        <p:spPr/>
+        <p:txBody>
+          <a:bodyPr/>
+          <a:lstStyle/>
+          <a:p>
             <a:endParaRPr lang="en-US"/>
           </a:p>
         </p:txBody>
       </p:sp>
       <p:sp>
         <p:nvSpPr>
-          <p:cNvPr id="3" name="Content Placeholder 2">
-            <a:extLst>
-              <a:ext uri="{FF2B5EF4-FFF2-40B4-BE49-F238E27FC236}">
-                <a16:creationId xmlns:a16="http://schemas.microsoft.com/office/drawing/2014/main" id="{6BB7156A-B72D-4860-81A1-650099E4CA1D}"/>
-              </a:ext>
-            </a:extLst>
-          </p:cNvPr>
-          <p:cNvSpPr>
-            <a:spLocks noGrp="1"/>
-          </p:cNvSpPr>
-          <p:nvPr>
-            <p:ph idx="1"/>
+          <p:cNvPr id="4" name="Footer Placeholder 3">
+            <a:extLst>
+              <a:ext uri="{FF2B5EF4-FFF2-40B4-BE49-F238E27FC236}">
+                <a16:creationId xmlns:a16="http://schemas.microsoft.com/office/drawing/2014/main" id="{31FFF919-47E3-46FE-87BC-463E31EE1106}"/>
+              </a:ext>
+            </a:extLst>
+          </p:cNvPr>
+          <p:cNvSpPr>
+            <a:spLocks noGrp="1"/>
+          </p:cNvSpPr>
+          <p:nvPr>
+            <p:ph type="ftr" sz="quarter" idx="11"/>
           </p:nvPr>
         </p:nvSpPr>
         <p:spPr/>
@@ -12533,34 +12878,9 @@
           <a:bodyPr/>
           <a:lstStyle/>
           <a:p>
-            <a:endParaRPr lang="en-US"/>
-          </a:p>
-        </p:txBody>
-      </p:sp>
-      <p:sp>
-        <p:nvSpPr>
-          <p:cNvPr id="4" name="Footer Placeholder 3">
-            <a:extLst>
-              <a:ext uri="{FF2B5EF4-FFF2-40B4-BE49-F238E27FC236}">
-                <a16:creationId xmlns:a16="http://schemas.microsoft.com/office/drawing/2014/main" id="{80F1881B-72D4-442C-AFDA-B56DEF22CFC7}"/>
-              </a:ext>
-            </a:extLst>
-          </p:cNvPr>
-          <p:cNvSpPr>
-            <a:spLocks noGrp="1"/>
-          </p:cNvSpPr>
-          <p:nvPr>
-            <p:ph type="ftr" sz="quarter" idx="11"/>
-          </p:nvPr>
-        </p:nvSpPr>
-        <p:spPr/>
-        <p:txBody>
-          <a:bodyPr/>
-          <a:lstStyle/>
-          <a:p>
-            <a:r>
-              <a:rPr lang="nl-BE"/>
-              <a:t>Titel van de presentatie</a:t>
+            <a:r>
+              <a:rPr lang="nl-BE" dirty="0"/>
+              <a:t>Ansible</a:t>
             </a:r>
           </a:p>
         </p:txBody>
@@ -12570,7 +12890,7 @@
           <p:cNvPr id="5" name="Slide Number Placeholder 4">
             <a:extLst>
               <a:ext uri="{FF2B5EF4-FFF2-40B4-BE49-F238E27FC236}">
-                <a16:creationId xmlns:a16="http://schemas.microsoft.com/office/drawing/2014/main" id="{EA65554E-54D4-4B45-9ED8-B19774FC2A6D}"/>
+                <a16:creationId xmlns:a16="http://schemas.microsoft.com/office/drawing/2014/main" id="{48542A5F-8009-443A-AA50-2CC3C0CF11C7}"/>
               </a:ext>
             </a:extLst>
           </p:cNvPr>
@@ -12594,35 +12914,10 @@
           </a:p>
         </p:txBody>
       </p:sp>
-      <p:sp>
-        <p:nvSpPr>
-          <p:cNvPr id="6" name="Text Placeholder 5">
-            <a:extLst>
-              <a:ext uri="{FF2B5EF4-FFF2-40B4-BE49-F238E27FC236}">
-                <a16:creationId xmlns:a16="http://schemas.microsoft.com/office/drawing/2014/main" id="{7178E282-D5ED-46AF-AC21-8E478FBDA844}"/>
-              </a:ext>
-            </a:extLst>
-          </p:cNvPr>
-          <p:cNvSpPr>
-            <a:spLocks noGrp="1"/>
-          </p:cNvSpPr>
-          <p:nvPr>
-            <p:ph type="body" sz="quarter" idx="13"/>
-          </p:nvPr>
-        </p:nvSpPr>
-        <p:spPr/>
-        <p:txBody>
-          <a:bodyPr/>
-          <a:lstStyle/>
-          <a:p>
-            <a:endParaRPr lang="en-US"/>
-          </a:p>
-        </p:txBody>
-      </p:sp>
     </p:spTree>
     <p:extLst>
       <p:ext uri="{BB962C8B-B14F-4D97-AF65-F5344CB8AC3E}">
-        <p14:creationId xmlns:p14="http://schemas.microsoft.com/office/powerpoint/2010/main" val="791299812"/>
+        <p14:creationId xmlns:p14="http://schemas.microsoft.com/office/powerpoint/2010/main" val="3271448145"/>
       </p:ext>
     </p:extLst>
   </p:cSld>
@@ -12654,7 +12949,7 @@
           <p:cNvPr id="2" name="Title 1">
             <a:extLst>
               <a:ext uri="{FF2B5EF4-FFF2-40B4-BE49-F238E27FC236}">
-                <a16:creationId xmlns:a16="http://schemas.microsoft.com/office/drawing/2014/main" id="{A0A4361E-379E-456A-82BC-335114F04C17}"/>
+                <a16:creationId xmlns:a16="http://schemas.microsoft.com/office/drawing/2014/main" id="{9B03E1DF-1B53-4967-969A-C05921548475}"/>
               </a:ext>
             </a:extLst>
           </p:cNvPr>
@@ -12663,6 +12958,90 @@
           </p:cNvSpPr>
           <p:nvPr>
             <p:ph type="title"/>
+          </p:nvPr>
+        </p:nvSpPr>
+        <p:spPr/>
+        <p:txBody>
+          <a:bodyPr/>
+          <a:lstStyle/>
+          <a:p>
+            <a:r>
+              <a:rPr lang="nl-BE" dirty="0"/>
+              <a:t>Intallation</a:t>
+            </a:r>
+            <a:endParaRPr lang="en-US" dirty="0"/>
+          </a:p>
+        </p:txBody>
+      </p:sp>
+      <p:sp>
+        <p:nvSpPr>
+          <p:cNvPr id="3" name="Text Placeholder 2">
+            <a:extLst>
+              <a:ext uri="{FF2B5EF4-FFF2-40B4-BE49-F238E27FC236}">
+                <a16:creationId xmlns:a16="http://schemas.microsoft.com/office/drawing/2014/main" id="{1525F9F0-2D31-473A-9784-6C675C16A1BC}"/>
+              </a:ext>
+            </a:extLst>
+          </p:cNvPr>
+          <p:cNvSpPr>
+            <a:spLocks noGrp="1"/>
+          </p:cNvSpPr>
+          <p:nvPr>
+            <p:ph type="body" idx="1"/>
+          </p:nvPr>
+        </p:nvSpPr>
+        <p:spPr/>
+        <p:txBody>
+          <a:bodyPr/>
+          <a:lstStyle/>
+          <a:p>
+            <a:endParaRPr lang="en-US"/>
+          </a:p>
+        </p:txBody>
+      </p:sp>
+      <p:sp>
+        <p:nvSpPr>
+          <p:cNvPr id="5" name="Slide Number Placeholder 4">
+            <a:extLst>
+              <a:ext uri="{FF2B5EF4-FFF2-40B4-BE49-F238E27FC236}">
+                <a16:creationId xmlns:a16="http://schemas.microsoft.com/office/drawing/2014/main" id="{50467A86-777D-45F4-BE4B-B1DB46B0E329}"/>
+              </a:ext>
+            </a:extLst>
+          </p:cNvPr>
+          <p:cNvSpPr>
+            <a:spLocks noGrp="1"/>
+          </p:cNvSpPr>
+          <p:nvPr>
+            <p:ph type="sldNum" sz="quarter" idx="12"/>
+          </p:nvPr>
+        </p:nvSpPr>
+        <p:spPr/>
+        <p:txBody>
+          <a:bodyPr/>
+          <a:lstStyle/>
+          <a:p>
+            <a:fld id="{FF88DA20-ED00-471C-9170-60F590CB400A}" type="slidenum">
+              <a:rPr lang="nl-BE" smtClean="0"/>
+              <a:pPr/>
+              <a:t>26</a:t>
+            </a:fld>
+            <a:endParaRPr lang="nl-BE"/>
+          </a:p>
+        </p:txBody>
+      </p:sp>
+      <p:sp>
+        <p:nvSpPr>
+          <p:cNvPr id="6" name="Text Placeholder 5">
+            <a:extLst>
+              <a:ext uri="{FF2B5EF4-FFF2-40B4-BE49-F238E27FC236}">
+                <a16:creationId xmlns:a16="http://schemas.microsoft.com/office/drawing/2014/main" id="{C531B67A-2B8E-44DB-9254-10C25A9E7978}"/>
+              </a:ext>
+            </a:extLst>
+          </p:cNvPr>
+          <p:cNvSpPr>
+            <a:spLocks noGrp="1"/>
+          </p:cNvSpPr>
+          <p:nvPr>
+            <p:ph type="body" sz="quarter" idx="13"/>
           </p:nvPr>
         </p:nvSpPr>
         <p:spPr/>
@@ -12676,7 +13055,7 @@
                   <a:srgbClr val="0085FE"/>
                 </a:solidFill>
               </a:rPr>
-              <a:t>Refferences</a:t>
+              <a:t>7.</a:t>
             </a:r>
             <a:endParaRPr lang="en-US" dirty="0">
               <a:solidFill>
@@ -12688,108 +13067,670 @@
       </p:sp>
       <p:sp>
         <p:nvSpPr>
-          <p:cNvPr id="3" name="Content Placeholder 2">
-            <a:extLst>
-              <a:ext uri="{FF2B5EF4-FFF2-40B4-BE49-F238E27FC236}">
-                <a16:creationId xmlns:a16="http://schemas.microsoft.com/office/drawing/2014/main" id="{58A98F98-F3F6-4D48-8A93-A83BE333E12E}"/>
-              </a:ext>
-            </a:extLst>
-          </p:cNvPr>
-          <p:cNvSpPr>
-            <a:spLocks noGrp="1"/>
-          </p:cNvSpPr>
-          <p:nvPr>
-            <p:ph idx="1"/>
-          </p:nvPr>
-        </p:nvSpPr>
-        <p:spPr/>
-        <p:txBody>
-          <a:bodyPr/>
-          <a:lstStyle/>
-          <a:p>
-            <a:pPr marL="457200" indent="-457200">
-              <a:buFont typeface="Arial" panose="020B0604020202020204" pitchFamily="34" charset="0"/>
-              <a:buChar char="•"/>
-            </a:pPr>
+          <p:cNvPr id="7" name="Footer Placeholder 3">
+            <a:extLst>
+              <a:ext uri="{FF2B5EF4-FFF2-40B4-BE49-F238E27FC236}">
+                <a16:creationId xmlns:a16="http://schemas.microsoft.com/office/drawing/2014/main" id="{918E7B00-6D8B-464C-8C9D-DDD15B71C071}"/>
+              </a:ext>
+            </a:extLst>
+          </p:cNvPr>
+          <p:cNvSpPr>
+            <a:spLocks noGrp="1"/>
+          </p:cNvSpPr>
+          <p:nvPr>
+            <p:ph type="ftr" sz="quarter" idx="11"/>
+          </p:nvPr>
+        </p:nvSpPr>
+        <p:spPr>
+          <a:xfrm>
+            <a:off x="861246" y="6264211"/>
+            <a:ext cx="4114800" cy="365125"/>
+          </a:xfrm>
+        </p:spPr>
+        <p:txBody>
+          <a:bodyPr/>
+          <a:lstStyle/>
+          <a:p>
             <a:r>
               <a:rPr lang="nl-BE" dirty="0"/>
-              <a:t>- Figure Ansible Architecture: </a:t>
-            </a:r>
-            <a:r>
-              <a:rPr lang="nl-BE" dirty="0">
-                <a:hlinkClick r:id="rId2"/>
-              </a:rPr>
-              <a:t>https://www.linkedin.com/pulse/how-industries-solving-challenges-using-ansible-shalini-rana</a:t>
-            </a:r>
+              <a:t>Ansible</a:t>
+            </a:r>
+          </a:p>
+        </p:txBody>
+      </p:sp>
+      <p:sp>
+        <p:nvSpPr>
+          <p:cNvPr id="8" name="Tijdelijke aanduiding voor datum 1">
+            <a:extLst>
+              <a:ext uri="{FF2B5EF4-FFF2-40B4-BE49-F238E27FC236}">
+                <a16:creationId xmlns:a16="http://schemas.microsoft.com/office/drawing/2014/main" id="{2D10AAF3-7345-4621-96FB-A689AE1F459F}"/>
+              </a:ext>
+            </a:extLst>
+          </p:cNvPr>
+          <p:cNvSpPr>
+            <a:spLocks noGrp="1"/>
+          </p:cNvSpPr>
+          <p:nvPr>
+            <p:ph type="dt" sz="half" idx="10"/>
+          </p:nvPr>
+        </p:nvSpPr>
+        <p:spPr>
+          <a:xfrm>
+            <a:off x="4998576" y="6264004"/>
+            <a:ext cx="2743200" cy="365125"/>
+          </a:xfrm>
+        </p:spPr>
+        <p:txBody>
+          <a:bodyPr/>
+          <a:lstStyle/>
+          <a:p>
             <a:r>
               <a:rPr lang="nl-BE" dirty="0"/>
-              <a:t> </a:t>
-            </a:r>
-            <a:endParaRPr lang="en-US" dirty="0"/>
-          </a:p>
-        </p:txBody>
-      </p:sp>
-      <p:sp>
-        <p:nvSpPr>
-          <p:cNvPr id="4" name="Footer Placeholder 3">
-            <a:extLst>
-              <a:ext uri="{FF2B5EF4-FFF2-40B4-BE49-F238E27FC236}">
-                <a16:creationId xmlns:a16="http://schemas.microsoft.com/office/drawing/2014/main" id="{7C6F3A2E-2A91-4DE3-9CEB-AC7F46DF3ECA}"/>
-              </a:ext>
-            </a:extLst>
-          </p:cNvPr>
-          <p:cNvSpPr>
-            <a:spLocks noGrp="1"/>
-          </p:cNvSpPr>
-          <p:nvPr>
-            <p:ph type="ftr" sz="quarter" idx="11"/>
-          </p:nvPr>
-        </p:nvSpPr>
-        <p:spPr/>
-        <p:txBody>
-          <a:bodyPr/>
-          <a:lstStyle/>
-          <a:p>
-            <a:r>
-              <a:rPr lang="nl-BE"/>
-              <a:t>Titel van de presentatie</a:t>
-            </a:r>
-          </a:p>
-        </p:txBody>
-      </p:sp>
-      <p:sp>
-        <p:nvSpPr>
-          <p:cNvPr id="5" name="Slide Number Placeholder 4">
-            <a:extLst>
-              <a:ext uri="{FF2B5EF4-FFF2-40B4-BE49-F238E27FC236}">
-                <a16:creationId xmlns:a16="http://schemas.microsoft.com/office/drawing/2014/main" id="{3349D7CC-7E04-49D2-A02E-DF8FCBEF1041}"/>
-              </a:ext>
-            </a:extLst>
-          </p:cNvPr>
-          <p:cNvSpPr>
-            <a:spLocks noGrp="1"/>
-          </p:cNvSpPr>
-          <p:nvPr>
-            <p:ph type="sldNum" sz="quarter" idx="12"/>
-          </p:nvPr>
-        </p:nvSpPr>
-        <p:spPr/>
-        <p:txBody>
-          <a:bodyPr/>
-          <a:lstStyle/>
-          <a:p>
-            <a:fld id="{FF88DA20-ED00-471C-9170-60F590CB400A}" type="slidenum">
-              <a:rPr lang="nl-BE" smtClean="0"/>
-              <a:t>26</a:t>
-            </a:fld>
-            <a:endParaRPr lang="nl-BE"/>
+              <a:t>31/01/2022</a:t>
+            </a:r>
           </a:p>
         </p:txBody>
       </p:sp>
     </p:spTree>
     <p:extLst>
       <p:ext uri="{BB962C8B-B14F-4D97-AF65-F5344CB8AC3E}">
-        <p14:creationId xmlns:p14="http://schemas.microsoft.com/office/powerpoint/2010/main" val="3070564893"/>
+        <p14:creationId xmlns:p14="http://schemas.microsoft.com/office/powerpoint/2010/main" val="4128278387"/>
+      </p:ext>
+    </p:extLst>
+  </p:cSld>
+  <p:clrMapOvr>
+    <a:masterClrMapping/>
+  </p:clrMapOvr>
+</p:sld>
+</file>
+
+<file path=ppt/slides/slide27.xml><?xml version="1.0" encoding="utf-8"?>
+<p:sld xmlns:a="http://schemas.openxmlformats.org/drawingml/2006/main" xmlns:r="http://schemas.openxmlformats.org/officeDocument/2006/relationships" xmlns:p="http://schemas.openxmlformats.org/presentationml/2006/main">
+  <p:cSld>
+    <p:spTree>
+      <p:nvGrpSpPr>
+        <p:cNvPr id="1" name=""/>
+        <p:cNvGrpSpPr/>
+        <p:nvPr/>
+      </p:nvGrpSpPr>
+      <p:grpSpPr>
+        <a:xfrm>
+          <a:off x="0" y="0"/>
+          <a:ext cx="0" cy="0"/>
+          <a:chOff x="0" y="0"/>
+          <a:chExt cx="0" cy="0"/>
+        </a:xfrm>
+      </p:grpSpPr>
+      <p:sp>
+        <p:nvSpPr>
+          <p:cNvPr id="2" name="Title 1">
+            <a:extLst>
+              <a:ext uri="{FF2B5EF4-FFF2-40B4-BE49-F238E27FC236}">
+                <a16:creationId xmlns:a16="http://schemas.microsoft.com/office/drawing/2014/main" id="{70FEA819-AA32-4583-9E98-B9DBD20D08C5}"/>
+              </a:ext>
+            </a:extLst>
+          </p:cNvPr>
+          <p:cNvSpPr>
+            <a:spLocks noGrp="1"/>
+          </p:cNvSpPr>
+          <p:nvPr>
+            <p:ph type="title"/>
+          </p:nvPr>
+        </p:nvSpPr>
+        <p:spPr/>
+        <p:txBody>
+          <a:bodyPr/>
+          <a:lstStyle/>
+          <a:p>
+            <a:r>
+              <a:rPr lang="nl-BE" dirty="0"/>
+              <a:t>Authentication</a:t>
+            </a:r>
+            <a:endParaRPr lang="en-US" dirty="0"/>
+          </a:p>
+        </p:txBody>
+      </p:sp>
+      <p:sp>
+        <p:nvSpPr>
+          <p:cNvPr id="3" name="Text Placeholder 2">
+            <a:extLst>
+              <a:ext uri="{FF2B5EF4-FFF2-40B4-BE49-F238E27FC236}">
+                <a16:creationId xmlns:a16="http://schemas.microsoft.com/office/drawing/2014/main" id="{EC32EC60-A861-403F-A296-2216AA4D5C5C}"/>
+              </a:ext>
+            </a:extLst>
+          </p:cNvPr>
+          <p:cNvSpPr>
+            <a:spLocks noGrp="1"/>
+          </p:cNvSpPr>
+          <p:nvPr>
+            <p:ph type="body" idx="1"/>
+          </p:nvPr>
+        </p:nvSpPr>
+        <p:spPr/>
+        <p:txBody>
+          <a:bodyPr/>
+          <a:lstStyle/>
+          <a:p>
+            <a:endParaRPr lang="en-US"/>
+          </a:p>
+        </p:txBody>
+      </p:sp>
+      <p:sp>
+        <p:nvSpPr>
+          <p:cNvPr id="5" name="Slide Number Placeholder 4">
+            <a:extLst>
+              <a:ext uri="{FF2B5EF4-FFF2-40B4-BE49-F238E27FC236}">
+                <a16:creationId xmlns:a16="http://schemas.microsoft.com/office/drawing/2014/main" id="{A16825DC-9D9D-4E1A-9AFD-AA673F4A6E6D}"/>
+              </a:ext>
+            </a:extLst>
+          </p:cNvPr>
+          <p:cNvSpPr>
+            <a:spLocks noGrp="1"/>
+          </p:cNvSpPr>
+          <p:nvPr>
+            <p:ph type="sldNum" sz="quarter" idx="12"/>
+          </p:nvPr>
+        </p:nvSpPr>
+        <p:spPr/>
+        <p:txBody>
+          <a:bodyPr/>
+          <a:lstStyle/>
+          <a:p>
+            <a:fld id="{FF88DA20-ED00-471C-9170-60F590CB400A}" type="slidenum">
+              <a:rPr lang="nl-BE" smtClean="0"/>
+              <a:pPr/>
+              <a:t>27</a:t>
+            </a:fld>
+            <a:endParaRPr lang="nl-BE"/>
+          </a:p>
+        </p:txBody>
+      </p:sp>
+      <p:sp>
+        <p:nvSpPr>
+          <p:cNvPr id="6" name="Text Placeholder 5">
+            <a:extLst>
+              <a:ext uri="{FF2B5EF4-FFF2-40B4-BE49-F238E27FC236}">
+                <a16:creationId xmlns:a16="http://schemas.microsoft.com/office/drawing/2014/main" id="{5C7A25BD-74FF-4F3E-A457-7A2EF24BA328}"/>
+              </a:ext>
+            </a:extLst>
+          </p:cNvPr>
+          <p:cNvSpPr>
+            <a:spLocks noGrp="1"/>
+          </p:cNvSpPr>
+          <p:nvPr>
+            <p:ph type="body" sz="quarter" idx="13"/>
+          </p:nvPr>
+        </p:nvSpPr>
+        <p:spPr/>
+        <p:txBody>
+          <a:bodyPr/>
+          <a:lstStyle/>
+          <a:p>
+            <a:r>
+              <a:rPr lang="nl-BE" dirty="0">
+                <a:solidFill>
+                  <a:srgbClr val="0085FE"/>
+                </a:solidFill>
+              </a:rPr>
+              <a:t>8.</a:t>
+            </a:r>
+            <a:endParaRPr lang="en-US" dirty="0">
+              <a:solidFill>
+                <a:srgbClr val="0085FE"/>
+              </a:solidFill>
+            </a:endParaRPr>
+          </a:p>
+        </p:txBody>
+      </p:sp>
+      <p:sp>
+        <p:nvSpPr>
+          <p:cNvPr id="7" name="Footer Placeholder 3">
+            <a:extLst>
+              <a:ext uri="{FF2B5EF4-FFF2-40B4-BE49-F238E27FC236}">
+                <a16:creationId xmlns:a16="http://schemas.microsoft.com/office/drawing/2014/main" id="{7BBB4841-9FC2-490F-83AA-5589FC091688}"/>
+              </a:ext>
+            </a:extLst>
+          </p:cNvPr>
+          <p:cNvSpPr>
+            <a:spLocks noGrp="1"/>
+          </p:cNvSpPr>
+          <p:nvPr>
+            <p:ph type="ftr" sz="quarter" idx="11"/>
+          </p:nvPr>
+        </p:nvSpPr>
+        <p:spPr>
+          <a:xfrm>
+            <a:off x="861246" y="6264211"/>
+            <a:ext cx="4114800" cy="365125"/>
+          </a:xfrm>
+        </p:spPr>
+        <p:txBody>
+          <a:bodyPr/>
+          <a:lstStyle/>
+          <a:p>
+            <a:r>
+              <a:rPr lang="nl-BE" dirty="0"/>
+              <a:t>Ansible</a:t>
+            </a:r>
+          </a:p>
+        </p:txBody>
+      </p:sp>
+      <p:sp>
+        <p:nvSpPr>
+          <p:cNvPr id="8" name="Tijdelijke aanduiding voor datum 1">
+            <a:extLst>
+              <a:ext uri="{FF2B5EF4-FFF2-40B4-BE49-F238E27FC236}">
+                <a16:creationId xmlns:a16="http://schemas.microsoft.com/office/drawing/2014/main" id="{86E517BA-B755-4C37-BB4C-75337E789D27}"/>
+              </a:ext>
+            </a:extLst>
+          </p:cNvPr>
+          <p:cNvSpPr>
+            <a:spLocks noGrp="1"/>
+          </p:cNvSpPr>
+          <p:nvPr>
+            <p:ph type="dt" sz="half" idx="10"/>
+          </p:nvPr>
+        </p:nvSpPr>
+        <p:spPr>
+          <a:xfrm>
+            <a:off x="4998576" y="6264004"/>
+            <a:ext cx="2743200" cy="365125"/>
+          </a:xfrm>
+        </p:spPr>
+        <p:txBody>
+          <a:bodyPr/>
+          <a:lstStyle/>
+          <a:p>
+            <a:r>
+              <a:rPr lang="nl-BE" dirty="0"/>
+              <a:t>31/01/2022</a:t>
+            </a:r>
+          </a:p>
+        </p:txBody>
+      </p:sp>
+    </p:spTree>
+    <p:extLst>
+      <p:ext uri="{BB962C8B-B14F-4D97-AF65-F5344CB8AC3E}">
+        <p14:creationId xmlns:p14="http://schemas.microsoft.com/office/powerpoint/2010/main" val="2591651798"/>
+      </p:ext>
+    </p:extLst>
+  </p:cSld>
+  <p:clrMapOvr>
+    <a:masterClrMapping/>
+  </p:clrMapOvr>
+</p:sld>
+</file>
+
+<file path=ppt/slides/slide28.xml><?xml version="1.0" encoding="utf-8"?>
+<p:sld xmlns:a="http://schemas.openxmlformats.org/drawingml/2006/main" xmlns:r="http://schemas.openxmlformats.org/officeDocument/2006/relationships" xmlns:p="http://schemas.openxmlformats.org/presentationml/2006/main">
+  <p:cSld>
+    <p:spTree>
+      <p:nvGrpSpPr>
+        <p:cNvPr id="1" name=""/>
+        <p:cNvGrpSpPr/>
+        <p:nvPr/>
+      </p:nvGrpSpPr>
+      <p:grpSpPr>
+        <a:xfrm>
+          <a:off x="0" y="0"/>
+          <a:ext cx="0" cy="0"/>
+          <a:chOff x="0" y="0"/>
+          <a:chExt cx="0" cy="0"/>
+        </a:xfrm>
+      </p:grpSpPr>
+      <p:sp>
+        <p:nvSpPr>
+          <p:cNvPr id="2" name="Title 1">
+            <a:extLst>
+              <a:ext uri="{FF2B5EF4-FFF2-40B4-BE49-F238E27FC236}">
+                <a16:creationId xmlns:a16="http://schemas.microsoft.com/office/drawing/2014/main" id="{71FD9B4A-22B3-4B27-8EC6-CB566E6C3ECB}"/>
+              </a:ext>
+            </a:extLst>
+          </p:cNvPr>
+          <p:cNvSpPr>
+            <a:spLocks noGrp="1"/>
+          </p:cNvSpPr>
+          <p:nvPr>
+            <p:ph type="title"/>
+          </p:nvPr>
+        </p:nvSpPr>
+        <p:spPr/>
+        <p:txBody>
+          <a:bodyPr/>
+          <a:lstStyle/>
+          <a:p>
+            <a:r>
+              <a:rPr lang="nl-BE" dirty="0"/>
+              <a:t>Demo</a:t>
+            </a:r>
+            <a:endParaRPr lang="en-US" dirty="0"/>
+          </a:p>
+        </p:txBody>
+      </p:sp>
+      <p:sp>
+        <p:nvSpPr>
+          <p:cNvPr id="3" name="Text Placeholder 2">
+            <a:extLst>
+              <a:ext uri="{FF2B5EF4-FFF2-40B4-BE49-F238E27FC236}">
+                <a16:creationId xmlns:a16="http://schemas.microsoft.com/office/drawing/2014/main" id="{ABAB74AB-067C-475A-80FF-87286C696527}"/>
+              </a:ext>
+            </a:extLst>
+          </p:cNvPr>
+          <p:cNvSpPr>
+            <a:spLocks noGrp="1"/>
+          </p:cNvSpPr>
+          <p:nvPr>
+            <p:ph type="body" idx="1"/>
+          </p:nvPr>
+        </p:nvSpPr>
+        <p:spPr/>
+        <p:txBody>
+          <a:bodyPr/>
+          <a:lstStyle/>
+          <a:p>
+            <a:endParaRPr lang="en-US" dirty="0"/>
+          </a:p>
+        </p:txBody>
+      </p:sp>
+      <p:sp>
+        <p:nvSpPr>
+          <p:cNvPr id="5" name="Slide Number Placeholder 4">
+            <a:extLst>
+              <a:ext uri="{FF2B5EF4-FFF2-40B4-BE49-F238E27FC236}">
+                <a16:creationId xmlns:a16="http://schemas.microsoft.com/office/drawing/2014/main" id="{02D6F86B-6F5D-45E1-B852-6CA617042C82}"/>
+              </a:ext>
+            </a:extLst>
+          </p:cNvPr>
+          <p:cNvSpPr>
+            <a:spLocks noGrp="1"/>
+          </p:cNvSpPr>
+          <p:nvPr>
+            <p:ph type="sldNum" sz="quarter" idx="12"/>
+          </p:nvPr>
+        </p:nvSpPr>
+        <p:spPr/>
+        <p:txBody>
+          <a:bodyPr/>
+          <a:lstStyle/>
+          <a:p>
+            <a:fld id="{FF88DA20-ED00-471C-9170-60F590CB400A}" type="slidenum">
+              <a:rPr lang="nl-BE" smtClean="0"/>
+              <a:pPr/>
+              <a:t>28</a:t>
+            </a:fld>
+            <a:endParaRPr lang="nl-BE"/>
+          </a:p>
+        </p:txBody>
+      </p:sp>
+      <p:sp>
+        <p:nvSpPr>
+          <p:cNvPr id="6" name="Text Placeholder 5">
+            <a:extLst>
+              <a:ext uri="{FF2B5EF4-FFF2-40B4-BE49-F238E27FC236}">
+                <a16:creationId xmlns:a16="http://schemas.microsoft.com/office/drawing/2014/main" id="{0371867E-6B97-4F07-9BD0-C382829AF5AC}"/>
+              </a:ext>
+            </a:extLst>
+          </p:cNvPr>
+          <p:cNvSpPr>
+            <a:spLocks noGrp="1"/>
+          </p:cNvSpPr>
+          <p:nvPr>
+            <p:ph type="body" sz="quarter" idx="13"/>
+          </p:nvPr>
+        </p:nvSpPr>
+        <p:spPr/>
+        <p:txBody>
+          <a:bodyPr/>
+          <a:lstStyle/>
+          <a:p>
+            <a:r>
+              <a:rPr lang="nl-BE" dirty="0">
+                <a:solidFill>
+                  <a:srgbClr val="0085FE"/>
+                </a:solidFill>
+              </a:rPr>
+              <a:t>9.</a:t>
+            </a:r>
+            <a:endParaRPr lang="en-US" dirty="0">
+              <a:solidFill>
+                <a:srgbClr val="0085FE"/>
+              </a:solidFill>
+            </a:endParaRPr>
+          </a:p>
+        </p:txBody>
+      </p:sp>
+      <p:sp>
+        <p:nvSpPr>
+          <p:cNvPr id="7" name="Footer Placeholder 3">
+            <a:extLst>
+              <a:ext uri="{FF2B5EF4-FFF2-40B4-BE49-F238E27FC236}">
+                <a16:creationId xmlns:a16="http://schemas.microsoft.com/office/drawing/2014/main" id="{67CC5EEC-6AE9-490F-8F88-E9F460CE1001}"/>
+              </a:ext>
+            </a:extLst>
+          </p:cNvPr>
+          <p:cNvSpPr>
+            <a:spLocks noGrp="1"/>
+          </p:cNvSpPr>
+          <p:nvPr>
+            <p:ph type="ftr" sz="quarter" idx="11"/>
+          </p:nvPr>
+        </p:nvSpPr>
+        <p:spPr>
+          <a:xfrm>
+            <a:off x="861246" y="6264211"/>
+            <a:ext cx="4114800" cy="365125"/>
+          </a:xfrm>
+        </p:spPr>
+        <p:txBody>
+          <a:bodyPr/>
+          <a:lstStyle/>
+          <a:p>
+            <a:r>
+              <a:rPr lang="nl-BE" dirty="0"/>
+              <a:t>Ansible</a:t>
+            </a:r>
+          </a:p>
+        </p:txBody>
+      </p:sp>
+      <p:sp>
+        <p:nvSpPr>
+          <p:cNvPr id="8" name="Tijdelijke aanduiding voor datum 1">
+            <a:extLst>
+              <a:ext uri="{FF2B5EF4-FFF2-40B4-BE49-F238E27FC236}">
+                <a16:creationId xmlns:a16="http://schemas.microsoft.com/office/drawing/2014/main" id="{071B7CCA-0101-47DF-BDDD-97C3F5ABD31C}"/>
+              </a:ext>
+            </a:extLst>
+          </p:cNvPr>
+          <p:cNvSpPr>
+            <a:spLocks noGrp="1"/>
+          </p:cNvSpPr>
+          <p:nvPr>
+            <p:ph type="dt" sz="half" idx="10"/>
+          </p:nvPr>
+        </p:nvSpPr>
+        <p:spPr>
+          <a:xfrm>
+            <a:off x="4998576" y="6264004"/>
+            <a:ext cx="2743200" cy="365125"/>
+          </a:xfrm>
+        </p:spPr>
+        <p:txBody>
+          <a:bodyPr/>
+          <a:lstStyle/>
+          <a:p>
+            <a:r>
+              <a:rPr lang="nl-BE" dirty="0"/>
+              <a:t>31/01/2022</a:t>
+            </a:r>
+          </a:p>
+        </p:txBody>
+      </p:sp>
+    </p:spTree>
+    <p:extLst>
+      <p:ext uri="{BB962C8B-B14F-4D97-AF65-F5344CB8AC3E}">
+        <p14:creationId xmlns:p14="http://schemas.microsoft.com/office/powerpoint/2010/main" val="3975158961"/>
+      </p:ext>
+    </p:extLst>
+  </p:cSld>
+  <p:clrMapOvr>
+    <a:masterClrMapping/>
+  </p:clrMapOvr>
+</p:sld>
+</file>
+
+<file path=ppt/slides/slide29.xml><?xml version="1.0" encoding="utf-8"?>
+<p:sld xmlns:a="http://schemas.openxmlformats.org/drawingml/2006/main" xmlns:r="http://schemas.openxmlformats.org/officeDocument/2006/relationships" xmlns:p="http://schemas.openxmlformats.org/presentationml/2006/main">
+  <p:cSld>
+    <p:spTree>
+      <p:nvGrpSpPr>
+        <p:cNvPr id="1" name=""/>
+        <p:cNvGrpSpPr/>
+        <p:nvPr/>
+      </p:nvGrpSpPr>
+      <p:grpSpPr>
+        <a:xfrm>
+          <a:off x="0" y="0"/>
+          <a:ext cx="0" cy="0"/>
+          <a:chOff x="0" y="0"/>
+          <a:chExt cx="0" cy="0"/>
+        </a:xfrm>
+      </p:grpSpPr>
+      <p:sp>
+        <p:nvSpPr>
+          <p:cNvPr id="2" name="Title 1">
+            <a:extLst>
+              <a:ext uri="{FF2B5EF4-FFF2-40B4-BE49-F238E27FC236}">
+                <a16:creationId xmlns:a16="http://schemas.microsoft.com/office/drawing/2014/main" id="{C0CA5DA5-C036-4684-B395-A2B54100B73E}"/>
+              </a:ext>
+            </a:extLst>
+          </p:cNvPr>
+          <p:cNvSpPr>
+            <a:spLocks noGrp="1"/>
+          </p:cNvSpPr>
+          <p:nvPr>
+            <p:ph type="title"/>
+          </p:nvPr>
+        </p:nvSpPr>
+        <p:spPr/>
+        <p:txBody>
+          <a:bodyPr/>
+          <a:lstStyle/>
+          <a:p>
+            <a:endParaRPr lang="en-US"/>
+          </a:p>
+        </p:txBody>
+      </p:sp>
+      <p:sp>
+        <p:nvSpPr>
+          <p:cNvPr id="3" name="Content Placeholder 2">
+            <a:extLst>
+              <a:ext uri="{FF2B5EF4-FFF2-40B4-BE49-F238E27FC236}">
+                <a16:creationId xmlns:a16="http://schemas.microsoft.com/office/drawing/2014/main" id="{6BB7156A-B72D-4860-81A1-650099E4CA1D}"/>
+              </a:ext>
+            </a:extLst>
+          </p:cNvPr>
+          <p:cNvSpPr>
+            <a:spLocks noGrp="1"/>
+          </p:cNvSpPr>
+          <p:nvPr>
+            <p:ph idx="1"/>
+          </p:nvPr>
+        </p:nvSpPr>
+        <p:spPr/>
+        <p:txBody>
+          <a:bodyPr/>
+          <a:lstStyle/>
+          <a:p>
+            <a:endParaRPr lang="en-US"/>
+          </a:p>
+        </p:txBody>
+      </p:sp>
+      <p:sp>
+        <p:nvSpPr>
+          <p:cNvPr id="4" name="Footer Placeholder 3">
+            <a:extLst>
+              <a:ext uri="{FF2B5EF4-FFF2-40B4-BE49-F238E27FC236}">
+                <a16:creationId xmlns:a16="http://schemas.microsoft.com/office/drawing/2014/main" id="{80F1881B-72D4-442C-AFDA-B56DEF22CFC7}"/>
+              </a:ext>
+            </a:extLst>
+          </p:cNvPr>
+          <p:cNvSpPr>
+            <a:spLocks noGrp="1"/>
+          </p:cNvSpPr>
+          <p:nvPr>
+            <p:ph type="ftr" sz="quarter" idx="11"/>
+          </p:nvPr>
+        </p:nvSpPr>
+        <p:spPr/>
+        <p:txBody>
+          <a:bodyPr/>
+          <a:lstStyle/>
+          <a:p>
+            <a:r>
+              <a:rPr lang="nl-BE"/>
+              <a:t>Titel van de presentatie</a:t>
+            </a:r>
+          </a:p>
+        </p:txBody>
+      </p:sp>
+      <p:sp>
+        <p:nvSpPr>
+          <p:cNvPr id="5" name="Slide Number Placeholder 4">
+            <a:extLst>
+              <a:ext uri="{FF2B5EF4-FFF2-40B4-BE49-F238E27FC236}">
+                <a16:creationId xmlns:a16="http://schemas.microsoft.com/office/drawing/2014/main" id="{EA65554E-54D4-4B45-9ED8-B19774FC2A6D}"/>
+              </a:ext>
+            </a:extLst>
+          </p:cNvPr>
+          <p:cNvSpPr>
+            <a:spLocks noGrp="1"/>
+          </p:cNvSpPr>
+          <p:nvPr>
+            <p:ph type="sldNum" sz="quarter" idx="12"/>
+          </p:nvPr>
+        </p:nvSpPr>
+        <p:spPr/>
+        <p:txBody>
+          <a:bodyPr/>
+          <a:lstStyle/>
+          <a:p>
+            <a:fld id="{FF88DA20-ED00-471C-9170-60F590CB400A}" type="slidenum">
+              <a:rPr lang="nl-BE" smtClean="0"/>
+              <a:t>29</a:t>
+            </a:fld>
+            <a:endParaRPr lang="nl-BE"/>
+          </a:p>
+        </p:txBody>
+      </p:sp>
+      <p:sp>
+        <p:nvSpPr>
+          <p:cNvPr id="6" name="Text Placeholder 5">
+            <a:extLst>
+              <a:ext uri="{FF2B5EF4-FFF2-40B4-BE49-F238E27FC236}">
+                <a16:creationId xmlns:a16="http://schemas.microsoft.com/office/drawing/2014/main" id="{7178E282-D5ED-46AF-AC21-8E478FBDA844}"/>
+              </a:ext>
+            </a:extLst>
+          </p:cNvPr>
+          <p:cNvSpPr>
+            <a:spLocks noGrp="1"/>
+          </p:cNvSpPr>
+          <p:nvPr>
+            <p:ph type="body" sz="quarter" idx="13"/>
+          </p:nvPr>
+        </p:nvSpPr>
+        <p:spPr/>
+        <p:txBody>
+          <a:bodyPr/>
+          <a:lstStyle/>
+          <a:p>
+            <a:endParaRPr lang="en-US"/>
+          </a:p>
+        </p:txBody>
+      </p:sp>
+    </p:spTree>
+    <p:extLst>
+      <p:ext uri="{BB962C8B-B14F-4D97-AF65-F5344CB8AC3E}">
+        <p14:creationId xmlns:p14="http://schemas.microsoft.com/office/powerpoint/2010/main" val="791299812"/>
       </p:ext>
     </p:extLst>
   </p:cSld>
@@ -12994,6 +13935,173 @@
     <p:extLst>
       <p:ext uri="{BB962C8B-B14F-4D97-AF65-F5344CB8AC3E}">
         <p14:creationId xmlns:p14="http://schemas.microsoft.com/office/powerpoint/2010/main" val="2087987959"/>
+      </p:ext>
+    </p:extLst>
+  </p:cSld>
+  <p:clrMapOvr>
+    <a:masterClrMapping/>
+  </p:clrMapOvr>
+</p:sld>
+</file>
+
+<file path=ppt/slides/slide30.xml><?xml version="1.0" encoding="utf-8"?>
+<p:sld xmlns:a="http://schemas.openxmlformats.org/drawingml/2006/main" xmlns:r="http://schemas.openxmlformats.org/officeDocument/2006/relationships" xmlns:p="http://schemas.openxmlformats.org/presentationml/2006/main">
+  <p:cSld>
+    <p:spTree>
+      <p:nvGrpSpPr>
+        <p:cNvPr id="1" name=""/>
+        <p:cNvGrpSpPr/>
+        <p:nvPr/>
+      </p:nvGrpSpPr>
+      <p:grpSpPr>
+        <a:xfrm>
+          <a:off x="0" y="0"/>
+          <a:ext cx="0" cy="0"/>
+          <a:chOff x="0" y="0"/>
+          <a:chExt cx="0" cy="0"/>
+        </a:xfrm>
+      </p:grpSpPr>
+      <p:sp>
+        <p:nvSpPr>
+          <p:cNvPr id="2" name="Title 1">
+            <a:extLst>
+              <a:ext uri="{FF2B5EF4-FFF2-40B4-BE49-F238E27FC236}">
+                <a16:creationId xmlns:a16="http://schemas.microsoft.com/office/drawing/2014/main" id="{A0A4361E-379E-456A-82BC-335114F04C17}"/>
+              </a:ext>
+            </a:extLst>
+          </p:cNvPr>
+          <p:cNvSpPr>
+            <a:spLocks noGrp="1"/>
+          </p:cNvSpPr>
+          <p:nvPr>
+            <p:ph type="title"/>
+          </p:nvPr>
+        </p:nvSpPr>
+        <p:spPr/>
+        <p:txBody>
+          <a:bodyPr/>
+          <a:lstStyle/>
+          <a:p>
+            <a:r>
+              <a:rPr lang="nl-BE" dirty="0">
+                <a:solidFill>
+                  <a:srgbClr val="0085FE"/>
+                </a:solidFill>
+              </a:rPr>
+              <a:t>Refferences</a:t>
+            </a:r>
+            <a:endParaRPr lang="en-US" dirty="0">
+              <a:solidFill>
+                <a:srgbClr val="0085FE"/>
+              </a:solidFill>
+            </a:endParaRPr>
+          </a:p>
+        </p:txBody>
+      </p:sp>
+      <p:sp>
+        <p:nvSpPr>
+          <p:cNvPr id="3" name="Content Placeholder 2">
+            <a:extLst>
+              <a:ext uri="{FF2B5EF4-FFF2-40B4-BE49-F238E27FC236}">
+                <a16:creationId xmlns:a16="http://schemas.microsoft.com/office/drawing/2014/main" id="{58A98F98-F3F6-4D48-8A93-A83BE333E12E}"/>
+              </a:ext>
+            </a:extLst>
+          </p:cNvPr>
+          <p:cNvSpPr>
+            <a:spLocks noGrp="1"/>
+          </p:cNvSpPr>
+          <p:nvPr>
+            <p:ph idx="1"/>
+          </p:nvPr>
+        </p:nvSpPr>
+        <p:spPr/>
+        <p:txBody>
+          <a:bodyPr/>
+          <a:lstStyle/>
+          <a:p>
+            <a:pPr marL="457200" indent="-457200">
+              <a:buFont typeface="Arial" panose="020B0604020202020204" pitchFamily="34" charset="0"/>
+              <a:buChar char="•"/>
+            </a:pPr>
+            <a:r>
+              <a:rPr lang="nl-BE" dirty="0"/>
+              <a:t>- Figure Ansible Architecture: </a:t>
+            </a:r>
+            <a:r>
+              <a:rPr lang="nl-BE" dirty="0">
+                <a:hlinkClick r:id="rId2"/>
+              </a:rPr>
+              <a:t>https://www.linkedin.com/pulse/how-industries-solving-challenges-using-ansible-shalini-rana</a:t>
+            </a:r>
+            <a:r>
+              <a:rPr lang="nl-BE" dirty="0"/>
+              <a:t> </a:t>
+            </a:r>
+            <a:endParaRPr lang="en-US" dirty="0"/>
+          </a:p>
+        </p:txBody>
+      </p:sp>
+      <p:sp>
+        <p:nvSpPr>
+          <p:cNvPr id="4" name="Footer Placeholder 3">
+            <a:extLst>
+              <a:ext uri="{FF2B5EF4-FFF2-40B4-BE49-F238E27FC236}">
+                <a16:creationId xmlns:a16="http://schemas.microsoft.com/office/drawing/2014/main" id="{7C6F3A2E-2A91-4DE3-9CEB-AC7F46DF3ECA}"/>
+              </a:ext>
+            </a:extLst>
+          </p:cNvPr>
+          <p:cNvSpPr>
+            <a:spLocks noGrp="1"/>
+          </p:cNvSpPr>
+          <p:nvPr>
+            <p:ph type="ftr" sz="quarter" idx="11"/>
+          </p:nvPr>
+        </p:nvSpPr>
+        <p:spPr/>
+        <p:txBody>
+          <a:bodyPr/>
+          <a:lstStyle/>
+          <a:p>
+            <a:r>
+              <a:rPr lang="nl-BE"/>
+              <a:t>Titel van de presentatie</a:t>
+            </a:r>
+          </a:p>
+        </p:txBody>
+      </p:sp>
+      <p:sp>
+        <p:nvSpPr>
+          <p:cNvPr id="5" name="Slide Number Placeholder 4">
+            <a:extLst>
+              <a:ext uri="{FF2B5EF4-FFF2-40B4-BE49-F238E27FC236}">
+                <a16:creationId xmlns:a16="http://schemas.microsoft.com/office/drawing/2014/main" id="{3349D7CC-7E04-49D2-A02E-DF8FCBEF1041}"/>
+              </a:ext>
+            </a:extLst>
+          </p:cNvPr>
+          <p:cNvSpPr>
+            <a:spLocks noGrp="1"/>
+          </p:cNvSpPr>
+          <p:nvPr>
+            <p:ph type="sldNum" sz="quarter" idx="12"/>
+          </p:nvPr>
+        </p:nvSpPr>
+        <p:spPr/>
+        <p:txBody>
+          <a:bodyPr/>
+          <a:lstStyle/>
+          <a:p>
+            <a:fld id="{FF88DA20-ED00-471C-9170-60F590CB400A}" type="slidenum">
+              <a:rPr lang="nl-BE" smtClean="0"/>
+              <a:t>30</a:t>
+            </a:fld>
+            <a:endParaRPr lang="nl-BE"/>
+          </a:p>
+        </p:txBody>
+      </p:sp>
+    </p:spTree>
+    <p:extLst>
+      <p:ext uri="{BB962C8B-B14F-4D97-AF65-F5344CB8AC3E}">
+        <p14:creationId xmlns:p14="http://schemas.microsoft.com/office/powerpoint/2010/main" val="3070564893"/>
       </p:ext>
     </p:extLst>
   </p:cSld>
@@ -14351,12 +15459,134 @@
           </a:p>
         </p:txBody>
       </p:sp>
+      <p:sp>
+        <p:nvSpPr>
+          <p:cNvPr id="2" name="TextBox 1">
+            <a:extLst>
+              <a:ext uri="{FF2B5EF4-FFF2-40B4-BE49-F238E27FC236}">
+                <a16:creationId xmlns:a16="http://schemas.microsoft.com/office/drawing/2014/main" id="{C7C5B250-4184-42DF-BE84-07E9B9E97572}"/>
+              </a:ext>
+            </a:extLst>
+          </p:cNvPr>
+          <p:cNvSpPr txBox="1"/>
+          <p:nvPr/>
+        </p:nvSpPr>
+        <p:spPr>
+          <a:xfrm>
+            <a:off x="122311" y="1126264"/>
+            <a:ext cx="6041421" cy="4708981"/>
+          </a:xfrm>
+          <a:prstGeom prst="rect">
+            <a:avLst/>
+          </a:prstGeom>
+          <a:noFill/>
+        </p:spPr>
+        <p:txBody>
+          <a:bodyPr wrap="square" rtlCol="0">
+            <a:spAutoFit/>
+          </a:bodyPr>
+          <a:lstStyle/>
+          <a:p>
+            <a:r>
+              <a:rPr lang="nl-BE" sz="2400" b="1" dirty="0">
+                <a:latin typeface="+mj-lt"/>
+              </a:rPr>
+              <a:t>Most in portant files</a:t>
+            </a:r>
+          </a:p>
+          <a:p>
+            <a:pPr marL="914400" lvl="1" indent="-457200">
+              <a:buFont typeface="Arial" panose="020B0604020202020204" pitchFamily="34" charset="0"/>
+              <a:buChar char="•"/>
+            </a:pPr>
+            <a:r>
+              <a:rPr lang="nl-BE" sz="2400" dirty="0"/>
+              <a:t>Ansible.cfg</a:t>
+            </a:r>
+          </a:p>
+          <a:p>
+            <a:pPr marL="914400" lvl="1" indent="-457200">
+              <a:buFont typeface="Arial" panose="020B0604020202020204" pitchFamily="34" charset="0"/>
+              <a:buChar char="•"/>
+            </a:pPr>
+            <a:r>
+              <a:rPr lang="nl-BE" sz="2400" dirty="0"/>
+              <a:t>Hosts/inventory</a:t>
+            </a:r>
+          </a:p>
+          <a:p>
+            <a:pPr marL="914400" lvl="1" indent="-457200">
+              <a:buFont typeface="Arial" panose="020B0604020202020204" pitchFamily="34" charset="0"/>
+              <a:buChar char="•"/>
+            </a:pPr>
+            <a:r>
+              <a:rPr lang="nl-BE" sz="2400" dirty="0"/>
+              <a:t>Playbook.yml</a:t>
+            </a:r>
+          </a:p>
+          <a:p>
+            <a:pPr lvl="1"/>
+            <a:endParaRPr lang="nl-BE" sz="2400" dirty="0"/>
+          </a:p>
+          <a:p>
+            <a:r>
+              <a:rPr lang="nl-BE" sz="2400" b="1" dirty="0">
+                <a:latin typeface="+mj-lt"/>
+              </a:rPr>
+              <a:t>What do they contain</a:t>
+            </a:r>
+          </a:p>
+          <a:p>
+            <a:pPr marL="914400" lvl="1" indent="-457200">
+              <a:buFont typeface="Arial" panose="020B0604020202020204" pitchFamily="34" charset="0"/>
+              <a:buChar char="•"/>
+            </a:pPr>
+            <a:r>
+              <a:rPr lang="nl-BE" sz="2400" dirty="0"/>
+              <a:t>Ansible.cfg = config</a:t>
+            </a:r>
+          </a:p>
+          <a:p>
+            <a:pPr marL="914400" lvl="1" indent="-457200">
+              <a:buFont typeface="Arial" panose="020B0604020202020204" pitchFamily="34" charset="0"/>
+              <a:buChar char="•"/>
+            </a:pPr>
+            <a:r>
+              <a:rPr lang="nl-BE" sz="2400" dirty="0"/>
+              <a:t>Hosts = List of nodes</a:t>
+            </a:r>
+          </a:p>
+          <a:p>
+            <a:pPr marL="914400" lvl="1" indent="-457200">
+              <a:buFont typeface="Arial" panose="020B0604020202020204" pitchFamily="34" charset="0"/>
+              <a:buChar char="•"/>
+            </a:pPr>
+            <a:r>
+              <a:rPr lang="nl-BE" sz="2400" dirty="0"/>
+              <a:t>Playbook = instructions to perform</a:t>
+            </a:r>
+          </a:p>
+          <a:p>
+            <a:endParaRPr lang="nl-BE" sz="2800" dirty="0"/>
+          </a:p>
+          <a:p>
+            <a:endParaRPr lang="nl-BE" sz="2800" dirty="0"/>
+          </a:p>
+          <a:p>
+            <a:pPr marL="457200" indent="-457200">
+              <a:buFont typeface="Arial" panose="020B0604020202020204" pitchFamily="34" charset="0"/>
+              <a:buChar char="•"/>
+            </a:pPr>
+            <a:endParaRPr lang="nl-BE" sz="2800" dirty="0"/>
+          </a:p>
+        </p:txBody>
+      </p:sp>
       <p:pic>
         <p:nvPicPr>
-          <p:cNvPr id="10" name="Picture 9" descr="A screenshot of a computer&#10;&#10;Description automatically generated with low confidence">
-            <a:extLst>
-              <a:ext uri="{FF2B5EF4-FFF2-40B4-BE49-F238E27FC236}">
-                <a16:creationId xmlns:a16="http://schemas.microsoft.com/office/drawing/2014/main" id="{79C1FF88-7265-4B08-B688-5E03DBAE1C4B}"/>
+          <p:cNvPr id="7" name="Picture 6" descr="A screenshot of a computer&#10;&#10;Description automatically generated with low confidence">
+            <a:extLst>
+              <a:ext uri="{FF2B5EF4-FFF2-40B4-BE49-F238E27FC236}">
+                <a16:creationId xmlns:a16="http://schemas.microsoft.com/office/drawing/2014/main" id="{E653210C-A24A-4B0B-9524-9D98F3801CB4}"/>
               </a:ext>
             </a:extLst>
           </p:cNvPr>
@@ -14387,128 +15617,6 @@
           </a:prstGeom>
         </p:spPr>
       </p:pic>
-      <p:sp>
-        <p:nvSpPr>
-          <p:cNvPr id="2" name="TextBox 1">
-            <a:extLst>
-              <a:ext uri="{FF2B5EF4-FFF2-40B4-BE49-F238E27FC236}">
-                <a16:creationId xmlns:a16="http://schemas.microsoft.com/office/drawing/2014/main" id="{C7C5B250-4184-42DF-BE84-07E9B9E97572}"/>
-              </a:ext>
-            </a:extLst>
-          </p:cNvPr>
-          <p:cNvSpPr txBox="1"/>
-          <p:nvPr/>
-        </p:nvSpPr>
-        <p:spPr>
-          <a:xfrm>
-            <a:off x="122311" y="1126264"/>
-            <a:ext cx="6041421" cy="4832092"/>
-          </a:xfrm>
-          <a:prstGeom prst="rect">
-            <a:avLst/>
-          </a:prstGeom>
-          <a:noFill/>
-        </p:spPr>
-        <p:txBody>
-          <a:bodyPr wrap="square" rtlCol="0">
-            <a:spAutoFit/>
-          </a:bodyPr>
-          <a:lstStyle/>
-          <a:p>
-            <a:pPr marL="457200" indent="-457200">
-              <a:buFont typeface="Arial" panose="020B0604020202020204" pitchFamily="34" charset="0"/>
-              <a:buChar char="•"/>
-            </a:pPr>
-            <a:r>
-              <a:rPr lang="nl-BE" sz="2800" b="1" dirty="0"/>
-              <a:t>Most in portant files</a:t>
-            </a:r>
-          </a:p>
-          <a:p>
-            <a:pPr marL="914400" lvl="1" indent="-457200">
-              <a:buFont typeface="Arial" panose="020B0604020202020204" pitchFamily="34" charset="0"/>
-              <a:buChar char="•"/>
-            </a:pPr>
-            <a:r>
-              <a:rPr lang="nl-BE" sz="2800" dirty="0"/>
-              <a:t>Ansible.cfg</a:t>
-            </a:r>
-          </a:p>
-          <a:p>
-            <a:pPr marL="914400" lvl="1" indent="-457200">
-              <a:buFont typeface="Arial" panose="020B0604020202020204" pitchFamily="34" charset="0"/>
-              <a:buChar char="•"/>
-            </a:pPr>
-            <a:r>
-              <a:rPr lang="nl-BE" sz="2800" dirty="0"/>
-              <a:t>Hosts/inventory</a:t>
-            </a:r>
-          </a:p>
-          <a:p>
-            <a:pPr marL="914400" lvl="1" indent="-457200">
-              <a:buFont typeface="Arial" panose="020B0604020202020204" pitchFamily="34" charset="0"/>
-              <a:buChar char="•"/>
-            </a:pPr>
-            <a:r>
-              <a:rPr lang="nl-BE" sz="2800" dirty="0"/>
-              <a:t>Playbook.yml</a:t>
-            </a:r>
-          </a:p>
-          <a:p>
-            <a:pPr marL="457200" indent="-457200">
-              <a:buFont typeface="Arial" panose="020B0604020202020204" pitchFamily="34" charset="0"/>
-              <a:buChar char="•"/>
-            </a:pPr>
-            <a:r>
-              <a:rPr lang="nl-BE" sz="2800" b="1" dirty="0"/>
-              <a:t>What do they contain</a:t>
-            </a:r>
-          </a:p>
-          <a:p>
-            <a:pPr marL="914400" lvl="1" indent="-457200">
-              <a:buFont typeface="Arial" panose="020B0604020202020204" pitchFamily="34" charset="0"/>
-              <a:buChar char="•"/>
-            </a:pPr>
-            <a:r>
-              <a:rPr lang="nl-BE" sz="2800" dirty="0"/>
-              <a:t>Ansible.cfg = config</a:t>
-            </a:r>
-          </a:p>
-          <a:p>
-            <a:pPr marL="914400" lvl="1" indent="-457200">
-              <a:buFont typeface="Arial" panose="020B0604020202020204" pitchFamily="34" charset="0"/>
-              <a:buChar char="•"/>
-            </a:pPr>
-            <a:r>
-              <a:rPr lang="nl-BE" sz="2800" dirty="0"/>
-              <a:t>Hosts = List of nodes</a:t>
-            </a:r>
-          </a:p>
-          <a:p>
-            <a:pPr marL="914400" lvl="1" indent="-457200">
-              <a:buFont typeface="Arial" panose="020B0604020202020204" pitchFamily="34" charset="0"/>
-              <a:buChar char="•"/>
-            </a:pPr>
-            <a:r>
-              <a:rPr lang="nl-BE" sz="2800" dirty="0"/>
-              <a:t>Playbook = instructions to perform</a:t>
-            </a:r>
-          </a:p>
-          <a:p>
-            <a:endParaRPr lang="nl-BE" sz="2800" dirty="0"/>
-          </a:p>
-          <a:p>
-            <a:endParaRPr lang="nl-BE" sz="2800" dirty="0"/>
-          </a:p>
-          <a:p>
-            <a:pPr marL="457200" indent="-457200">
-              <a:buFont typeface="Arial" panose="020B0604020202020204" pitchFamily="34" charset="0"/>
-              <a:buChar char="•"/>
-            </a:pPr>
-            <a:endParaRPr lang="nl-BE" sz="2800" dirty="0"/>
-          </a:p>
-        </p:txBody>
-      </p:sp>
     </p:spTree>
     <p:extLst>
       <p:ext uri="{BB962C8B-B14F-4D97-AF65-F5344CB8AC3E}">

</xml_diff>

<commit_message>
update PPT with spelling fix and update .pdf version
</commit_message>
<xml_diff>
--- a/Documents/Ansible_BasicsAndHowToGetStarted.pptx
+++ b/Documents/Ansible_BasicsAndHowToGetStarted.pptx
@@ -5,7 +5,7 @@
     <p:sldMasterId id="2147483648" r:id="rId1"/>
   </p:sldMasterIdLst>
   <p:notesMasterIdLst>
-    <p:notesMasterId r:id="rId47"/>
+    <p:notesMasterId r:id="rId46"/>
   </p:notesMasterIdLst>
   <p:sldIdLst>
     <p:sldId id="261" r:id="rId2"/>
@@ -45,14 +45,13 @@
     <p:sldId id="322" r:id="rId36"/>
     <p:sldId id="308" r:id="rId37"/>
     <p:sldId id="293" r:id="rId38"/>
-    <p:sldId id="318" r:id="rId39"/>
-    <p:sldId id="310" r:id="rId40"/>
-    <p:sldId id="312" r:id="rId41"/>
-    <p:sldId id="306" r:id="rId42"/>
-    <p:sldId id="320" r:id="rId43"/>
-    <p:sldId id="309" r:id="rId44"/>
-    <p:sldId id="321" r:id="rId45"/>
-    <p:sldId id="279" r:id="rId46"/>
+    <p:sldId id="310" r:id="rId39"/>
+    <p:sldId id="312" r:id="rId40"/>
+    <p:sldId id="306" r:id="rId41"/>
+    <p:sldId id="320" r:id="rId42"/>
+    <p:sldId id="309" r:id="rId43"/>
+    <p:sldId id="321" r:id="rId44"/>
+    <p:sldId id="279" r:id="rId45"/>
   </p:sldIdLst>
   <p:sldSz cx="12192000" cy="6858000"/>
   <p:notesSz cx="6858000" cy="9144000"/>
@@ -14278,8 +14277,8 @@
           <a:lstStyle/>
           <a:p>
             <a:r>
-              <a:rPr lang="nl-BE"/>
-              <a:t>Titel van de presentatie</a:t>
+              <a:rPr lang="nl-BE" dirty="0"/>
+              <a:t>Ansible - Introduction</a:t>
             </a:r>
           </a:p>
         </p:txBody>
@@ -17083,7 +17082,7 @@
           <p:cNvPr id="2" name="Title 1">
             <a:extLst>
               <a:ext uri="{FF2B5EF4-FFF2-40B4-BE49-F238E27FC236}">
-                <a16:creationId xmlns:a16="http://schemas.microsoft.com/office/drawing/2014/main" id="{71FD9B4A-22B3-4B27-8EC6-CB566E6C3ECB}"/>
+                <a16:creationId xmlns:a16="http://schemas.microsoft.com/office/drawing/2014/main" id="{5AACE6E1-6A5D-4254-BDA8-C75CD8A44ED8}"/>
               </a:ext>
             </a:extLst>
           </p:cNvPr>
@@ -17105,7 +17104,7 @@
                   <a:srgbClr val="0085FE"/>
                 </a:solidFill>
               </a:rPr>
-              <a:t>Purpose of playbook</a:t>
+              <a:t>How are devices called upon</a:t>
             </a:r>
             <a:endParaRPr lang="en-US" dirty="0">
               <a:solidFill>
@@ -17117,18 +17116,92 @@
       </p:sp>
       <p:sp>
         <p:nvSpPr>
-          <p:cNvPr id="8" name="Tijdelijke aanduiding voor datum 1">
-            <a:extLst>
-              <a:ext uri="{FF2B5EF4-FFF2-40B4-BE49-F238E27FC236}">
-                <a16:creationId xmlns:a16="http://schemas.microsoft.com/office/drawing/2014/main" id="{071B7CCA-0101-47DF-BDDD-97C3F5ABD31C}"/>
-              </a:ext>
-            </a:extLst>
-          </p:cNvPr>
-          <p:cNvSpPr>
-            <a:spLocks noGrp="1"/>
-          </p:cNvSpPr>
-          <p:nvPr>
-            <p:ph type="dt" sz="half" idx="10"/>
+          <p:cNvPr id="3" name="Content Placeholder 2">
+            <a:extLst>
+              <a:ext uri="{FF2B5EF4-FFF2-40B4-BE49-F238E27FC236}">
+                <a16:creationId xmlns:a16="http://schemas.microsoft.com/office/drawing/2014/main" id="{FE17825A-63CE-4FE3-9311-77AAE3A9A027}"/>
+              </a:ext>
+            </a:extLst>
+          </p:cNvPr>
+          <p:cNvSpPr>
+            <a:spLocks noGrp="1"/>
+          </p:cNvSpPr>
+          <p:nvPr>
+            <p:ph idx="1"/>
+          </p:nvPr>
+        </p:nvSpPr>
+        <p:spPr>
+          <a:xfrm>
+            <a:off x="534291" y="1451443"/>
+            <a:ext cx="9281274" cy="3090532"/>
+          </a:xfrm>
+        </p:spPr>
+        <p:txBody>
+          <a:bodyPr/>
+          <a:lstStyle/>
+          <a:p>
+            <a:pPr marL="457200" indent="-457200">
+              <a:buFont typeface="Arial" panose="020B0604020202020204" pitchFamily="34" charset="0"/>
+              <a:buChar char="•"/>
+            </a:pPr>
+            <a:r>
+              <a:rPr lang="nl-BE" sz="2000" dirty="0"/>
+              <a:t>With use of the file/inventory file</a:t>
+            </a:r>
+          </a:p>
+          <a:p>
+            <a:pPr marL="815363" lvl="1" indent="-457200">
+              <a:buFont typeface="Arial" panose="020B0604020202020204" pitchFamily="34" charset="0"/>
+              <a:buChar char="•"/>
+            </a:pPr>
+            <a:r>
+              <a:rPr lang="nl-BE" sz="2000" dirty="0"/>
+              <a:t>Host-ID’s are for individual plays/tasks</a:t>
+            </a:r>
+          </a:p>
+          <a:p>
+            <a:pPr marL="815363" lvl="1" indent="-457200">
+              <a:buFont typeface="Arial" panose="020B0604020202020204" pitchFamily="34" charset="0"/>
+              <a:buChar char="•"/>
+            </a:pPr>
+            <a:r>
+              <a:rPr lang="nl-BE" sz="2000" dirty="0"/>
+              <a:t>Group name’s are for common plays</a:t>
+            </a:r>
+          </a:p>
+          <a:p>
+            <a:pPr marL="815363" lvl="1" indent="-457200">
+              <a:buFont typeface="Arial" panose="020B0604020202020204" pitchFamily="34" charset="0"/>
+              <a:buChar char="•"/>
+            </a:pPr>
+            <a:r>
+              <a:rPr lang="en-US" sz="2000" dirty="0"/>
+              <a:t>Variables are for groups or </a:t>
+            </a:r>
+          </a:p>
+          <a:p>
+            <a:pPr lvl="1"/>
+            <a:r>
+              <a:rPr lang="en-US" sz="2000" dirty="0"/>
+              <a:t>individual hosts (caution for spacing!)</a:t>
+            </a:r>
+          </a:p>
+        </p:txBody>
+      </p:sp>
+      <p:sp>
+        <p:nvSpPr>
+          <p:cNvPr id="4" name="Footer Placeholder 3">
+            <a:extLst>
+              <a:ext uri="{FF2B5EF4-FFF2-40B4-BE49-F238E27FC236}">
+                <a16:creationId xmlns:a16="http://schemas.microsoft.com/office/drawing/2014/main" id="{21588CFD-6B99-4D26-9B8E-BC7163B80B98}"/>
+              </a:ext>
+            </a:extLst>
+          </p:cNvPr>
+          <p:cNvSpPr>
+            <a:spLocks noGrp="1"/>
+          </p:cNvSpPr>
+          <p:nvPr>
+            <p:ph type="ftr" sz="quarter" idx="11"/>
           </p:nvPr>
         </p:nvSpPr>
         <p:spPr/>
@@ -17138,34 +17211,6 @@
           <a:p>
             <a:r>
               <a:rPr lang="nl-BE" dirty="0"/>
-              <a:t>31/01/2022</a:t>
-            </a:r>
-          </a:p>
-        </p:txBody>
-      </p:sp>
-      <p:sp>
-        <p:nvSpPr>
-          <p:cNvPr id="7" name="Footer Placeholder 3">
-            <a:extLst>
-              <a:ext uri="{FF2B5EF4-FFF2-40B4-BE49-F238E27FC236}">
-                <a16:creationId xmlns:a16="http://schemas.microsoft.com/office/drawing/2014/main" id="{67CC5EEC-6AE9-490F-8F88-E9F460CE1001}"/>
-              </a:ext>
-            </a:extLst>
-          </p:cNvPr>
-          <p:cNvSpPr>
-            <a:spLocks noGrp="1"/>
-          </p:cNvSpPr>
-          <p:nvPr>
-            <p:ph type="ftr" sz="quarter" idx="11"/>
-          </p:nvPr>
-        </p:nvSpPr>
-        <p:spPr/>
-        <p:txBody>
-          <a:bodyPr/>
-          <a:lstStyle/>
-          <a:p>
-            <a:r>
-              <a:rPr lang="en-US" dirty="0"/>
               <a:t>Ansible - Introduction</a:t>
             </a:r>
           </a:p>
@@ -17176,7 +17221,7 @@
           <p:cNvPr id="5" name="Slide Number Placeholder 4">
             <a:extLst>
               <a:ext uri="{FF2B5EF4-FFF2-40B4-BE49-F238E27FC236}">
-                <a16:creationId xmlns:a16="http://schemas.microsoft.com/office/drawing/2014/main" id="{02D6F86B-6F5D-45E1-B852-6CA617042C82}"/>
+                <a16:creationId xmlns:a16="http://schemas.microsoft.com/office/drawing/2014/main" id="{94A5AC1C-092E-4EC9-BA7C-4F212D666B50}"/>
               </a:ext>
             </a:extLst>
           </p:cNvPr>
@@ -17194,7 +17239,6 @@
           <a:p>
             <a:fld id="{FF88DA20-ED00-471C-9170-60F590CB400A}" type="slidenum">
               <a:rPr lang="nl-BE" smtClean="0"/>
-              <a:pPr/>
               <a:t>38</a:t>
             </a:fld>
             <a:endParaRPr lang="nl-BE"/>
@@ -17203,10 +17247,10 @@
       </p:sp>
       <p:pic>
         <p:nvPicPr>
-          <p:cNvPr id="3" name="Picture 2">
-            <a:extLst>
-              <a:ext uri="{FF2B5EF4-FFF2-40B4-BE49-F238E27FC236}">
-                <a16:creationId xmlns:a16="http://schemas.microsoft.com/office/drawing/2014/main" id="{D3412B10-F8EC-4ECD-9FB4-92DBFB0BF662}"/>
+          <p:cNvPr id="10" name="Picture 9">
+            <a:extLst>
+              <a:ext uri="{FF2B5EF4-FFF2-40B4-BE49-F238E27FC236}">
+                <a16:creationId xmlns:a16="http://schemas.microsoft.com/office/drawing/2014/main" id="{A95D09E1-D029-4054-90EE-D10114570838}"/>
               </a:ext>
             </a:extLst>
           </p:cNvPr>
@@ -17215,15 +17259,16 @@
           </p:cNvPicPr>
           <p:nvPr/>
         </p:nvPicPr>
-        <p:blipFill rotWithShape="1">
+        <p:blipFill>
           <a:blip r:embed="rId2"/>
-          <a:srcRect l="3050" t="29751" r="3050" b="11977"/>
-          <a:stretch/>
+          <a:stretch>
+            <a:fillRect/>
+          </a:stretch>
         </p:blipFill>
         <p:spPr>
           <a:xfrm>
-            <a:off x="5145800" y="793845"/>
-            <a:ext cx="6214533" cy="5452155"/>
+            <a:off x="5387691" y="612000"/>
+            <a:ext cx="6408309" cy="5245157"/>
           </a:xfrm>
           <a:prstGeom prst="rect">
             <a:avLst/>
@@ -17233,7 +17278,7 @@
     </p:spTree>
     <p:extLst>
       <p:ext uri="{BB962C8B-B14F-4D97-AF65-F5344CB8AC3E}">
-        <p14:creationId xmlns:p14="http://schemas.microsoft.com/office/powerpoint/2010/main" val="3174141101"/>
+        <p14:creationId xmlns:p14="http://schemas.microsoft.com/office/powerpoint/2010/main" val="710880769"/>
       </p:ext>
     </p:extLst>
   </p:cSld>
@@ -17287,7 +17332,7 @@
                   <a:srgbClr val="0085FE"/>
                 </a:solidFill>
               </a:rPr>
-              <a:t>How are devices called upon</a:t>
+              <a:t>Connect hosts/groups to roles</a:t>
             </a:r>
             <a:endParaRPr lang="en-US" dirty="0">
               <a:solidFill>
@@ -17315,7 +17360,7 @@
         </p:nvSpPr>
         <p:spPr>
           <a:xfrm>
-            <a:off x="534291" y="1451443"/>
+            <a:off x="534291" y="1142279"/>
             <a:ext cx="9281274" cy="3090532"/>
           </a:xfrm>
         </p:spPr>
@@ -17329,45 +17374,40 @@
             </a:pPr>
             <a:r>
               <a:rPr lang="nl-BE" sz="2000" dirty="0"/>
-              <a:t>With use of the file/inventory file</a:t>
-            </a:r>
-          </a:p>
-          <a:p>
-            <a:pPr marL="815363" lvl="1" indent="-457200">
+              <a:t>Roles/groups are linked to each other in the playbook</a:t>
+            </a:r>
+          </a:p>
+          <a:p>
+            <a:pPr marL="457200" indent="-457200">
               <a:buFont typeface="Arial" panose="020B0604020202020204" pitchFamily="34" charset="0"/>
               <a:buChar char="•"/>
             </a:pPr>
             <a:r>
               <a:rPr lang="nl-BE" sz="2000" dirty="0"/>
-              <a:t>Host-ID’s are for individual plays/tasks</a:t>
-            </a:r>
-          </a:p>
-          <a:p>
-            <a:pPr marL="815363" lvl="1" indent="-457200">
+              <a:t>Roles are linked to a group or host</a:t>
+            </a:r>
+          </a:p>
+          <a:p>
+            <a:r>
+              <a:rPr lang="nl-BE" sz="1800" dirty="0"/>
+              <a:t>(Which roles are specified under specific group are own choice)</a:t>
+            </a:r>
+          </a:p>
+          <a:p>
+            <a:pPr marL="457200" indent="-457200">
               <a:buFont typeface="Arial" panose="020B0604020202020204" pitchFamily="34" charset="0"/>
               <a:buChar char="•"/>
             </a:pPr>
             <a:r>
               <a:rPr lang="nl-BE" sz="2000" dirty="0"/>
-              <a:t>Group name’s are for common plays</a:t>
-            </a:r>
-          </a:p>
-          <a:p>
-            <a:pPr marL="815363" lvl="1" indent="-457200">
-              <a:buFont typeface="Arial" panose="020B0604020202020204" pitchFamily="34" charset="0"/>
-              <a:buChar char="•"/>
-            </a:pPr>
-            <a:r>
-              <a:rPr lang="en-US" sz="2000" dirty="0"/>
-              <a:t>Variables are for groups or </a:t>
-            </a:r>
-          </a:p>
-          <a:p>
-            <a:pPr lvl="1"/>
-            <a:r>
-              <a:rPr lang="en-US" sz="2000" dirty="0"/>
-              <a:t>individual hosts (caution for spacing!)</a:t>
-            </a:r>
+              <a:t>Playbook can have different name than “playbook”</a:t>
+            </a:r>
+          </a:p>
+          <a:p>
+            <a:endParaRPr lang="nl-BE" sz="2000" b="1" dirty="0"/>
+          </a:p>
+          <a:p>
+            <a:endParaRPr lang="en-US" sz="2000" dirty="0"/>
           </a:p>
         </p:txBody>
       </p:sp>
@@ -17430,10 +17470,10 @@
       </p:sp>
       <p:pic>
         <p:nvPicPr>
-          <p:cNvPr id="10" name="Picture 9">
-            <a:extLst>
-              <a:ext uri="{FF2B5EF4-FFF2-40B4-BE49-F238E27FC236}">
-                <a16:creationId xmlns:a16="http://schemas.microsoft.com/office/drawing/2014/main" id="{A95D09E1-D029-4054-90EE-D10114570838}"/>
+          <p:cNvPr id="7" name="Picture 6">
+            <a:extLst>
+              <a:ext uri="{FF2B5EF4-FFF2-40B4-BE49-F238E27FC236}">
+                <a16:creationId xmlns:a16="http://schemas.microsoft.com/office/drawing/2014/main" id="{0610CE46-01DF-44CC-B2AA-569D3067677E}"/>
               </a:ext>
             </a:extLst>
           </p:cNvPr>
@@ -17450,8 +17490,8 @@
         </p:blipFill>
         <p:spPr>
           <a:xfrm>
-            <a:off x="5387691" y="612000"/>
-            <a:ext cx="6408309" cy="5245157"/>
+            <a:off x="3024834" y="2804193"/>
+            <a:ext cx="7802099" cy="3917793"/>
           </a:xfrm>
           <a:prstGeom prst="rect">
             <a:avLst/>
@@ -17461,7 +17501,7 @@
     </p:spTree>
     <p:extLst>
       <p:ext uri="{BB962C8B-B14F-4D97-AF65-F5344CB8AC3E}">
-        <p14:creationId xmlns:p14="http://schemas.microsoft.com/office/powerpoint/2010/main" val="710880769"/>
+        <p14:creationId xmlns:p14="http://schemas.microsoft.com/office/powerpoint/2010/main" val="1642633515"/>
       </p:ext>
     </p:extLst>
   </p:cSld>
@@ -17664,7 +17704,7 @@
           <p:cNvPr id="2" name="Title 1">
             <a:extLst>
               <a:ext uri="{FF2B5EF4-FFF2-40B4-BE49-F238E27FC236}">
-                <a16:creationId xmlns:a16="http://schemas.microsoft.com/office/drawing/2014/main" id="{5AACE6E1-6A5D-4254-BDA8-C75CD8A44ED8}"/>
+                <a16:creationId xmlns:a16="http://schemas.microsoft.com/office/drawing/2014/main" id="{516AF402-B805-463A-8761-2006D370D7AC}"/>
               </a:ext>
             </a:extLst>
           </p:cNvPr>
@@ -17686,7 +17726,7 @@
                   <a:srgbClr val="0085FE"/>
                 </a:solidFill>
               </a:rPr>
-              <a:t>Connect hosts/groups to roles</a:t>
+              <a:t>Tasks and used modules</a:t>
             </a:r>
             <a:endParaRPr lang="en-US" dirty="0">
               <a:solidFill>
@@ -17698,79 +17738,10 @@
       </p:sp>
       <p:sp>
         <p:nvSpPr>
-          <p:cNvPr id="3" name="Content Placeholder 2">
-            <a:extLst>
-              <a:ext uri="{FF2B5EF4-FFF2-40B4-BE49-F238E27FC236}">
-                <a16:creationId xmlns:a16="http://schemas.microsoft.com/office/drawing/2014/main" id="{FE17825A-63CE-4FE3-9311-77AAE3A9A027}"/>
-              </a:ext>
-            </a:extLst>
-          </p:cNvPr>
-          <p:cNvSpPr>
-            <a:spLocks noGrp="1"/>
-          </p:cNvSpPr>
-          <p:nvPr>
-            <p:ph idx="1"/>
-          </p:nvPr>
-        </p:nvSpPr>
-        <p:spPr>
-          <a:xfrm>
-            <a:off x="534291" y="1142279"/>
-            <a:ext cx="9281274" cy="3090532"/>
-          </a:xfrm>
-        </p:spPr>
-        <p:txBody>
-          <a:bodyPr/>
-          <a:lstStyle/>
-          <a:p>
-            <a:pPr marL="457200" indent="-457200">
-              <a:buFont typeface="Arial" panose="020B0604020202020204" pitchFamily="34" charset="0"/>
-              <a:buChar char="•"/>
-            </a:pPr>
-            <a:r>
-              <a:rPr lang="nl-BE" sz="2000" dirty="0"/>
-              <a:t>Roles/groups are linked to each other in the playbook</a:t>
-            </a:r>
-          </a:p>
-          <a:p>
-            <a:pPr marL="457200" indent="-457200">
-              <a:buFont typeface="Arial" panose="020B0604020202020204" pitchFamily="34" charset="0"/>
-              <a:buChar char="•"/>
-            </a:pPr>
-            <a:r>
-              <a:rPr lang="nl-BE" sz="2000" dirty="0"/>
-              <a:t>Roles are linked to a group or host</a:t>
-            </a:r>
-          </a:p>
-          <a:p>
-            <a:r>
-              <a:rPr lang="nl-BE" sz="1800" dirty="0"/>
-              <a:t>(Which roles are specified under specific group are own choice)</a:t>
-            </a:r>
-          </a:p>
-          <a:p>
-            <a:pPr marL="457200" indent="-457200">
-              <a:buFont typeface="Arial" panose="020B0604020202020204" pitchFamily="34" charset="0"/>
-              <a:buChar char="•"/>
-            </a:pPr>
-            <a:r>
-              <a:rPr lang="nl-BE" sz="2000" dirty="0"/>
-              <a:t>Playbook can have different name than “playbook”</a:t>
-            </a:r>
-          </a:p>
-          <a:p>
-            <a:endParaRPr lang="nl-BE" sz="2000" b="1" dirty="0"/>
-          </a:p>
-          <a:p>
-            <a:endParaRPr lang="en-US" sz="2000" dirty="0"/>
-          </a:p>
-        </p:txBody>
-      </p:sp>
-      <p:sp>
-        <p:nvSpPr>
           <p:cNvPr id="4" name="Footer Placeholder 3">
             <a:extLst>
               <a:ext uri="{FF2B5EF4-FFF2-40B4-BE49-F238E27FC236}">
-                <a16:creationId xmlns:a16="http://schemas.microsoft.com/office/drawing/2014/main" id="{21588CFD-6B99-4D26-9B8E-BC7163B80B98}"/>
+                <a16:creationId xmlns:a16="http://schemas.microsoft.com/office/drawing/2014/main" id="{D1A712F8-4B7E-4E93-B599-0230989E62FF}"/>
               </a:ext>
             </a:extLst>
           </p:cNvPr>
@@ -17787,7 +17758,7 @@
           <a:lstStyle/>
           <a:p>
             <a:r>
-              <a:rPr lang="nl-BE" dirty="0"/>
+              <a:rPr lang="en-US" dirty="0"/>
               <a:t>Ansible - Introduction</a:t>
             </a:r>
           </a:p>
@@ -17798,7 +17769,7 @@
           <p:cNvPr id="5" name="Slide Number Placeholder 4">
             <a:extLst>
               <a:ext uri="{FF2B5EF4-FFF2-40B4-BE49-F238E27FC236}">
-                <a16:creationId xmlns:a16="http://schemas.microsoft.com/office/drawing/2014/main" id="{94A5AC1C-092E-4EC9-BA7C-4F212D666B50}"/>
+                <a16:creationId xmlns:a16="http://schemas.microsoft.com/office/drawing/2014/main" id="{4D9DDEC3-4B59-4F49-A668-524CBFFAA4F2}"/>
               </a:ext>
             </a:extLst>
           </p:cNvPr>
@@ -17824,10 +17795,121 @@
       </p:sp>
       <p:pic>
         <p:nvPicPr>
-          <p:cNvPr id="7" name="Picture 6">
-            <a:extLst>
-              <a:ext uri="{FF2B5EF4-FFF2-40B4-BE49-F238E27FC236}">
-                <a16:creationId xmlns:a16="http://schemas.microsoft.com/office/drawing/2014/main" id="{0610CE46-01DF-44CC-B2AA-569D3067677E}"/>
+          <p:cNvPr id="12" name="Picture 11">
+            <a:extLst>
+              <a:ext uri="{FF2B5EF4-FFF2-40B4-BE49-F238E27FC236}">
+                <a16:creationId xmlns:a16="http://schemas.microsoft.com/office/drawing/2014/main" id="{61509144-B87C-4D8C-96F2-42648D3B6C38}"/>
+              </a:ext>
+            </a:extLst>
+          </p:cNvPr>
+          <p:cNvPicPr>
+            <a:picLocks noChangeAspect="1"/>
+          </p:cNvPicPr>
+          <p:nvPr/>
+        </p:nvPicPr>
+        <p:blipFill rotWithShape="1">
+          <a:blip r:embed="rId2"/>
+          <a:srcRect t="26427" r="23020" b="50000"/>
+          <a:stretch/>
+        </p:blipFill>
+        <p:spPr>
+          <a:xfrm>
+            <a:off x="678291" y="3521427"/>
+            <a:ext cx="2567775" cy="1616609"/>
+          </a:xfrm>
+          <a:prstGeom prst="rect">
+            <a:avLst/>
+          </a:prstGeom>
+        </p:spPr>
+      </p:pic>
+      <p:cxnSp>
+        <p:nvCxnSpPr>
+          <p:cNvPr id="19" name="Straight Arrow Connector 18">
+            <a:extLst>
+              <a:ext uri="{FF2B5EF4-FFF2-40B4-BE49-F238E27FC236}">
+                <a16:creationId xmlns:a16="http://schemas.microsoft.com/office/drawing/2014/main" id="{75004B0D-A897-4B60-8F47-78ED49EF3BEE}"/>
+              </a:ext>
+            </a:extLst>
+          </p:cNvPr>
+          <p:cNvCxnSpPr>
+            <a:cxnSpLocks/>
+          </p:cNvCxnSpPr>
+          <p:nvPr/>
+        </p:nvCxnSpPr>
+        <p:spPr>
+          <a:xfrm>
+            <a:off x="2128774" y="2140891"/>
+            <a:ext cx="0" cy="522115"/>
+          </a:xfrm>
+          <a:prstGeom prst="straightConnector1">
+            <a:avLst/>
+          </a:prstGeom>
+          <a:ln>
+            <a:tailEnd type="triangle"/>
+          </a:ln>
+        </p:spPr>
+        <p:style>
+          <a:lnRef idx="1">
+            <a:schemeClr val="accent1"/>
+          </a:lnRef>
+          <a:fillRef idx="0">
+            <a:schemeClr val="accent1"/>
+          </a:fillRef>
+          <a:effectRef idx="0">
+            <a:schemeClr val="accent1"/>
+          </a:effectRef>
+          <a:fontRef idx="minor">
+            <a:schemeClr val="tx1"/>
+          </a:fontRef>
+        </p:style>
+      </p:cxnSp>
+      <p:cxnSp>
+        <p:nvCxnSpPr>
+          <p:cNvPr id="21" name="Straight Arrow Connector 20">
+            <a:extLst>
+              <a:ext uri="{FF2B5EF4-FFF2-40B4-BE49-F238E27FC236}">
+                <a16:creationId xmlns:a16="http://schemas.microsoft.com/office/drawing/2014/main" id="{E90E9838-EE7E-4647-BF2D-FC83D623053A}"/>
+              </a:ext>
+            </a:extLst>
+          </p:cNvPr>
+          <p:cNvCxnSpPr>
+            <a:cxnSpLocks/>
+          </p:cNvCxnSpPr>
+          <p:nvPr/>
+        </p:nvCxnSpPr>
+        <p:spPr>
+          <a:xfrm>
+            <a:off x="2128774" y="3054787"/>
+            <a:ext cx="0" cy="467290"/>
+          </a:xfrm>
+          <a:prstGeom prst="straightConnector1">
+            <a:avLst/>
+          </a:prstGeom>
+          <a:ln>
+            <a:tailEnd type="triangle"/>
+          </a:ln>
+        </p:spPr>
+        <p:style>
+          <a:lnRef idx="1">
+            <a:schemeClr val="accent1"/>
+          </a:lnRef>
+          <a:fillRef idx="0">
+            <a:schemeClr val="accent1"/>
+          </a:fillRef>
+          <a:effectRef idx="0">
+            <a:schemeClr val="accent1"/>
+          </a:effectRef>
+          <a:fontRef idx="minor">
+            <a:schemeClr val="tx1"/>
+          </a:fontRef>
+        </p:style>
+      </p:cxnSp>
+      <p:pic>
+        <p:nvPicPr>
+          <p:cNvPr id="33" name="Picture 32">
+            <a:extLst>
+              <a:ext uri="{FF2B5EF4-FFF2-40B4-BE49-F238E27FC236}">
+                <a16:creationId xmlns:a16="http://schemas.microsoft.com/office/drawing/2014/main" id="{6927A087-B4BF-43A7-B89F-8A1A09D13207}"/>
               </a:ext>
             </a:extLst>
           </p:cNvPr>
@@ -17837,25 +17919,380 @@
           <p:nvPr/>
         </p:nvPicPr>
         <p:blipFill>
-          <a:blip r:embed="rId2"/>
+          <a:blip r:embed="rId3"/>
           <a:stretch>
             <a:fillRect/>
           </a:stretch>
         </p:blipFill>
         <p:spPr>
           <a:xfrm>
-            <a:off x="3024834" y="2804193"/>
-            <a:ext cx="7802099" cy="3917793"/>
+            <a:off x="9712144" y="448153"/>
+            <a:ext cx="2054870" cy="2656715"/>
           </a:xfrm>
           <a:prstGeom prst="rect">
             <a:avLst/>
           </a:prstGeom>
+        </p:spPr>
+      </p:pic>
+      <p:sp>
+        <p:nvSpPr>
+          <p:cNvPr id="36" name="TextBox 35">
+            <a:extLst>
+              <a:ext uri="{FF2B5EF4-FFF2-40B4-BE49-F238E27FC236}">
+                <a16:creationId xmlns:a16="http://schemas.microsoft.com/office/drawing/2014/main" id="{8F39B721-D73A-4FE1-8427-638C6BF2BF32}"/>
+              </a:ext>
+            </a:extLst>
+          </p:cNvPr>
+          <p:cNvSpPr txBox="1"/>
+          <p:nvPr/>
+        </p:nvSpPr>
+        <p:spPr>
+          <a:xfrm>
+            <a:off x="9321433" y="3169760"/>
+            <a:ext cx="2658712" cy="276999"/>
+          </a:xfrm>
+          <a:prstGeom prst="rect">
+            <a:avLst/>
+          </a:prstGeom>
+          <a:noFill/>
+        </p:spPr>
+        <p:txBody>
+          <a:bodyPr wrap="square" rtlCol="0">
+            <a:spAutoFit/>
+          </a:bodyPr>
+          <a:lstStyle/>
+          <a:p>
+            <a:r>
+              <a:rPr lang="nl-BE" sz="1200" b="1" dirty="0"/>
+              <a:t>Not in playbook.yml but in task/main.yml</a:t>
+            </a:r>
+          </a:p>
+        </p:txBody>
+      </p:sp>
+      <p:pic>
+        <p:nvPicPr>
+          <p:cNvPr id="42" name="Picture 41">
+            <a:extLst>
+              <a:ext uri="{FF2B5EF4-FFF2-40B4-BE49-F238E27FC236}">
+                <a16:creationId xmlns:a16="http://schemas.microsoft.com/office/drawing/2014/main" id="{48885652-985C-4A1E-A1AD-01BAF8CEB1C5}"/>
+              </a:ext>
+            </a:extLst>
+          </p:cNvPr>
+          <p:cNvPicPr>
+            <a:picLocks noChangeAspect="1"/>
+          </p:cNvPicPr>
+          <p:nvPr/>
+        </p:nvPicPr>
+        <p:blipFill>
+          <a:blip r:embed="rId4"/>
+          <a:stretch>
+            <a:fillRect/>
+          </a:stretch>
+        </p:blipFill>
+        <p:spPr>
+          <a:xfrm>
+            <a:off x="678291" y="1106375"/>
+            <a:ext cx="3272525" cy="1103784"/>
+          </a:xfrm>
+          <a:prstGeom prst="rect">
+            <a:avLst/>
+          </a:prstGeom>
+        </p:spPr>
+      </p:pic>
+      <p:pic>
+        <p:nvPicPr>
+          <p:cNvPr id="50" name="Picture 49">
+            <a:extLst>
+              <a:ext uri="{FF2B5EF4-FFF2-40B4-BE49-F238E27FC236}">
+                <a16:creationId xmlns:a16="http://schemas.microsoft.com/office/drawing/2014/main" id="{8D473DFE-B475-4AE5-AF64-06BDD37930A1}"/>
+              </a:ext>
+            </a:extLst>
+          </p:cNvPr>
+          <p:cNvPicPr>
+            <a:picLocks noChangeAspect="1"/>
+          </p:cNvPicPr>
+          <p:nvPr/>
+        </p:nvPicPr>
+        <p:blipFill>
+          <a:blip r:embed="rId5"/>
+          <a:stretch>
+            <a:fillRect/>
+          </a:stretch>
+        </p:blipFill>
+        <p:spPr>
+          <a:xfrm>
+            <a:off x="4610212" y="442272"/>
+            <a:ext cx="2971576" cy="2865987"/>
+          </a:xfrm>
+          <a:prstGeom prst="rect">
+            <a:avLst/>
+          </a:prstGeom>
+        </p:spPr>
+      </p:pic>
+      <p:pic>
+        <p:nvPicPr>
+          <p:cNvPr id="52" name="Picture 51">
+            <a:extLst>
+              <a:ext uri="{FF2B5EF4-FFF2-40B4-BE49-F238E27FC236}">
+                <a16:creationId xmlns:a16="http://schemas.microsoft.com/office/drawing/2014/main" id="{87AC6E72-E164-4E8D-B8E1-BA5B5F2573DC}"/>
+              </a:ext>
+            </a:extLst>
+          </p:cNvPr>
+          <p:cNvPicPr>
+            <a:picLocks noChangeAspect="1"/>
+          </p:cNvPicPr>
+          <p:nvPr/>
+        </p:nvPicPr>
+        <p:blipFill>
+          <a:blip r:embed="rId6"/>
+          <a:stretch>
+            <a:fillRect/>
+          </a:stretch>
+        </p:blipFill>
+        <p:spPr>
+          <a:xfrm>
+            <a:off x="4714263" y="3550672"/>
+            <a:ext cx="3713906" cy="1853333"/>
+          </a:xfrm>
+          <a:prstGeom prst="rect">
+            <a:avLst/>
+          </a:prstGeom>
+        </p:spPr>
+      </p:pic>
+      <p:cxnSp>
+        <p:nvCxnSpPr>
+          <p:cNvPr id="54" name="Connector: Elbow 53">
+            <a:extLst>
+              <a:ext uri="{FF2B5EF4-FFF2-40B4-BE49-F238E27FC236}">
+                <a16:creationId xmlns:a16="http://schemas.microsoft.com/office/drawing/2014/main" id="{B05FD79B-42FB-420F-BFAC-85FFBFC975B1}"/>
+              </a:ext>
+            </a:extLst>
+          </p:cNvPr>
+          <p:cNvCxnSpPr>
+            <a:cxnSpLocks/>
+            <a:stCxn id="12" idx="2"/>
+            <a:endCxn id="50" idx="0"/>
+          </p:cNvCxnSpPr>
+          <p:nvPr/>
+        </p:nvCxnSpPr>
+        <p:spPr>
+          <a:xfrm rot="5400000" flipH="1" flipV="1">
+            <a:off x="1681207" y="723243"/>
+            <a:ext cx="4695764" cy="4133821"/>
+          </a:xfrm>
+          <a:prstGeom prst="bentConnector5">
+            <a:avLst>
+              <a:gd name="adj1" fmla="val -4868"/>
+              <a:gd name="adj2" fmla="val 56570"/>
+              <a:gd name="adj3" fmla="val 104868"/>
+            </a:avLst>
+          </a:prstGeom>
+          <a:ln>
+            <a:tailEnd type="triangle"/>
+          </a:ln>
+        </p:spPr>
+        <p:style>
+          <a:lnRef idx="1">
+            <a:schemeClr val="accent1"/>
+          </a:lnRef>
+          <a:fillRef idx="0">
+            <a:schemeClr val="accent1"/>
+          </a:fillRef>
+          <a:effectRef idx="0">
+            <a:schemeClr val="accent1"/>
+          </a:effectRef>
+          <a:fontRef idx="minor">
+            <a:schemeClr val="tx1"/>
+          </a:fontRef>
+        </p:style>
+      </p:cxnSp>
+      <p:cxnSp>
+        <p:nvCxnSpPr>
+          <p:cNvPr id="58" name="Straight Arrow Connector 57">
+            <a:extLst>
+              <a:ext uri="{FF2B5EF4-FFF2-40B4-BE49-F238E27FC236}">
+                <a16:creationId xmlns:a16="http://schemas.microsoft.com/office/drawing/2014/main" id="{6089ABCF-207E-40F2-B287-9125286065CB}"/>
+              </a:ext>
+            </a:extLst>
+          </p:cNvPr>
+          <p:cNvCxnSpPr>
+            <a:cxnSpLocks/>
+            <a:stCxn id="50" idx="2"/>
+          </p:cNvCxnSpPr>
+          <p:nvPr/>
+        </p:nvCxnSpPr>
+        <p:spPr>
+          <a:xfrm>
+            <a:off x="6096000" y="3308259"/>
+            <a:ext cx="0" cy="241483"/>
+          </a:xfrm>
+          <a:prstGeom prst="straightConnector1">
+            <a:avLst/>
+          </a:prstGeom>
+          <a:ln>
+            <a:tailEnd type="triangle"/>
+          </a:ln>
+        </p:spPr>
+        <p:style>
+          <a:lnRef idx="1">
+            <a:schemeClr val="accent1"/>
+          </a:lnRef>
+          <a:fillRef idx="0">
+            <a:schemeClr val="accent1"/>
+          </a:fillRef>
+          <a:effectRef idx="0">
+            <a:schemeClr val="accent1"/>
+          </a:effectRef>
+          <a:fontRef idx="minor">
+            <a:schemeClr val="tx1"/>
+          </a:fontRef>
+        </p:style>
+      </p:cxnSp>
+      <p:cxnSp>
+        <p:nvCxnSpPr>
+          <p:cNvPr id="61" name="Connector: Elbow 60">
+            <a:extLst>
+              <a:ext uri="{FF2B5EF4-FFF2-40B4-BE49-F238E27FC236}">
+                <a16:creationId xmlns:a16="http://schemas.microsoft.com/office/drawing/2014/main" id="{8B78ECF8-9008-46B4-BF95-082860F05C5E}"/>
+              </a:ext>
+            </a:extLst>
+          </p:cNvPr>
+          <p:cNvCxnSpPr>
+            <a:cxnSpLocks/>
+            <a:stCxn id="52" idx="3"/>
+            <a:endCxn id="66" idx="0"/>
+          </p:cNvCxnSpPr>
+          <p:nvPr/>
+        </p:nvCxnSpPr>
+        <p:spPr>
+          <a:xfrm>
+            <a:off x="8428169" y="4477339"/>
+            <a:ext cx="1725923" cy="984874"/>
+          </a:xfrm>
+          <a:prstGeom prst="bentConnector2">
+            <a:avLst/>
+          </a:prstGeom>
+          <a:ln>
+            <a:tailEnd type="triangle"/>
+          </a:ln>
+        </p:spPr>
+        <p:style>
+          <a:lnRef idx="1">
+            <a:schemeClr val="accent1"/>
+          </a:lnRef>
+          <a:fillRef idx="0">
+            <a:schemeClr val="accent1"/>
+          </a:fillRef>
+          <a:effectRef idx="0">
+            <a:schemeClr val="accent1"/>
+          </a:effectRef>
+          <a:fontRef idx="minor">
+            <a:schemeClr val="tx1"/>
+          </a:fontRef>
+        </p:style>
+      </p:cxnSp>
+      <p:pic>
+        <p:nvPicPr>
+          <p:cNvPr id="66" name="Picture 65">
+            <a:extLst>
+              <a:ext uri="{FF2B5EF4-FFF2-40B4-BE49-F238E27FC236}">
+                <a16:creationId xmlns:a16="http://schemas.microsoft.com/office/drawing/2014/main" id="{7F822350-50A4-45C9-A909-252B278AAA39}"/>
+              </a:ext>
+            </a:extLst>
+          </p:cNvPr>
+          <p:cNvPicPr>
+            <a:picLocks noChangeAspect="1"/>
+          </p:cNvPicPr>
+          <p:nvPr/>
+        </p:nvPicPr>
+        <p:blipFill>
+          <a:blip r:embed="rId7"/>
+          <a:stretch>
+            <a:fillRect/>
+          </a:stretch>
+        </p:blipFill>
+        <p:spPr>
+          <a:xfrm>
+            <a:off x="8116184" y="5462213"/>
+            <a:ext cx="4075816" cy="1406697"/>
+          </a:xfrm>
+          <a:prstGeom prst="rect">
+            <a:avLst/>
+          </a:prstGeom>
+        </p:spPr>
+      </p:pic>
+      <p:pic>
+        <p:nvPicPr>
+          <p:cNvPr id="69" name="Picture 68">
+            <a:extLst>
+              <a:ext uri="{FF2B5EF4-FFF2-40B4-BE49-F238E27FC236}">
+                <a16:creationId xmlns:a16="http://schemas.microsoft.com/office/drawing/2014/main" id="{A5567FCD-8DFA-48BF-820D-696EC8981BBC}"/>
+              </a:ext>
+            </a:extLst>
+          </p:cNvPr>
+          <p:cNvPicPr>
+            <a:picLocks noChangeAspect="1"/>
+          </p:cNvPicPr>
+          <p:nvPr/>
+        </p:nvPicPr>
+        <p:blipFill rotWithShape="1">
+          <a:blip r:embed="rId8"/>
+          <a:srcRect r="-1879" b="62315"/>
+          <a:stretch/>
+        </p:blipFill>
+        <p:spPr>
+          <a:xfrm>
+            <a:off x="913832" y="2692685"/>
+            <a:ext cx="2801442" cy="362102"/>
+          </a:xfrm>
+          <a:prstGeom prst="rect">
+            <a:avLst/>
+          </a:prstGeom>
+        </p:spPr>
+      </p:pic>
+      <p:pic>
+        <p:nvPicPr>
+          <p:cNvPr id="72" name="Picture 71">
+            <a:extLst>
+              <a:ext uri="{FF2B5EF4-FFF2-40B4-BE49-F238E27FC236}">
+                <a16:creationId xmlns:a16="http://schemas.microsoft.com/office/drawing/2014/main" id="{053C982C-0E2A-4C10-BF54-4E921F3BF353}"/>
+              </a:ext>
+            </a:extLst>
+          </p:cNvPr>
+          <p:cNvPicPr>
+            <a:picLocks noChangeAspect="1"/>
+          </p:cNvPicPr>
+          <p:nvPr/>
+        </p:nvPicPr>
+        <p:blipFill rotWithShape="1">
+          <a:blip r:embed="rId9"/>
+          <a:srcRect r="14511" b="21246"/>
+          <a:stretch/>
+        </p:blipFill>
+        <p:spPr>
+          <a:xfrm>
+            <a:off x="3715274" y="5998242"/>
+            <a:ext cx="1853425" cy="604709"/>
+          </a:xfrm>
+          <a:prstGeom prst="rect">
+            <a:avLst/>
+          </a:prstGeom>
+          <a:ln>
+            <a:noFill/>
+          </a:ln>
+          <a:effectLst>
+            <a:outerShdw blurRad="190500" algn="tl" rotWithShape="0">
+              <a:srgbClr val="000000">
+                <a:alpha val="70000"/>
+              </a:srgbClr>
+            </a:outerShdw>
+          </a:effectLst>
         </p:spPr>
       </p:pic>
     </p:spTree>
     <p:extLst>
       <p:ext uri="{BB962C8B-B14F-4D97-AF65-F5344CB8AC3E}">
-        <p14:creationId xmlns:p14="http://schemas.microsoft.com/office/powerpoint/2010/main" val="1642633515"/>
+        <p14:creationId xmlns:p14="http://schemas.microsoft.com/office/powerpoint/2010/main" val="2369688689"/>
       </p:ext>
     </p:extLst>
   </p:cSld>
@@ -17978,121 +18415,10 @@
       </p:sp>
       <p:pic>
         <p:nvPicPr>
-          <p:cNvPr id="12" name="Picture 11">
-            <a:extLst>
-              <a:ext uri="{FF2B5EF4-FFF2-40B4-BE49-F238E27FC236}">
-                <a16:creationId xmlns:a16="http://schemas.microsoft.com/office/drawing/2014/main" id="{61509144-B87C-4D8C-96F2-42648D3B6C38}"/>
-              </a:ext>
-            </a:extLst>
-          </p:cNvPr>
-          <p:cNvPicPr>
-            <a:picLocks noChangeAspect="1"/>
-          </p:cNvPicPr>
-          <p:nvPr/>
-        </p:nvPicPr>
-        <p:blipFill rotWithShape="1">
-          <a:blip r:embed="rId2"/>
-          <a:srcRect t="26427" r="23020" b="50000"/>
-          <a:stretch/>
-        </p:blipFill>
-        <p:spPr>
-          <a:xfrm>
-            <a:off x="678291" y="3521427"/>
-            <a:ext cx="2567775" cy="1616609"/>
-          </a:xfrm>
-          <a:prstGeom prst="rect">
-            <a:avLst/>
-          </a:prstGeom>
-        </p:spPr>
-      </p:pic>
-      <p:cxnSp>
-        <p:nvCxnSpPr>
-          <p:cNvPr id="19" name="Straight Arrow Connector 18">
-            <a:extLst>
-              <a:ext uri="{FF2B5EF4-FFF2-40B4-BE49-F238E27FC236}">
-                <a16:creationId xmlns:a16="http://schemas.microsoft.com/office/drawing/2014/main" id="{75004B0D-A897-4B60-8F47-78ED49EF3BEE}"/>
-              </a:ext>
-            </a:extLst>
-          </p:cNvPr>
-          <p:cNvCxnSpPr>
-            <a:cxnSpLocks/>
-          </p:cNvCxnSpPr>
-          <p:nvPr/>
-        </p:nvCxnSpPr>
-        <p:spPr>
-          <a:xfrm>
-            <a:off x="2128774" y="2140891"/>
-            <a:ext cx="0" cy="522115"/>
-          </a:xfrm>
-          <a:prstGeom prst="straightConnector1">
-            <a:avLst/>
-          </a:prstGeom>
-          <a:ln>
-            <a:tailEnd type="triangle"/>
-          </a:ln>
-        </p:spPr>
-        <p:style>
-          <a:lnRef idx="1">
-            <a:schemeClr val="accent1"/>
-          </a:lnRef>
-          <a:fillRef idx="0">
-            <a:schemeClr val="accent1"/>
-          </a:fillRef>
-          <a:effectRef idx="0">
-            <a:schemeClr val="accent1"/>
-          </a:effectRef>
-          <a:fontRef idx="minor">
-            <a:schemeClr val="tx1"/>
-          </a:fontRef>
-        </p:style>
-      </p:cxnSp>
-      <p:cxnSp>
-        <p:nvCxnSpPr>
-          <p:cNvPr id="21" name="Straight Arrow Connector 20">
-            <a:extLst>
-              <a:ext uri="{FF2B5EF4-FFF2-40B4-BE49-F238E27FC236}">
-                <a16:creationId xmlns:a16="http://schemas.microsoft.com/office/drawing/2014/main" id="{E90E9838-EE7E-4647-BF2D-FC83D623053A}"/>
-              </a:ext>
-            </a:extLst>
-          </p:cNvPr>
-          <p:cNvCxnSpPr>
-            <a:cxnSpLocks/>
-          </p:cNvCxnSpPr>
-          <p:nvPr/>
-        </p:nvCxnSpPr>
-        <p:spPr>
-          <a:xfrm>
-            <a:off x="2128774" y="3054787"/>
-            <a:ext cx="0" cy="467290"/>
-          </a:xfrm>
-          <a:prstGeom prst="straightConnector1">
-            <a:avLst/>
-          </a:prstGeom>
-          <a:ln>
-            <a:tailEnd type="triangle"/>
-          </a:ln>
-        </p:spPr>
-        <p:style>
-          <a:lnRef idx="1">
-            <a:schemeClr val="accent1"/>
-          </a:lnRef>
-          <a:fillRef idx="0">
-            <a:schemeClr val="accent1"/>
-          </a:fillRef>
-          <a:effectRef idx="0">
-            <a:schemeClr val="accent1"/>
-          </a:effectRef>
-          <a:fontRef idx="minor">
-            <a:schemeClr val="tx1"/>
-          </a:fontRef>
-        </p:style>
-      </p:cxnSp>
-      <p:pic>
-        <p:nvPicPr>
-          <p:cNvPr id="33" name="Picture 32">
-            <a:extLst>
-              <a:ext uri="{FF2B5EF4-FFF2-40B4-BE49-F238E27FC236}">
-                <a16:creationId xmlns:a16="http://schemas.microsoft.com/office/drawing/2014/main" id="{6927A087-B4BF-43A7-B89F-8A1A09D13207}"/>
+          <p:cNvPr id="6" name="Picture 5">
+            <a:extLst>
+              <a:ext uri="{FF2B5EF4-FFF2-40B4-BE49-F238E27FC236}">
+                <a16:creationId xmlns:a16="http://schemas.microsoft.com/office/drawing/2014/main" id="{E9E1A2F1-ABBE-47BC-AE2E-C5ECA2EBBFC1}"/>
               </a:ext>
             </a:extLst>
           </p:cNvPr>
@@ -18102,380 +18428,25 @@
           <p:nvPr/>
         </p:nvPicPr>
         <p:blipFill>
-          <a:blip r:embed="rId3"/>
+          <a:blip r:embed="rId2"/>
           <a:stretch>
             <a:fillRect/>
           </a:stretch>
         </p:blipFill>
         <p:spPr>
           <a:xfrm>
-            <a:off x="9712144" y="448153"/>
-            <a:ext cx="2054870" cy="2656715"/>
+            <a:off x="2307854" y="1881932"/>
+            <a:ext cx="7576292" cy="3094135"/>
           </a:xfrm>
           <a:prstGeom prst="rect">
             <a:avLst/>
           </a:prstGeom>
-        </p:spPr>
-      </p:pic>
-      <p:sp>
-        <p:nvSpPr>
-          <p:cNvPr id="36" name="TextBox 35">
-            <a:extLst>
-              <a:ext uri="{FF2B5EF4-FFF2-40B4-BE49-F238E27FC236}">
-                <a16:creationId xmlns:a16="http://schemas.microsoft.com/office/drawing/2014/main" id="{8F39B721-D73A-4FE1-8427-638C6BF2BF32}"/>
-              </a:ext>
-            </a:extLst>
-          </p:cNvPr>
-          <p:cNvSpPr txBox="1"/>
-          <p:nvPr/>
-        </p:nvSpPr>
-        <p:spPr>
-          <a:xfrm>
-            <a:off x="9321433" y="3169760"/>
-            <a:ext cx="2658712" cy="276999"/>
-          </a:xfrm>
-          <a:prstGeom prst="rect">
-            <a:avLst/>
-          </a:prstGeom>
-          <a:noFill/>
-        </p:spPr>
-        <p:txBody>
-          <a:bodyPr wrap="square" rtlCol="0">
-            <a:spAutoFit/>
-          </a:bodyPr>
-          <a:lstStyle/>
-          <a:p>
-            <a:r>
-              <a:rPr lang="nl-BE" sz="1200" b="1" dirty="0"/>
-              <a:t>Not in playbook.yml but in task/main.yml</a:t>
-            </a:r>
-          </a:p>
-        </p:txBody>
-      </p:sp>
-      <p:pic>
-        <p:nvPicPr>
-          <p:cNvPr id="42" name="Picture 41">
-            <a:extLst>
-              <a:ext uri="{FF2B5EF4-FFF2-40B4-BE49-F238E27FC236}">
-                <a16:creationId xmlns:a16="http://schemas.microsoft.com/office/drawing/2014/main" id="{48885652-985C-4A1E-A1AD-01BAF8CEB1C5}"/>
-              </a:ext>
-            </a:extLst>
-          </p:cNvPr>
-          <p:cNvPicPr>
-            <a:picLocks noChangeAspect="1"/>
-          </p:cNvPicPr>
-          <p:nvPr/>
-        </p:nvPicPr>
-        <p:blipFill>
-          <a:blip r:embed="rId4"/>
-          <a:stretch>
-            <a:fillRect/>
-          </a:stretch>
-        </p:blipFill>
-        <p:spPr>
-          <a:xfrm>
-            <a:off x="678291" y="1106375"/>
-            <a:ext cx="3272525" cy="1103784"/>
-          </a:xfrm>
-          <a:prstGeom prst="rect">
-            <a:avLst/>
-          </a:prstGeom>
-        </p:spPr>
-      </p:pic>
-      <p:pic>
-        <p:nvPicPr>
-          <p:cNvPr id="50" name="Picture 49">
-            <a:extLst>
-              <a:ext uri="{FF2B5EF4-FFF2-40B4-BE49-F238E27FC236}">
-                <a16:creationId xmlns:a16="http://schemas.microsoft.com/office/drawing/2014/main" id="{8D473DFE-B475-4AE5-AF64-06BDD37930A1}"/>
-              </a:ext>
-            </a:extLst>
-          </p:cNvPr>
-          <p:cNvPicPr>
-            <a:picLocks noChangeAspect="1"/>
-          </p:cNvPicPr>
-          <p:nvPr/>
-        </p:nvPicPr>
-        <p:blipFill>
-          <a:blip r:embed="rId5"/>
-          <a:stretch>
-            <a:fillRect/>
-          </a:stretch>
-        </p:blipFill>
-        <p:spPr>
-          <a:xfrm>
-            <a:off x="4610212" y="442272"/>
-            <a:ext cx="2971576" cy="2865987"/>
-          </a:xfrm>
-          <a:prstGeom prst="rect">
-            <a:avLst/>
-          </a:prstGeom>
-        </p:spPr>
-      </p:pic>
-      <p:pic>
-        <p:nvPicPr>
-          <p:cNvPr id="52" name="Picture 51">
-            <a:extLst>
-              <a:ext uri="{FF2B5EF4-FFF2-40B4-BE49-F238E27FC236}">
-                <a16:creationId xmlns:a16="http://schemas.microsoft.com/office/drawing/2014/main" id="{87AC6E72-E164-4E8D-B8E1-BA5B5F2573DC}"/>
-              </a:ext>
-            </a:extLst>
-          </p:cNvPr>
-          <p:cNvPicPr>
-            <a:picLocks noChangeAspect="1"/>
-          </p:cNvPicPr>
-          <p:nvPr/>
-        </p:nvPicPr>
-        <p:blipFill>
-          <a:blip r:embed="rId6"/>
-          <a:stretch>
-            <a:fillRect/>
-          </a:stretch>
-        </p:blipFill>
-        <p:spPr>
-          <a:xfrm>
-            <a:off x="4714263" y="3550672"/>
-            <a:ext cx="3713906" cy="1853333"/>
-          </a:xfrm>
-          <a:prstGeom prst="rect">
-            <a:avLst/>
-          </a:prstGeom>
-        </p:spPr>
-      </p:pic>
-      <p:cxnSp>
-        <p:nvCxnSpPr>
-          <p:cNvPr id="54" name="Connector: Elbow 53">
-            <a:extLst>
-              <a:ext uri="{FF2B5EF4-FFF2-40B4-BE49-F238E27FC236}">
-                <a16:creationId xmlns:a16="http://schemas.microsoft.com/office/drawing/2014/main" id="{B05FD79B-42FB-420F-BFAC-85FFBFC975B1}"/>
-              </a:ext>
-            </a:extLst>
-          </p:cNvPr>
-          <p:cNvCxnSpPr>
-            <a:cxnSpLocks/>
-            <a:stCxn id="12" idx="2"/>
-            <a:endCxn id="50" idx="0"/>
-          </p:cNvCxnSpPr>
-          <p:nvPr/>
-        </p:nvCxnSpPr>
-        <p:spPr>
-          <a:xfrm rot="5400000" flipH="1" flipV="1">
-            <a:off x="1681207" y="723243"/>
-            <a:ext cx="4695764" cy="4133821"/>
-          </a:xfrm>
-          <a:prstGeom prst="bentConnector5">
-            <a:avLst>
-              <a:gd name="adj1" fmla="val -4868"/>
-              <a:gd name="adj2" fmla="val 56570"/>
-              <a:gd name="adj3" fmla="val 104868"/>
-            </a:avLst>
-          </a:prstGeom>
-          <a:ln>
-            <a:tailEnd type="triangle"/>
-          </a:ln>
-        </p:spPr>
-        <p:style>
-          <a:lnRef idx="1">
-            <a:schemeClr val="accent1"/>
-          </a:lnRef>
-          <a:fillRef idx="0">
-            <a:schemeClr val="accent1"/>
-          </a:fillRef>
-          <a:effectRef idx="0">
-            <a:schemeClr val="accent1"/>
-          </a:effectRef>
-          <a:fontRef idx="minor">
-            <a:schemeClr val="tx1"/>
-          </a:fontRef>
-        </p:style>
-      </p:cxnSp>
-      <p:cxnSp>
-        <p:nvCxnSpPr>
-          <p:cNvPr id="58" name="Straight Arrow Connector 57">
-            <a:extLst>
-              <a:ext uri="{FF2B5EF4-FFF2-40B4-BE49-F238E27FC236}">
-                <a16:creationId xmlns:a16="http://schemas.microsoft.com/office/drawing/2014/main" id="{6089ABCF-207E-40F2-B287-9125286065CB}"/>
-              </a:ext>
-            </a:extLst>
-          </p:cNvPr>
-          <p:cNvCxnSpPr>
-            <a:cxnSpLocks/>
-            <a:stCxn id="50" idx="2"/>
-          </p:cNvCxnSpPr>
-          <p:nvPr/>
-        </p:nvCxnSpPr>
-        <p:spPr>
-          <a:xfrm>
-            <a:off x="6096000" y="3308259"/>
-            <a:ext cx="0" cy="241483"/>
-          </a:xfrm>
-          <a:prstGeom prst="straightConnector1">
-            <a:avLst/>
-          </a:prstGeom>
-          <a:ln>
-            <a:tailEnd type="triangle"/>
-          </a:ln>
-        </p:spPr>
-        <p:style>
-          <a:lnRef idx="1">
-            <a:schemeClr val="accent1"/>
-          </a:lnRef>
-          <a:fillRef idx="0">
-            <a:schemeClr val="accent1"/>
-          </a:fillRef>
-          <a:effectRef idx="0">
-            <a:schemeClr val="accent1"/>
-          </a:effectRef>
-          <a:fontRef idx="minor">
-            <a:schemeClr val="tx1"/>
-          </a:fontRef>
-        </p:style>
-      </p:cxnSp>
-      <p:cxnSp>
-        <p:nvCxnSpPr>
-          <p:cNvPr id="61" name="Connector: Elbow 60">
-            <a:extLst>
-              <a:ext uri="{FF2B5EF4-FFF2-40B4-BE49-F238E27FC236}">
-                <a16:creationId xmlns:a16="http://schemas.microsoft.com/office/drawing/2014/main" id="{8B78ECF8-9008-46B4-BF95-082860F05C5E}"/>
-              </a:ext>
-            </a:extLst>
-          </p:cNvPr>
-          <p:cNvCxnSpPr>
-            <a:cxnSpLocks/>
-            <a:stCxn id="52" idx="3"/>
-            <a:endCxn id="66" idx="0"/>
-          </p:cNvCxnSpPr>
-          <p:nvPr/>
-        </p:nvCxnSpPr>
-        <p:spPr>
-          <a:xfrm>
-            <a:off x="8428169" y="4477339"/>
-            <a:ext cx="1725923" cy="984874"/>
-          </a:xfrm>
-          <a:prstGeom prst="bentConnector2">
-            <a:avLst/>
-          </a:prstGeom>
-          <a:ln>
-            <a:tailEnd type="triangle"/>
-          </a:ln>
-        </p:spPr>
-        <p:style>
-          <a:lnRef idx="1">
-            <a:schemeClr val="accent1"/>
-          </a:lnRef>
-          <a:fillRef idx="0">
-            <a:schemeClr val="accent1"/>
-          </a:fillRef>
-          <a:effectRef idx="0">
-            <a:schemeClr val="accent1"/>
-          </a:effectRef>
-          <a:fontRef idx="minor">
-            <a:schemeClr val="tx1"/>
-          </a:fontRef>
-        </p:style>
-      </p:cxnSp>
-      <p:pic>
-        <p:nvPicPr>
-          <p:cNvPr id="66" name="Picture 65">
-            <a:extLst>
-              <a:ext uri="{FF2B5EF4-FFF2-40B4-BE49-F238E27FC236}">
-                <a16:creationId xmlns:a16="http://schemas.microsoft.com/office/drawing/2014/main" id="{7F822350-50A4-45C9-A909-252B278AAA39}"/>
-              </a:ext>
-            </a:extLst>
-          </p:cNvPr>
-          <p:cNvPicPr>
-            <a:picLocks noChangeAspect="1"/>
-          </p:cNvPicPr>
-          <p:nvPr/>
-        </p:nvPicPr>
-        <p:blipFill>
-          <a:blip r:embed="rId7"/>
-          <a:stretch>
-            <a:fillRect/>
-          </a:stretch>
-        </p:blipFill>
-        <p:spPr>
-          <a:xfrm>
-            <a:off x="8116184" y="5462213"/>
-            <a:ext cx="4075816" cy="1406697"/>
-          </a:xfrm>
-          <a:prstGeom prst="rect">
-            <a:avLst/>
-          </a:prstGeom>
-        </p:spPr>
-      </p:pic>
-      <p:pic>
-        <p:nvPicPr>
-          <p:cNvPr id="69" name="Picture 68">
-            <a:extLst>
-              <a:ext uri="{FF2B5EF4-FFF2-40B4-BE49-F238E27FC236}">
-                <a16:creationId xmlns:a16="http://schemas.microsoft.com/office/drawing/2014/main" id="{A5567FCD-8DFA-48BF-820D-696EC8981BBC}"/>
-              </a:ext>
-            </a:extLst>
-          </p:cNvPr>
-          <p:cNvPicPr>
-            <a:picLocks noChangeAspect="1"/>
-          </p:cNvPicPr>
-          <p:nvPr/>
-        </p:nvPicPr>
-        <p:blipFill rotWithShape="1">
-          <a:blip r:embed="rId8"/>
-          <a:srcRect r="-1879" b="62315"/>
-          <a:stretch/>
-        </p:blipFill>
-        <p:spPr>
-          <a:xfrm>
-            <a:off x="913832" y="2692685"/>
-            <a:ext cx="2801442" cy="362102"/>
-          </a:xfrm>
-          <a:prstGeom prst="rect">
-            <a:avLst/>
-          </a:prstGeom>
-        </p:spPr>
-      </p:pic>
-      <p:pic>
-        <p:nvPicPr>
-          <p:cNvPr id="72" name="Picture 71">
-            <a:extLst>
-              <a:ext uri="{FF2B5EF4-FFF2-40B4-BE49-F238E27FC236}">
-                <a16:creationId xmlns:a16="http://schemas.microsoft.com/office/drawing/2014/main" id="{053C982C-0E2A-4C10-BF54-4E921F3BF353}"/>
-              </a:ext>
-            </a:extLst>
-          </p:cNvPr>
-          <p:cNvPicPr>
-            <a:picLocks noChangeAspect="1"/>
-          </p:cNvPicPr>
-          <p:nvPr/>
-        </p:nvPicPr>
-        <p:blipFill rotWithShape="1">
-          <a:blip r:embed="rId9"/>
-          <a:srcRect r="14511" b="21246"/>
-          <a:stretch/>
-        </p:blipFill>
-        <p:spPr>
-          <a:xfrm>
-            <a:off x="3715274" y="5998242"/>
-            <a:ext cx="1853425" cy="604709"/>
-          </a:xfrm>
-          <a:prstGeom prst="rect">
-            <a:avLst/>
-          </a:prstGeom>
-          <a:ln>
-            <a:noFill/>
-          </a:ln>
-          <a:effectLst>
-            <a:outerShdw blurRad="190500" algn="tl" rotWithShape="0">
-              <a:srgbClr val="000000">
-                <a:alpha val="70000"/>
-              </a:srgbClr>
-            </a:outerShdw>
-          </a:effectLst>
         </p:spPr>
       </p:pic>
     </p:spTree>
     <p:extLst>
       <p:ext uri="{BB962C8B-B14F-4D97-AF65-F5344CB8AC3E}">
-        <p14:creationId xmlns:p14="http://schemas.microsoft.com/office/powerpoint/2010/main" val="2369688689"/>
+        <p14:creationId xmlns:p14="http://schemas.microsoft.com/office/powerpoint/2010/main" val="2547040333"/>
       </p:ext>
     </p:extLst>
   </p:cSld>
@@ -18504,10 +18475,137 @@
       </p:grpSpPr>
       <p:sp>
         <p:nvSpPr>
-          <p:cNvPr id="2" name="Title 1">
-            <a:extLst>
-              <a:ext uri="{FF2B5EF4-FFF2-40B4-BE49-F238E27FC236}">
-                <a16:creationId xmlns:a16="http://schemas.microsoft.com/office/drawing/2014/main" id="{516AF402-B805-463A-8761-2006D370D7AC}"/>
+          <p:cNvPr id="3" name="Content Placeholder 2">
+            <a:extLst>
+              <a:ext uri="{FF2B5EF4-FFF2-40B4-BE49-F238E27FC236}">
+                <a16:creationId xmlns:a16="http://schemas.microsoft.com/office/drawing/2014/main" id="{51AE9555-3952-4843-8008-7DD11BF43BAC}"/>
+              </a:ext>
+            </a:extLst>
+          </p:cNvPr>
+          <p:cNvSpPr>
+            <a:spLocks noGrp="1"/>
+          </p:cNvSpPr>
+          <p:nvPr>
+            <p:ph idx="1"/>
+          </p:nvPr>
+        </p:nvSpPr>
+        <p:spPr>
+          <a:xfrm>
+            <a:off x="469285" y="1028051"/>
+            <a:ext cx="9281274" cy="3090532"/>
+          </a:xfrm>
+        </p:spPr>
+        <p:txBody>
+          <a:bodyPr/>
+          <a:lstStyle/>
+          <a:p>
+            <a:pPr marL="457200" indent="-457200">
+              <a:buFont typeface="Arial" panose="020B0604020202020204" pitchFamily="34" charset="0"/>
+              <a:buChar char="•"/>
+            </a:pPr>
+            <a:r>
+              <a:rPr lang="nl-BE" sz="2000" dirty="0"/>
+              <a:t>Can be defined: </a:t>
+            </a:r>
+          </a:p>
+          <a:p>
+            <a:pPr marL="815363" lvl="1" indent="-457200">
+              <a:buFont typeface="Arial" panose="020B0604020202020204" pitchFamily="34" charset="0"/>
+              <a:buChar char="•"/>
+            </a:pPr>
+            <a:r>
+              <a:rPr lang="nl-BE" sz="2000" dirty="0"/>
+              <a:t>Under same group-indent (in hosts file) with “vars” keyword</a:t>
+            </a:r>
+          </a:p>
+          <a:p>
+            <a:pPr marL="815363" lvl="1" indent="-457200">
+              <a:buFont typeface="Arial" panose="020B0604020202020204" pitchFamily="34" charset="0"/>
+              <a:buChar char="•"/>
+            </a:pPr>
+            <a:r>
+              <a:rPr lang="nl-BE" sz="2000" dirty="0"/>
+              <a:t>Under vars/main.yml of role in “roles” directory</a:t>
+            </a:r>
+          </a:p>
+          <a:p>
+            <a:pPr marL="815363" lvl="1" indent="-457200">
+              <a:buFont typeface="Arial" panose="020B0604020202020204" pitchFamily="34" charset="0"/>
+              <a:buChar char="•"/>
+            </a:pPr>
+            <a:r>
+              <a:rPr lang="nl-BE" sz="2000" dirty="0"/>
+              <a:t>Under group_vars directory</a:t>
+            </a:r>
+          </a:p>
+          <a:p>
+            <a:endParaRPr lang="en-US" sz="2000" dirty="0"/>
+          </a:p>
+        </p:txBody>
+      </p:sp>
+      <p:sp>
+        <p:nvSpPr>
+          <p:cNvPr id="4" name="Footer Placeholder 3">
+            <a:extLst>
+              <a:ext uri="{FF2B5EF4-FFF2-40B4-BE49-F238E27FC236}">
+                <a16:creationId xmlns:a16="http://schemas.microsoft.com/office/drawing/2014/main" id="{88947A4A-A97F-4CD4-B794-6D4076A5261F}"/>
+              </a:ext>
+            </a:extLst>
+          </p:cNvPr>
+          <p:cNvSpPr>
+            <a:spLocks noGrp="1"/>
+          </p:cNvSpPr>
+          <p:nvPr>
+            <p:ph type="ftr" sz="quarter" idx="11"/>
+          </p:nvPr>
+        </p:nvSpPr>
+        <p:spPr/>
+        <p:txBody>
+          <a:bodyPr/>
+          <a:lstStyle/>
+          <a:p>
+            <a:r>
+              <a:rPr lang="nl-BE" dirty="0"/>
+              <a:t>Ansible – Introduction</a:t>
+            </a:r>
+          </a:p>
+        </p:txBody>
+      </p:sp>
+      <p:sp>
+        <p:nvSpPr>
+          <p:cNvPr id="5" name="Slide Number Placeholder 4">
+            <a:extLst>
+              <a:ext uri="{FF2B5EF4-FFF2-40B4-BE49-F238E27FC236}">
+                <a16:creationId xmlns:a16="http://schemas.microsoft.com/office/drawing/2014/main" id="{F1770228-2C71-4008-82FD-CF3B4801A8D8}"/>
+              </a:ext>
+            </a:extLst>
+          </p:cNvPr>
+          <p:cNvSpPr>
+            <a:spLocks noGrp="1"/>
+          </p:cNvSpPr>
+          <p:nvPr>
+            <p:ph type="sldNum" sz="quarter" idx="12"/>
+          </p:nvPr>
+        </p:nvSpPr>
+        <p:spPr/>
+        <p:txBody>
+          <a:bodyPr/>
+          <a:lstStyle/>
+          <a:p>
+            <a:fld id="{FF88DA20-ED00-471C-9170-60F590CB400A}" type="slidenum">
+              <a:rPr lang="nl-BE" smtClean="0"/>
+              <a:t>42</a:t>
+            </a:fld>
+            <a:endParaRPr lang="nl-BE"/>
+          </a:p>
+        </p:txBody>
+      </p:sp>
+      <p:sp>
+        <p:nvSpPr>
+          <p:cNvPr id="8" name="Title 1">
+            <a:extLst>
+              <a:ext uri="{FF2B5EF4-FFF2-40B4-BE49-F238E27FC236}">
+                <a16:creationId xmlns:a16="http://schemas.microsoft.com/office/drawing/2014/main" id="{F2361ACF-39B4-45D8-A1D6-8BDFCEB2B250}"/>
               </a:ext>
             </a:extLst>
           </p:cNvPr>
@@ -18518,7 +18616,12 @@
             <p:ph type="title"/>
           </p:nvPr>
         </p:nvSpPr>
-        <p:spPr/>
+        <p:spPr>
+          <a:xfrm>
+            <a:off x="396000" y="612000"/>
+            <a:ext cx="10515600" cy="684000"/>
+          </a:xfrm>
+        </p:spPr>
         <p:txBody>
           <a:bodyPr/>
           <a:lstStyle/>
@@ -18529,7 +18632,7 @@
                   <a:srgbClr val="0085FE"/>
                 </a:solidFill>
               </a:rPr>
-              <a:t>Tasks and used modules</a:t>
+              <a:t>Group/role specific variables</a:t>
             </a:r>
             <a:endParaRPr lang="en-US" dirty="0">
               <a:solidFill>
@@ -18539,69 +18642,12 @@
           </a:p>
         </p:txBody>
       </p:sp>
-      <p:sp>
-        <p:nvSpPr>
-          <p:cNvPr id="4" name="Footer Placeholder 3">
-            <a:extLst>
-              <a:ext uri="{FF2B5EF4-FFF2-40B4-BE49-F238E27FC236}">
-                <a16:creationId xmlns:a16="http://schemas.microsoft.com/office/drawing/2014/main" id="{D1A712F8-4B7E-4E93-B599-0230989E62FF}"/>
-              </a:ext>
-            </a:extLst>
-          </p:cNvPr>
-          <p:cNvSpPr>
-            <a:spLocks noGrp="1"/>
-          </p:cNvSpPr>
-          <p:nvPr>
-            <p:ph type="ftr" sz="quarter" idx="11"/>
-          </p:nvPr>
-        </p:nvSpPr>
-        <p:spPr/>
-        <p:txBody>
-          <a:bodyPr/>
-          <a:lstStyle/>
-          <a:p>
-            <a:r>
-              <a:rPr lang="en-US" dirty="0"/>
-              <a:t>Ansible - Introduction</a:t>
-            </a:r>
-          </a:p>
-        </p:txBody>
-      </p:sp>
-      <p:sp>
-        <p:nvSpPr>
-          <p:cNvPr id="5" name="Slide Number Placeholder 4">
-            <a:extLst>
-              <a:ext uri="{FF2B5EF4-FFF2-40B4-BE49-F238E27FC236}">
-                <a16:creationId xmlns:a16="http://schemas.microsoft.com/office/drawing/2014/main" id="{4D9DDEC3-4B59-4F49-A668-524CBFFAA4F2}"/>
-              </a:ext>
-            </a:extLst>
-          </p:cNvPr>
-          <p:cNvSpPr>
-            <a:spLocks noGrp="1"/>
-          </p:cNvSpPr>
-          <p:nvPr>
-            <p:ph type="sldNum" sz="quarter" idx="12"/>
-          </p:nvPr>
-        </p:nvSpPr>
-        <p:spPr/>
-        <p:txBody>
-          <a:bodyPr/>
-          <a:lstStyle/>
-          <a:p>
-            <a:fld id="{FF88DA20-ED00-471C-9170-60F590CB400A}" type="slidenum">
-              <a:rPr lang="nl-BE" smtClean="0"/>
-              <a:t>42</a:t>
-            </a:fld>
-            <a:endParaRPr lang="nl-BE"/>
-          </a:p>
-        </p:txBody>
-      </p:sp>
       <p:pic>
         <p:nvPicPr>
-          <p:cNvPr id="6" name="Picture 5">
-            <a:extLst>
-              <a:ext uri="{FF2B5EF4-FFF2-40B4-BE49-F238E27FC236}">
-                <a16:creationId xmlns:a16="http://schemas.microsoft.com/office/drawing/2014/main" id="{E9E1A2F1-ABBE-47BC-AE2E-C5ECA2EBBFC1}"/>
+          <p:cNvPr id="18" name="Picture 17">
+            <a:extLst>
+              <a:ext uri="{FF2B5EF4-FFF2-40B4-BE49-F238E27FC236}">
+                <a16:creationId xmlns:a16="http://schemas.microsoft.com/office/drawing/2014/main" id="{3E2CFFE3-FB64-4809-BA2F-D53D082D3C61}"/>
               </a:ext>
             </a:extLst>
           </p:cNvPr>
@@ -18618,8 +18664,8 @@
         </p:blipFill>
         <p:spPr>
           <a:xfrm>
-            <a:off x="2307854" y="1881932"/>
-            <a:ext cx="7576292" cy="3094135"/>
+            <a:off x="4296136" y="2175056"/>
+            <a:ext cx="5839640" cy="4563112"/>
           </a:xfrm>
           <a:prstGeom prst="rect">
             <a:avLst/>
@@ -18629,7 +18675,7 @@
     </p:spTree>
     <p:extLst>
       <p:ext uri="{BB962C8B-B14F-4D97-AF65-F5344CB8AC3E}">
-        <p14:creationId xmlns:p14="http://schemas.microsoft.com/office/powerpoint/2010/main" val="2547040333"/>
+        <p14:creationId xmlns:p14="http://schemas.microsoft.com/office/powerpoint/2010/main" val="47307552"/>
       </p:ext>
     </p:extLst>
   </p:cSld>
@@ -18674,7 +18720,7 @@
         </p:nvSpPr>
         <p:spPr>
           <a:xfrm>
-            <a:off x="469285" y="1028051"/>
+            <a:off x="534291" y="1296000"/>
             <a:ext cx="9281274" cy="3090532"/>
           </a:xfrm>
         </p:spPr>
@@ -18688,7 +18734,102 @@
             </a:pPr>
             <a:r>
               <a:rPr lang="nl-BE" sz="2000" dirty="0"/>
-              <a:t>Can be defined: </a:t>
+              <a:t>Start playbook with “</a:t>
+            </a:r>
+            <a:r>
+              <a:rPr lang="nl-BE" sz="2000" dirty="0">
+                <a:latin typeface="Courier New" panose="02070309020205020404" pitchFamily="49" charset="0"/>
+                <a:cs typeface="Courier New" panose="02070309020205020404" pitchFamily="49" charset="0"/>
+              </a:rPr>
+              <a:t>ansible-playbook plabookName.yml</a:t>
+            </a:r>
+            <a:r>
+              <a:rPr lang="nl-BE" sz="2000" dirty="0"/>
+              <a:t>”</a:t>
+            </a:r>
+            <a:endParaRPr lang="en-US" sz="2000" dirty="0"/>
+          </a:p>
+          <a:p>
+            <a:pPr marL="457200" indent="-457200">
+              <a:buFont typeface="Arial" panose="020B0604020202020204" pitchFamily="34" charset="0"/>
+              <a:buChar char="•"/>
+            </a:pPr>
+            <a:r>
+              <a:rPr lang="en-US" sz="2000" dirty="0"/>
+              <a:t>Add “</a:t>
+            </a:r>
+            <a:r>
+              <a:rPr lang="en-US" sz="2000" dirty="0">
+                <a:latin typeface="Courier New" panose="02070309020205020404" pitchFamily="49" charset="0"/>
+                <a:cs typeface="Courier New" panose="02070309020205020404" pitchFamily="49" charset="0"/>
+              </a:rPr>
+              <a:t>--check-syntax</a:t>
+            </a:r>
+            <a:r>
+              <a:rPr lang="en-US" sz="2000" dirty="0"/>
+              <a:t>” to check playbook for syntax errors</a:t>
+            </a:r>
+          </a:p>
+          <a:p>
+            <a:pPr marL="457200" indent="-457200">
+              <a:buFont typeface="Arial" panose="020B0604020202020204" pitchFamily="34" charset="0"/>
+              <a:buChar char="•"/>
+            </a:pPr>
+            <a:r>
+              <a:rPr lang="en-US" sz="2000" dirty="0"/>
+              <a:t>Add “</a:t>
+            </a:r>
+            <a:r>
+              <a:rPr lang="en-US" sz="2000" dirty="0">
+                <a:latin typeface="Courier New" panose="02070309020205020404" pitchFamily="49" charset="0"/>
+                <a:cs typeface="Courier New" panose="02070309020205020404" pitchFamily="49" charset="0"/>
+              </a:rPr>
+              <a:t>--verbose</a:t>
+            </a:r>
+            <a:r>
+              <a:rPr lang="en-US" sz="2000" dirty="0"/>
+              <a:t>” to view live output when playbook runs (more for debugging)</a:t>
+            </a:r>
+          </a:p>
+          <a:p>
+            <a:pPr marL="457200" indent="-457200">
+              <a:buFont typeface="Arial" panose="020B0604020202020204" pitchFamily="34" charset="0"/>
+              <a:buChar char="•"/>
+            </a:pPr>
+            <a:r>
+              <a:rPr lang="en-US" sz="2000" dirty="0"/>
+              <a:t>Play recap shows quick overview of run playbook:</a:t>
+            </a:r>
+          </a:p>
+          <a:p>
+            <a:pPr marL="457200" indent="-457200">
+              <a:buFont typeface="Arial" panose="020B0604020202020204" pitchFamily="34" charset="0"/>
+              <a:buChar char="•"/>
+            </a:pPr>
+            <a:endParaRPr lang="en-US" sz="2000" dirty="0"/>
+          </a:p>
+          <a:p>
+            <a:pPr marL="457200" indent="-457200">
+              <a:buFont typeface="Arial" panose="020B0604020202020204" pitchFamily="34" charset="0"/>
+              <a:buChar char="•"/>
+            </a:pPr>
+            <a:endParaRPr lang="en-US" sz="2000" dirty="0"/>
+          </a:p>
+          <a:p>
+            <a:pPr marL="457200" indent="-457200">
+              <a:buFont typeface="Arial" panose="020B0604020202020204" pitchFamily="34" charset="0"/>
+              <a:buChar char="•"/>
+            </a:pPr>
+            <a:endParaRPr lang="en-US" sz="2000" dirty="0"/>
+          </a:p>
+          <a:p>
+            <a:pPr marL="457200" indent="-457200">
+              <a:buFont typeface="Arial" panose="020B0604020202020204" pitchFamily="34" charset="0"/>
+              <a:buChar char="•"/>
+            </a:pPr>
+            <a:r>
+              <a:rPr lang="en-US" sz="2000" dirty="0"/>
+              <a:t>Play recap of legend:</a:t>
             </a:r>
           </a:p>
           <a:p>
@@ -18697,8 +18838,8 @@
               <a:buChar char="•"/>
             </a:pPr>
             <a:r>
-              <a:rPr lang="nl-BE" sz="2000" dirty="0"/>
-              <a:t>Under same group-indent (in hosts file) with “vars” keyword</a:t>
+              <a:rPr lang="en-US" sz="2000" dirty="0"/>
+              <a:t>Yellow = something changed (saved file in this case)	</a:t>
             </a:r>
           </a:p>
           <a:p>
@@ -18707,8 +18848,8 @@
               <a:buChar char="•"/>
             </a:pPr>
             <a:r>
-              <a:rPr lang="nl-BE" sz="2000" dirty="0"/>
-              <a:t>Under vars/main.yml of role in “roles” directory</a:t>
+              <a:rPr lang="en-US" sz="2000" dirty="0"/>
+              <a:t>Green = everything is OK no errors occurred</a:t>
             </a:r>
           </a:p>
           <a:p>
@@ -18717,12 +18858,16 @@
               <a:buChar char="•"/>
             </a:pPr>
             <a:r>
-              <a:rPr lang="nl-BE" sz="2000" dirty="0"/>
-              <a:t>Under group_vars directory</a:t>
-            </a:r>
-          </a:p>
-          <a:p>
-            <a:endParaRPr lang="en-US" sz="2000" dirty="0"/>
+              <a:rPr lang="en-US" sz="2000" dirty="0"/>
+              <a:t>Red = an error occurred (play stops once error occurs):</a:t>
+            </a:r>
+          </a:p>
+          <a:p>
+            <a:r>
+              <a:rPr lang="en-US" sz="2000" dirty="0"/>
+              <a:t> </a:t>
+            </a:r>
+            <a:endParaRPr lang="nl-BE" sz="2000" dirty="0"/>
           </a:p>
         </p:txBody>
       </p:sp>
@@ -18815,7 +18960,7 @@
                   <a:srgbClr val="0085FE"/>
                 </a:solidFill>
               </a:rPr>
-              <a:t>Group/role specific variables</a:t>
+              <a:t>Run playbook</a:t>
             </a:r>
             <a:endParaRPr lang="en-US" dirty="0">
               <a:solidFill>
@@ -18827,10 +18972,10 @@
       </p:sp>
       <p:pic>
         <p:nvPicPr>
-          <p:cNvPr id="18" name="Picture 17">
-            <a:extLst>
-              <a:ext uri="{FF2B5EF4-FFF2-40B4-BE49-F238E27FC236}">
-                <a16:creationId xmlns:a16="http://schemas.microsoft.com/office/drawing/2014/main" id="{3E2CFFE3-FB64-4809-BA2F-D53D082D3C61}"/>
+          <p:cNvPr id="6" name="Picture 5">
+            <a:extLst>
+              <a:ext uri="{FF2B5EF4-FFF2-40B4-BE49-F238E27FC236}">
+                <a16:creationId xmlns:a16="http://schemas.microsoft.com/office/drawing/2014/main" id="{00F8CAE9-6417-4891-AB6B-D6B855F16F90}"/>
               </a:ext>
             </a:extLst>
           </p:cNvPr>
@@ -18847,8 +18992,38 @@
         </p:blipFill>
         <p:spPr>
           <a:xfrm>
-            <a:off x="4296136" y="2175056"/>
-            <a:ext cx="5839640" cy="4563112"/>
+            <a:off x="1676123" y="3173679"/>
+            <a:ext cx="8839753" cy="966848"/>
+          </a:xfrm>
+          <a:prstGeom prst="rect">
+            <a:avLst/>
+          </a:prstGeom>
+        </p:spPr>
+      </p:pic>
+      <p:pic>
+        <p:nvPicPr>
+          <p:cNvPr id="11" name="Picture 10">
+            <a:extLst>
+              <a:ext uri="{FF2B5EF4-FFF2-40B4-BE49-F238E27FC236}">
+                <a16:creationId xmlns:a16="http://schemas.microsoft.com/office/drawing/2014/main" id="{9C1E9B76-0C76-4C9A-BE5E-EEECEBBD2ECE}"/>
+              </a:ext>
+            </a:extLst>
+          </p:cNvPr>
+          <p:cNvPicPr>
+            <a:picLocks noChangeAspect="1"/>
+          </p:cNvPicPr>
+          <p:nvPr/>
+        </p:nvPicPr>
+        <p:blipFill>
+          <a:blip r:embed="rId3"/>
+          <a:stretch>
+            <a:fillRect/>
+          </a:stretch>
+        </p:blipFill>
+        <p:spPr>
+          <a:xfrm>
+            <a:off x="7304993" y="5127494"/>
+            <a:ext cx="4887007" cy="1781424"/>
           </a:xfrm>
           <a:prstGeom prst="rect">
             <a:avLst/>
@@ -18858,7 +19033,7 @@
     </p:spTree>
     <p:extLst>
       <p:ext uri="{BB962C8B-B14F-4D97-AF65-F5344CB8AC3E}">
-        <p14:creationId xmlns:p14="http://schemas.microsoft.com/office/powerpoint/2010/main" val="47307552"/>
+        <p14:creationId xmlns:p14="http://schemas.microsoft.com/office/powerpoint/2010/main" val="769256954"/>
       </p:ext>
     </p:extLst>
   </p:cSld>
@@ -18887,364 +19062,6 @@
       </p:grpSpPr>
       <p:sp>
         <p:nvSpPr>
-          <p:cNvPr id="3" name="Content Placeholder 2">
-            <a:extLst>
-              <a:ext uri="{FF2B5EF4-FFF2-40B4-BE49-F238E27FC236}">
-                <a16:creationId xmlns:a16="http://schemas.microsoft.com/office/drawing/2014/main" id="{51AE9555-3952-4843-8008-7DD11BF43BAC}"/>
-              </a:ext>
-            </a:extLst>
-          </p:cNvPr>
-          <p:cNvSpPr>
-            <a:spLocks noGrp="1"/>
-          </p:cNvSpPr>
-          <p:nvPr>
-            <p:ph idx="1"/>
-          </p:nvPr>
-        </p:nvSpPr>
-        <p:spPr>
-          <a:xfrm>
-            <a:off x="534291" y="1296000"/>
-            <a:ext cx="9281274" cy="3090532"/>
-          </a:xfrm>
-        </p:spPr>
-        <p:txBody>
-          <a:bodyPr/>
-          <a:lstStyle/>
-          <a:p>
-            <a:pPr marL="457200" indent="-457200">
-              <a:buFont typeface="Arial" panose="020B0604020202020204" pitchFamily="34" charset="0"/>
-              <a:buChar char="•"/>
-            </a:pPr>
-            <a:r>
-              <a:rPr lang="nl-BE" sz="2000" dirty="0"/>
-              <a:t>Start playbook with “</a:t>
-            </a:r>
-            <a:r>
-              <a:rPr lang="nl-BE" sz="2000" dirty="0">
-                <a:latin typeface="Courier New" panose="02070309020205020404" pitchFamily="49" charset="0"/>
-                <a:cs typeface="Courier New" panose="02070309020205020404" pitchFamily="49" charset="0"/>
-              </a:rPr>
-              <a:t>ansible-playbook plabookName.yml</a:t>
-            </a:r>
-            <a:r>
-              <a:rPr lang="nl-BE" sz="2000" dirty="0"/>
-              <a:t>”</a:t>
-            </a:r>
-            <a:endParaRPr lang="en-US" sz="2000" dirty="0"/>
-          </a:p>
-          <a:p>
-            <a:pPr marL="457200" indent="-457200">
-              <a:buFont typeface="Arial" panose="020B0604020202020204" pitchFamily="34" charset="0"/>
-              <a:buChar char="•"/>
-            </a:pPr>
-            <a:r>
-              <a:rPr lang="en-US" sz="2000" dirty="0"/>
-              <a:t>Add “</a:t>
-            </a:r>
-            <a:r>
-              <a:rPr lang="en-US" sz="2000" dirty="0">
-                <a:latin typeface="Courier New" panose="02070309020205020404" pitchFamily="49" charset="0"/>
-                <a:cs typeface="Courier New" panose="02070309020205020404" pitchFamily="49" charset="0"/>
-              </a:rPr>
-              <a:t>--check-syntax</a:t>
-            </a:r>
-            <a:r>
-              <a:rPr lang="en-US" sz="2000" dirty="0"/>
-              <a:t>” to check playbook for syntax errors</a:t>
-            </a:r>
-          </a:p>
-          <a:p>
-            <a:pPr marL="457200" indent="-457200">
-              <a:buFont typeface="Arial" panose="020B0604020202020204" pitchFamily="34" charset="0"/>
-              <a:buChar char="•"/>
-            </a:pPr>
-            <a:r>
-              <a:rPr lang="en-US" sz="2000" dirty="0"/>
-              <a:t>Add “</a:t>
-            </a:r>
-            <a:r>
-              <a:rPr lang="en-US" sz="2000" dirty="0">
-                <a:latin typeface="Courier New" panose="02070309020205020404" pitchFamily="49" charset="0"/>
-                <a:cs typeface="Courier New" panose="02070309020205020404" pitchFamily="49" charset="0"/>
-              </a:rPr>
-              <a:t>--verbose</a:t>
-            </a:r>
-            <a:r>
-              <a:rPr lang="en-US" sz="2000" dirty="0"/>
-              <a:t>” to view live output when playbook runs (more for debugging)</a:t>
-            </a:r>
-          </a:p>
-          <a:p>
-            <a:pPr marL="457200" indent="-457200">
-              <a:buFont typeface="Arial" panose="020B0604020202020204" pitchFamily="34" charset="0"/>
-              <a:buChar char="•"/>
-            </a:pPr>
-            <a:r>
-              <a:rPr lang="en-US" sz="2000" dirty="0"/>
-              <a:t>Play recap shows quick overview of run playbook:</a:t>
-            </a:r>
-          </a:p>
-          <a:p>
-            <a:pPr marL="457200" indent="-457200">
-              <a:buFont typeface="Arial" panose="020B0604020202020204" pitchFamily="34" charset="0"/>
-              <a:buChar char="•"/>
-            </a:pPr>
-            <a:endParaRPr lang="en-US" sz="2000" dirty="0"/>
-          </a:p>
-          <a:p>
-            <a:pPr marL="457200" indent="-457200">
-              <a:buFont typeface="Arial" panose="020B0604020202020204" pitchFamily="34" charset="0"/>
-              <a:buChar char="•"/>
-            </a:pPr>
-            <a:endParaRPr lang="en-US" sz="2000" dirty="0"/>
-          </a:p>
-          <a:p>
-            <a:pPr marL="457200" indent="-457200">
-              <a:buFont typeface="Arial" panose="020B0604020202020204" pitchFamily="34" charset="0"/>
-              <a:buChar char="•"/>
-            </a:pPr>
-            <a:endParaRPr lang="en-US" sz="2000" dirty="0"/>
-          </a:p>
-          <a:p>
-            <a:pPr marL="457200" indent="-457200">
-              <a:buFont typeface="Arial" panose="020B0604020202020204" pitchFamily="34" charset="0"/>
-              <a:buChar char="•"/>
-            </a:pPr>
-            <a:r>
-              <a:rPr lang="en-US" sz="2000" dirty="0"/>
-              <a:t>Play recap of legend:</a:t>
-            </a:r>
-          </a:p>
-          <a:p>
-            <a:pPr marL="815363" lvl="1" indent="-457200">
-              <a:buFont typeface="Arial" panose="020B0604020202020204" pitchFamily="34" charset="0"/>
-              <a:buChar char="•"/>
-            </a:pPr>
-            <a:r>
-              <a:rPr lang="en-US" sz="2000" dirty="0"/>
-              <a:t>Yellow = something changed (saved file in this case)	</a:t>
-            </a:r>
-          </a:p>
-          <a:p>
-            <a:pPr marL="815363" lvl="1" indent="-457200">
-              <a:buFont typeface="Arial" panose="020B0604020202020204" pitchFamily="34" charset="0"/>
-              <a:buChar char="•"/>
-            </a:pPr>
-            <a:r>
-              <a:rPr lang="en-US" sz="2000" dirty="0"/>
-              <a:t>Green = everything is OK no errors occurred</a:t>
-            </a:r>
-          </a:p>
-          <a:p>
-            <a:pPr marL="815363" lvl="1" indent="-457200">
-              <a:buFont typeface="Arial" panose="020B0604020202020204" pitchFamily="34" charset="0"/>
-              <a:buChar char="•"/>
-            </a:pPr>
-            <a:r>
-              <a:rPr lang="en-US" sz="2000" dirty="0"/>
-              <a:t>Red = an error occurred (play stops once error occurs):</a:t>
-            </a:r>
-          </a:p>
-          <a:p>
-            <a:r>
-              <a:rPr lang="en-US" sz="2000" dirty="0"/>
-              <a:t> </a:t>
-            </a:r>
-            <a:endParaRPr lang="nl-BE" sz="2000" dirty="0"/>
-          </a:p>
-        </p:txBody>
-      </p:sp>
-      <p:sp>
-        <p:nvSpPr>
-          <p:cNvPr id="4" name="Footer Placeholder 3">
-            <a:extLst>
-              <a:ext uri="{FF2B5EF4-FFF2-40B4-BE49-F238E27FC236}">
-                <a16:creationId xmlns:a16="http://schemas.microsoft.com/office/drawing/2014/main" id="{88947A4A-A97F-4CD4-B794-6D4076A5261F}"/>
-              </a:ext>
-            </a:extLst>
-          </p:cNvPr>
-          <p:cNvSpPr>
-            <a:spLocks noGrp="1"/>
-          </p:cNvSpPr>
-          <p:nvPr>
-            <p:ph type="ftr" sz="quarter" idx="11"/>
-          </p:nvPr>
-        </p:nvSpPr>
-        <p:spPr/>
-        <p:txBody>
-          <a:bodyPr/>
-          <a:lstStyle/>
-          <a:p>
-            <a:r>
-              <a:rPr lang="nl-BE" dirty="0"/>
-              <a:t>Ansible – Introduction</a:t>
-            </a:r>
-          </a:p>
-        </p:txBody>
-      </p:sp>
-      <p:sp>
-        <p:nvSpPr>
-          <p:cNvPr id="5" name="Slide Number Placeholder 4">
-            <a:extLst>
-              <a:ext uri="{FF2B5EF4-FFF2-40B4-BE49-F238E27FC236}">
-                <a16:creationId xmlns:a16="http://schemas.microsoft.com/office/drawing/2014/main" id="{F1770228-2C71-4008-82FD-CF3B4801A8D8}"/>
-              </a:ext>
-            </a:extLst>
-          </p:cNvPr>
-          <p:cNvSpPr>
-            <a:spLocks noGrp="1"/>
-          </p:cNvSpPr>
-          <p:nvPr>
-            <p:ph type="sldNum" sz="quarter" idx="12"/>
-          </p:nvPr>
-        </p:nvSpPr>
-        <p:spPr/>
-        <p:txBody>
-          <a:bodyPr/>
-          <a:lstStyle/>
-          <a:p>
-            <a:fld id="{FF88DA20-ED00-471C-9170-60F590CB400A}" type="slidenum">
-              <a:rPr lang="nl-BE" smtClean="0"/>
-              <a:t>44</a:t>
-            </a:fld>
-            <a:endParaRPr lang="nl-BE"/>
-          </a:p>
-        </p:txBody>
-      </p:sp>
-      <p:sp>
-        <p:nvSpPr>
-          <p:cNvPr id="8" name="Title 1">
-            <a:extLst>
-              <a:ext uri="{FF2B5EF4-FFF2-40B4-BE49-F238E27FC236}">
-                <a16:creationId xmlns:a16="http://schemas.microsoft.com/office/drawing/2014/main" id="{F2361ACF-39B4-45D8-A1D6-8BDFCEB2B250}"/>
-              </a:ext>
-            </a:extLst>
-          </p:cNvPr>
-          <p:cNvSpPr>
-            <a:spLocks noGrp="1"/>
-          </p:cNvSpPr>
-          <p:nvPr>
-            <p:ph type="title"/>
-          </p:nvPr>
-        </p:nvSpPr>
-        <p:spPr>
-          <a:xfrm>
-            <a:off x="396000" y="612000"/>
-            <a:ext cx="10515600" cy="684000"/>
-          </a:xfrm>
-        </p:spPr>
-        <p:txBody>
-          <a:bodyPr/>
-          <a:lstStyle/>
-          <a:p>
-            <a:r>
-              <a:rPr lang="nl-BE" dirty="0">
-                <a:solidFill>
-                  <a:srgbClr val="0085FE"/>
-                </a:solidFill>
-              </a:rPr>
-              <a:t>Run playbook</a:t>
-            </a:r>
-            <a:endParaRPr lang="en-US" dirty="0">
-              <a:solidFill>
-                <a:srgbClr val="0085FE"/>
-              </a:solidFill>
-            </a:endParaRPr>
-          </a:p>
-        </p:txBody>
-      </p:sp>
-      <p:pic>
-        <p:nvPicPr>
-          <p:cNvPr id="6" name="Picture 5">
-            <a:extLst>
-              <a:ext uri="{FF2B5EF4-FFF2-40B4-BE49-F238E27FC236}">
-                <a16:creationId xmlns:a16="http://schemas.microsoft.com/office/drawing/2014/main" id="{00F8CAE9-6417-4891-AB6B-D6B855F16F90}"/>
-              </a:ext>
-            </a:extLst>
-          </p:cNvPr>
-          <p:cNvPicPr>
-            <a:picLocks noChangeAspect="1"/>
-          </p:cNvPicPr>
-          <p:nvPr/>
-        </p:nvPicPr>
-        <p:blipFill>
-          <a:blip r:embed="rId2"/>
-          <a:stretch>
-            <a:fillRect/>
-          </a:stretch>
-        </p:blipFill>
-        <p:spPr>
-          <a:xfrm>
-            <a:off x="1676123" y="3173679"/>
-            <a:ext cx="8839753" cy="966848"/>
-          </a:xfrm>
-          <a:prstGeom prst="rect">
-            <a:avLst/>
-          </a:prstGeom>
-        </p:spPr>
-      </p:pic>
-      <p:pic>
-        <p:nvPicPr>
-          <p:cNvPr id="11" name="Picture 10">
-            <a:extLst>
-              <a:ext uri="{FF2B5EF4-FFF2-40B4-BE49-F238E27FC236}">
-                <a16:creationId xmlns:a16="http://schemas.microsoft.com/office/drawing/2014/main" id="{9C1E9B76-0C76-4C9A-BE5E-EEECEBBD2ECE}"/>
-              </a:ext>
-            </a:extLst>
-          </p:cNvPr>
-          <p:cNvPicPr>
-            <a:picLocks noChangeAspect="1"/>
-          </p:cNvPicPr>
-          <p:nvPr/>
-        </p:nvPicPr>
-        <p:blipFill>
-          <a:blip r:embed="rId3"/>
-          <a:stretch>
-            <a:fillRect/>
-          </a:stretch>
-        </p:blipFill>
-        <p:spPr>
-          <a:xfrm>
-            <a:off x="7304993" y="5127494"/>
-            <a:ext cx="4887007" cy="1781424"/>
-          </a:xfrm>
-          <a:prstGeom prst="rect">
-            <a:avLst/>
-          </a:prstGeom>
-        </p:spPr>
-      </p:pic>
-    </p:spTree>
-    <p:extLst>
-      <p:ext uri="{BB962C8B-B14F-4D97-AF65-F5344CB8AC3E}">
-        <p14:creationId xmlns:p14="http://schemas.microsoft.com/office/powerpoint/2010/main" val="769256954"/>
-      </p:ext>
-    </p:extLst>
-  </p:cSld>
-  <p:clrMapOvr>
-    <a:masterClrMapping/>
-  </p:clrMapOvr>
-</p:sld>
-</file>
-
-<file path=ppt/slides/slide45.xml><?xml version="1.0" encoding="utf-8"?>
-<p:sld xmlns:a="http://schemas.openxmlformats.org/drawingml/2006/main" xmlns:r="http://schemas.openxmlformats.org/officeDocument/2006/relationships" xmlns:p="http://schemas.openxmlformats.org/presentationml/2006/main">
-  <p:cSld>
-    <p:spTree>
-      <p:nvGrpSpPr>
-        <p:cNvPr id="1" name=""/>
-        <p:cNvGrpSpPr/>
-        <p:nvPr/>
-      </p:nvGrpSpPr>
-      <p:grpSpPr>
-        <a:xfrm>
-          <a:off x="0" y="0"/>
-          <a:ext cx="0" cy="0"/>
-          <a:chOff x="0" y="0"/>
-          <a:chExt cx="0" cy="0"/>
-        </a:xfrm>
-      </p:grpSpPr>
-      <p:sp>
-        <p:nvSpPr>
           <p:cNvPr id="2" name="Title 1">
             <a:extLst>
               <a:ext uri="{FF2B5EF4-FFF2-40B4-BE49-F238E27FC236}">
@@ -19372,7 +19189,7 @@
           <a:p>
             <a:fld id="{FF88DA20-ED00-471C-9170-60F590CB400A}" type="slidenum">
               <a:rPr lang="nl-BE" smtClean="0"/>
-              <a:t>45</a:t>
+              <a:t>44</a:t>
             </a:fld>
             <a:endParaRPr lang="nl-BE"/>
           </a:p>

</xml_diff>